<commit_message>
Fallstudie-PPT angelegt --> Struktur der PPT festgelegt, bitte einmal schauen und Eure Punkte mir im Teams zukommen lassen :)
</commit_message>
<xml_diff>
--- a/Fallstudie_Kochbuch.pptx
+++ b/Fallstudie_Kochbuch.pptx
@@ -5,10 +5,10 @@
     <p:sldMasterId id="2147483648" r:id="rId4"/>
   </p:sldMasterIdLst>
   <p:notesMasterIdLst>
-    <p:notesMasterId r:id="rId31"/>
+    <p:notesMasterId r:id="rId34"/>
   </p:notesMasterIdLst>
   <p:handoutMasterIdLst>
-    <p:handoutMasterId r:id="rId32"/>
+    <p:handoutMasterId r:id="rId35"/>
   </p:handoutMasterIdLst>
   <p:sldIdLst>
     <p:sldId id="256" r:id="rId5"/>
@@ -21,22 +21,25 @@
     <p:sldId id="316" r:id="rId12"/>
     <p:sldId id="304" r:id="rId13"/>
     <p:sldId id="296" r:id="rId14"/>
-    <p:sldId id="297" r:id="rId15"/>
-    <p:sldId id="298" r:id="rId16"/>
-    <p:sldId id="299" r:id="rId17"/>
-    <p:sldId id="300" r:id="rId18"/>
-    <p:sldId id="287" r:id="rId19"/>
-    <p:sldId id="268" r:id="rId20"/>
-    <p:sldId id="315" r:id="rId21"/>
-    <p:sldId id="294" r:id="rId22"/>
-    <p:sldId id="258" r:id="rId23"/>
-    <p:sldId id="261" r:id="rId24"/>
-    <p:sldId id="262" r:id="rId25"/>
-    <p:sldId id="283" r:id="rId26"/>
-    <p:sldId id="264" r:id="rId27"/>
-    <p:sldId id="266" r:id="rId28"/>
-    <p:sldId id="284" r:id="rId29"/>
-    <p:sldId id="267" r:id="rId30"/>
+    <p:sldId id="321" r:id="rId15"/>
+    <p:sldId id="319" r:id="rId16"/>
+    <p:sldId id="322" r:id="rId17"/>
+    <p:sldId id="297" r:id="rId18"/>
+    <p:sldId id="298" r:id="rId19"/>
+    <p:sldId id="299" r:id="rId20"/>
+    <p:sldId id="300" r:id="rId21"/>
+    <p:sldId id="287" r:id="rId22"/>
+    <p:sldId id="268" r:id="rId23"/>
+    <p:sldId id="315" r:id="rId24"/>
+    <p:sldId id="294" r:id="rId25"/>
+    <p:sldId id="258" r:id="rId26"/>
+    <p:sldId id="261" r:id="rId27"/>
+    <p:sldId id="262" r:id="rId28"/>
+    <p:sldId id="283" r:id="rId29"/>
+    <p:sldId id="264" r:id="rId30"/>
+    <p:sldId id="266" r:id="rId31"/>
+    <p:sldId id="284" r:id="rId32"/>
+    <p:sldId id="267" r:id="rId33"/>
   </p:sldIdLst>
   <p:sldSz cx="12192000" cy="6858000"/>
   <p:notesSz cx="6858000" cy="9144000"/>
@@ -1821,6 +1824,336 @@
         <p:cNvPr id="1" name="">
           <a:extLst>
             <a:ext uri="{FF2B5EF4-FFF2-40B4-BE49-F238E27FC236}">
+              <a16:creationId xmlns:a16="http://schemas.microsoft.com/office/drawing/2014/main" id="{B31AA636-D702-52DF-B58C-86FBF8C57BB6}"/>
+            </a:ext>
+          </a:extLst>
+        </p:cNvPr>
+        <p:cNvGrpSpPr/>
+        <p:nvPr/>
+      </p:nvGrpSpPr>
+      <p:grpSpPr>
+        <a:xfrm>
+          <a:off x="0" y="0"/>
+          <a:ext cx="0" cy="0"/>
+          <a:chOff x="0" y="0"/>
+          <a:chExt cx="0" cy="0"/>
+        </a:xfrm>
+      </p:grpSpPr>
+      <p:sp>
+        <p:nvSpPr>
+          <p:cNvPr id="2" name="Folienbildplatzhalter 1">
+            <a:extLst>
+              <a:ext uri="{FF2B5EF4-FFF2-40B4-BE49-F238E27FC236}">
+                <a16:creationId xmlns:a16="http://schemas.microsoft.com/office/drawing/2014/main" id="{E8A235BA-A79F-C501-1B43-3110AEAA3CA9}"/>
+              </a:ext>
+            </a:extLst>
+          </p:cNvPr>
+          <p:cNvSpPr>
+            <a:spLocks noGrp="1" noRot="1" noChangeAspect="1"/>
+          </p:cNvSpPr>
+          <p:nvPr>
+            <p:ph type="sldImg"/>
+          </p:nvPr>
+        </p:nvSpPr>
+        <p:spPr/>
+      </p:sp>
+      <p:sp>
+        <p:nvSpPr>
+          <p:cNvPr id="3" name="Notizenplatzhalter 2">
+            <a:extLst>
+              <a:ext uri="{FF2B5EF4-FFF2-40B4-BE49-F238E27FC236}">
+                <a16:creationId xmlns:a16="http://schemas.microsoft.com/office/drawing/2014/main" id="{DD4D6668-5D2E-74CB-34C0-E74EC4BC2AF3}"/>
+              </a:ext>
+            </a:extLst>
+          </p:cNvPr>
+          <p:cNvSpPr>
+            <a:spLocks noGrp="1"/>
+          </p:cNvSpPr>
+          <p:nvPr>
+            <p:ph type="body" idx="1"/>
+          </p:nvPr>
+        </p:nvSpPr>
+        <p:spPr/>
+        <p:txBody>
+          <a:bodyPr rtlCol="0"/>
+          <a:lstStyle/>
+          <a:p>
+            <a:pPr rtl="0"/>
+            <a:endParaRPr lang="de-DE"/>
+          </a:p>
+        </p:txBody>
+      </p:sp>
+      <p:sp>
+        <p:nvSpPr>
+          <p:cNvPr id="4" name="Foliennummernplatzhalter 3">
+            <a:extLst>
+              <a:ext uri="{FF2B5EF4-FFF2-40B4-BE49-F238E27FC236}">
+                <a16:creationId xmlns:a16="http://schemas.microsoft.com/office/drawing/2014/main" id="{C4C32521-4802-50AA-032C-194199283CAE}"/>
+              </a:ext>
+            </a:extLst>
+          </p:cNvPr>
+          <p:cNvSpPr>
+            <a:spLocks noGrp="1"/>
+          </p:cNvSpPr>
+          <p:nvPr>
+            <p:ph type="sldNum" sz="quarter" idx="5"/>
+          </p:nvPr>
+        </p:nvSpPr>
+        <p:spPr/>
+        <p:txBody>
+          <a:bodyPr rtlCol="0"/>
+          <a:lstStyle/>
+          <a:p>
+            <a:pPr rtl="0"/>
+            <a:fld id="{1734D747-9380-41EE-9946-EC9EC0CA5D1E}" type="slidenum">
+              <a:rPr lang="de-DE" smtClean="0"/>
+              <a:t>11</a:t>
+            </a:fld>
+            <a:endParaRPr lang="de-DE"/>
+          </a:p>
+        </p:txBody>
+      </p:sp>
+    </p:spTree>
+    <p:extLst>
+      <p:ext uri="{BB962C8B-B14F-4D97-AF65-F5344CB8AC3E}">
+        <p14:creationId xmlns:p14="http://schemas.microsoft.com/office/powerpoint/2010/main" val="1195053281"/>
+      </p:ext>
+    </p:extLst>
+  </p:cSld>
+  <p:clrMapOvr>
+    <a:masterClrMapping/>
+  </p:clrMapOvr>
+</p:notes>
+</file>
+
+<file path=ppt/notesSlides/notesSlide12.xml><?xml version="1.0" encoding="utf-8"?>
+<p:notes xmlns:a="http://schemas.openxmlformats.org/drawingml/2006/main" xmlns:r="http://schemas.openxmlformats.org/officeDocument/2006/relationships" xmlns:p="http://schemas.openxmlformats.org/presentationml/2006/main">
+  <p:cSld>
+    <p:spTree>
+      <p:nvGrpSpPr>
+        <p:cNvPr id="1" name="">
+          <a:extLst>
+            <a:ext uri="{FF2B5EF4-FFF2-40B4-BE49-F238E27FC236}">
+              <a16:creationId xmlns:a16="http://schemas.microsoft.com/office/drawing/2014/main" id="{F01999C7-BC79-5AA9-0566-9E2F7AC373A4}"/>
+            </a:ext>
+          </a:extLst>
+        </p:cNvPr>
+        <p:cNvGrpSpPr/>
+        <p:nvPr/>
+      </p:nvGrpSpPr>
+      <p:grpSpPr>
+        <a:xfrm>
+          <a:off x="0" y="0"/>
+          <a:ext cx="0" cy="0"/>
+          <a:chOff x="0" y="0"/>
+          <a:chExt cx="0" cy="0"/>
+        </a:xfrm>
+      </p:grpSpPr>
+      <p:sp>
+        <p:nvSpPr>
+          <p:cNvPr id="2" name="Folienbildplatzhalter 1">
+            <a:extLst>
+              <a:ext uri="{FF2B5EF4-FFF2-40B4-BE49-F238E27FC236}">
+                <a16:creationId xmlns:a16="http://schemas.microsoft.com/office/drawing/2014/main" id="{ED0DAB3A-3D68-8347-C673-9D1845A8CC2C}"/>
+              </a:ext>
+            </a:extLst>
+          </p:cNvPr>
+          <p:cNvSpPr>
+            <a:spLocks noGrp="1" noRot="1" noChangeAspect="1"/>
+          </p:cNvSpPr>
+          <p:nvPr>
+            <p:ph type="sldImg"/>
+          </p:nvPr>
+        </p:nvSpPr>
+        <p:spPr/>
+      </p:sp>
+      <p:sp>
+        <p:nvSpPr>
+          <p:cNvPr id="3" name="Notizenplatzhalter 2">
+            <a:extLst>
+              <a:ext uri="{FF2B5EF4-FFF2-40B4-BE49-F238E27FC236}">
+                <a16:creationId xmlns:a16="http://schemas.microsoft.com/office/drawing/2014/main" id="{D13AE359-2632-4C65-FCAE-01C53C4D374D}"/>
+              </a:ext>
+            </a:extLst>
+          </p:cNvPr>
+          <p:cNvSpPr>
+            <a:spLocks noGrp="1"/>
+          </p:cNvSpPr>
+          <p:nvPr>
+            <p:ph type="body" idx="1"/>
+          </p:nvPr>
+        </p:nvSpPr>
+        <p:spPr/>
+        <p:txBody>
+          <a:bodyPr rtlCol="0"/>
+          <a:lstStyle/>
+          <a:p>
+            <a:pPr rtl="0"/>
+            <a:endParaRPr lang="de-DE"/>
+          </a:p>
+        </p:txBody>
+      </p:sp>
+      <p:sp>
+        <p:nvSpPr>
+          <p:cNvPr id="4" name="Foliennummernplatzhalter 3">
+            <a:extLst>
+              <a:ext uri="{FF2B5EF4-FFF2-40B4-BE49-F238E27FC236}">
+                <a16:creationId xmlns:a16="http://schemas.microsoft.com/office/drawing/2014/main" id="{CABEA833-1AE1-F459-8396-A2E774168636}"/>
+              </a:ext>
+            </a:extLst>
+          </p:cNvPr>
+          <p:cNvSpPr>
+            <a:spLocks noGrp="1"/>
+          </p:cNvSpPr>
+          <p:nvPr>
+            <p:ph type="sldNum" sz="quarter" idx="5"/>
+          </p:nvPr>
+        </p:nvSpPr>
+        <p:spPr/>
+        <p:txBody>
+          <a:bodyPr rtlCol="0"/>
+          <a:lstStyle/>
+          <a:p>
+            <a:pPr rtl="0"/>
+            <a:fld id="{1734D747-9380-41EE-9946-EC9EC0CA5D1E}" type="slidenum">
+              <a:rPr lang="de-DE" smtClean="0"/>
+              <a:t>12</a:t>
+            </a:fld>
+            <a:endParaRPr lang="de-DE"/>
+          </a:p>
+        </p:txBody>
+      </p:sp>
+    </p:spTree>
+    <p:extLst>
+      <p:ext uri="{BB962C8B-B14F-4D97-AF65-F5344CB8AC3E}">
+        <p14:creationId xmlns:p14="http://schemas.microsoft.com/office/powerpoint/2010/main" val="174400954"/>
+      </p:ext>
+    </p:extLst>
+  </p:cSld>
+  <p:clrMapOvr>
+    <a:masterClrMapping/>
+  </p:clrMapOvr>
+</p:notes>
+</file>
+
+<file path=ppt/notesSlides/notesSlide13.xml><?xml version="1.0" encoding="utf-8"?>
+<p:notes xmlns:a="http://schemas.openxmlformats.org/drawingml/2006/main" xmlns:r="http://schemas.openxmlformats.org/officeDocument/2006/relationships" xmlns:p="http://schemas.openxmlformats.org/presentationml/2006/main">
+  <p:cSld>
+    <p:spTree>
+      <p:nvGrpSpPr>
+        <p:cNvPr id="1" name="">
+          <a:extLst>
+            <a:ext uri="{FF2B5EF4-FFF2-40B4-BE49-F238E27FC236}">
+              <a16:creationId xmlns:a16="http://schemas.microsoft.com/office/drawing/2014/main" id="{55543CAA-A8CE-7709-5327-D9B6BC2F008E}"/>
+            </a:ext>
+          </a:extLst>
+        </p:cNvPr>
+        <p:cNvGrpSpPr/>
+        <p:nvPr/>
+      </p:nvGrpSpPr>
+      <p:grpSpPr>
+        <a:xfrm>
+          <a:off x="0" y="0"/>
+          <a:ext cx="0" cy="0"/>
+          <a:chOff x="0" y="0"/>
+          <a:chExt cx="0" cy="0"/>
+        </a:xfrm>
+      </p:grpSpPr>
+      <p:sp>
+        <p:nvSpPr>
+          <p:cNvPr id="2" name="Folienbildplatzhalter 1">
+            <a:extLst>
+              <a:ext uri="{FF2B5EF4-FFF2-40B4-BE49-F238E27FC236}">
+                <a16:creationId xmlns:a16="http://schemas.microsoft.com/office/drawing/2014/main" id="{B85B7335-DE1D-57FF-AE99-769C200604F1}"/>
+              </a:ext>
+            </a:extLst>
+          </p:cNvPr>
+          <p:cNvSpPr>
+            <a:spLocks noGrp="1" noRot="1" noChangeAspect="1"/>
+          </p:cNvSpPr>
+          <p:nvPr>
+            <p:ph type="sldImg"/>
+          </p:nvPr>
+        </p:nvSpPr>
+        <p:spPr/>
+      </p:sp>
+      <p:sp>
+        <p:nvSpPr>
+          <p:cNvPr id="3" name="Notizenplatzhalter 2">
+            <a:extLst>
+              <a:ext uri="{FF2B5EF4-FFF2-40B4-BE49-F238E27FC236}">
+                <a16:creationId xmlns:a16="http://schemas.microsoft.com/office/drawing/2014/main" id="{E1D1BA96-E9BE-233A-F4E0-B1941A778689}"/>
+              </a:ext>
+            </a:extLst>
+          </p:cNvPr>
+          <p:cNvSpPr>
+            <a:spLocks noGrp="1"/>
+          </p:cNvSpPr>
+          <p:nvPr>
+            <p:ph type="body" idx="1"/>
+          </p:nvPr>
+        </p:nvSpPr>
+        <p:spPr/>
+        <p:txBody>
+          <a:bodyPr rtlCol="0"/>
+          <a:lstStyle/>
+          <a:p>
+            <a:pPr rtl="0"/>
+            <a:endParaRPr lang="de-DE"/>
+          </a:p>
+        </p:txBody>
+      </p:sp>
+      <p:sp>
+        <p:nvSpPr>
+          <p:cNvPr id="4" name="Foliennummernplatzhalter 3">
+            <a:extLst>
+              <a:ext uri="{FF2B5EF4-FFF2-40B4-BE49-F238E27FC236}">
+                <a16:creationId xmlns:a16="http://schemas.microsoft.com/office/drawing/2014/main" id="{F3DCF012-B479-4A5C-6447-956AD00F09D1}"/>
+              </a:ext>
+            </a:extLst>
+          </p:cNvPr>
+          <p:cNvSpPr>
+            <a:spLocks noGrp="1"/>
+          </p:cNvSpPr>
+          <p:nvPr>
+            <p:ph type="sldNum" sz="quarter" idx="5"/>
+          </p:nvPr>
+        </p:nvSpPr>
+        <p:spPr/>
+        <p:txBody>
+          <a:bodyPr rtlCol="0"/>
+          <a:lstStyle/>
+          <a:p>
+            <a:pPr rtl="0"/>
+            <a:fld id="{1734D747-9380-41EE-9946-EC9EC0CA5D1E}" type="slidenum">
+              <a:rPr lang="de-DE" smtClean="0"/>
+              <a:t>13</a:t>
+            </a:fld>
+            <a:endParaRPr lang="de-DE"/>
+          </a:p>
+        </p:txBody>
+      </p:sp>
+    </p:spTree>
+    <p:extLst>
+      <p:ext uri="{BB962C8B-B14F-4D97-AF65-F5344CB8AC3E}">
+        <p14:creationId xmlns:p14="http://schemas.microsoft.com/office/powerpoint/2010/main" val="2765553808"/>
+      </p:ext>
+    </p:extLst>
+  </p:cSld>
+  <p:clrMapOvr>
+    <a:masterClrMapping/>
+  </p:clrMapOvr>
+</p:notes>
+</file>
+
+<file path=ppt/notesSlides/notesSlide14.xml><?xml version="1.0" encoding="utf-8"?>
+<p:notes xmlns:a="http://schemas.openxmlformats.org/drawingml/2006/main" xmlns:r="http://schemas.openxmlformats.org/officeDocument/2006/relationships" xmlns:p="http://schemas.openxmlformats.org/presentationml/2006/main">
+  <p:cSld>
+    <p:spTree>
+      <p:nvGrpSpPr>
+        <p:cNvPr id="1" name="">
+          <a:extLst>
+            <a:ext uri="{FF2B5EF4-FFF2-40B4-BE49-F238E27FC236}">
               <a16:creationId xmlns:a16="http://schemas.microsoft.com/office/drawing/2014/main" id="{74A0B075-E8B0-7523-D043-DD824931182C}"/>
             </a:ext>
           </a:extLst>
@@ -1904,7 +2237,7 @@
             <a:pPr rtl="0"/>
             <a:fld id="{1734D747-9380-41EE-9946-EC9EC0CA5D1E}" type="slidenum">
               <a:rPr lang="de-DE" smtClean="0"/>
-              <a:t>11</a:t>
+              <a:t>14</a:t>
             </a:fld>
             <a:endParaRPr lang="de-DE"/>
           </a:p>
@@ -1923,7 +2256,7 @@
 </p:notes>
 </file>
 
-<file path=ppt/notesSlides/notesSlide12.xml><?xml version="1.0" encoding="utf-8"?>
+<file path=ppt/notesSlides/notesSlide15.xml><?xml version="1.0" encoding="utf-8"?>
 <p:notes xmlns:a="http://schemas.openxmlformats.org/drawingml/2006/main" xmlns:r="http://schemas.openxmlformats.org/officeDocument/2006/relationships" xmlns:p="http://schemas.openxmlformats.org/presentationml/2006/main">
   <p:cSld>
     <p:spTree>
@@ -2014,7 +2347,7 @@
             <a:pPr rtl="0"/>
             <a:fld id="{1734D747-9380-41EE-9946-EC9EC0CA5D1E}" type="slidenum">
               <a:rPr lang="de-DE" smtClean="0"/>
-              <a:t>12</a:t>
+              <a:t>15</a:t>
             </a:fld>
             <a:endParaRPr lang="de-DE"/>
           </a:p>
@@ -2033,7 +2366,7 @@
 </p:notes>
 </file>
 
-<file path=ppt/notesSlides/notesSlide13.xml><?xml version="1.0" encoding="utf-8"?>
+<file path=ppt/notesSlides/notesSlide16.xml><?xml version="1.0" encoding="utf-8"?>
 <p:notes xmlns:a="http://schemas.openxmlformats.org/drawingml/2006/main" xmlns:r="http://schemas.openxmlformats.org/officeDocument/2006/relationships" xmlns:p="http://schemas.openxmlformats.org/presentationml/2006/main">
   <p:cSld>
     <p:spTree>
@@ -2124,7 +2457,7 @@
             <a:pPr rtl="0"/>
             <a:fld id="{1734D747-9380-41EE-9946-EC9EC0CA5D1E}" type="slidenum">
               <a:rPr lang="de-DE" smtClean="0"/>
-              <a:t>13</a:t>
+              <a:t>16</a:t>
             </a:fld>
             <a:endParaRPr lang="de-DE"/>
           </a:p>
@@ -2143,7 +2476,7 @@
 </p:notes>
 </file>
 
-<file path=ppt/notesSlides/notesSlide14.xml><?xml version="1.0" encoding="utf-8"?>
+<file path=ppt/notesSlides/notesSlide17.xml><?xml version="1.0" encoding="utf-8"?>
 <p:notes xmlns:a="http://schemas.openxmlformats.org/drawingml/2006/main" xmlns:r="http://schemas.openxmlformats.org/officeDocument/2006/relationships" xmlns:p="http://schemas.openxmlformats.org/presentationml/2006/main">
   <p:cSld>
     <p:spTree>
@@ -2234,7 +2567,7 @@
             <a:pPr rtl="0"/>
             <a:fld id="{1734D747-9380-41EE-9946-EC9EC0CA5D1E}" type="slidenum">
               <a:rPr lang="de-DE" smtClean="0"/>
-              <a:t>14</a:t>
+              <a:t>17</a:t>
             </a:fld>
             <a:endParaRPr lang="de-DE"/>
           </a:p>
@@ -2253,7 +2586,7 @@
 </p:notes>
 </file>
 
-<file path=ppt/notesSlides/notesSlide15.xml><?xml version="1.0" encoding="utf-8"?>
+<file path=ppt/notesSlides/notesSlide18.xml><?xml version="1.0" encoding="utf-8"?>
 <p:notes xmlns:a="http://schemas.openxmlformats.org/drawingml/2006/main" xmlns:r="http://schemas.openxmlformats.org/officeDocument/2006/relationships" xmlns:p="http://schemas.openxmlformats.org/presentationml/2006/main">
   <p:cSld>
     <p:spTree>
@@ -2344,7 +2677,7 @@
             <a:pPr rtl="0"/>
             <a:fld id="{1734D747-9380-41EE-9946-EC9EC0CA5D1E}" type="slidenum">
               <a:rPr lang="de-DE" smtClean="0"/>
-              <a:t>15</a:t>
+              <a:t>18</a:t>
             </a:fld>
             <a:endParaRPr lang="de-DE"/>
           </a:p>
@@ -2354,288 +2687,6 @@
     <p:extLst>
       <p:ext uri="{BB962C8B-B14F-4D97-AF65-F5344CB8AC3E}">
         <p14:creationId xmlns:p14="http://schemas.microsoft.com/office/powerpoint/2010/main" val="1123493843"/>
-      </p:ext>
-    </p:extLst>
-  </p:cSld>
-  <p:clrMapOvr>
-    <a:masterClrMapping/>
-  </p:clrMapOvr>
-</p:notes>
-</file>
-
-<file path=ppt/notesSlides/notesSlide16.xml><?xml version="1.0" encoding="utf-8"?>
-<p:notes xmlns:a="http://schemas.openxmlformats.org/drawingml/2006/main" xmlns:r="http://schemas.openxmlformats.org/officeDocument/2006/relationships" xmlns:p="http://schemas.openxmlformats.org/presentationml/2006/main">
-  <p:cSld>
-    <p:spTree>
-      <p:nvGrpSpPr>
-        <p:cNvPr id="1" name=""/>
-        <p:cNvGrpSpPr/>
-        <p:nvPr/>
-      </p:nvGrpSpPr>
-      <p:grpSpPr>
-        <a:xfrm>
-          <a:off x="0" y="0"/>
-          <a:ext cx="0" cy="0"/>
-          <a:chOff x="0" y="0"/>
-          <a:chExt cx="0" cy="0"/>
-        </a:xfrm>
-      </p:grpSpPr>
-      <p:sp>
-        <p:nvSpPr>
-          <p:cNvPr id="2" name="Folienbildplatzhalter 1"/>
-          <p:cNvSpPr>
-            <a:spLocks noGrp="1" noRot="1" noChangeAspect="1"/>
-          </p:cNvSpPr>
-          <p:nvPr>
-            <p:ph type="sldImg"/>
-          </p:nvPr>
-        </p:nvSpPr>
-        <p:spPr/>
-      </p:sp>
-      <p:sp>
-        <p:nvSpPr>
-          <p:cNvPr id="3" name="Notizenplatzhalter 2"/>
-          <p:cNvSpPr>
-            <a:spLocks noGrp="1"/>
-          </p:cNvSpPr>
-          <p:nvPr>
-            <p:ph type="body" idx="1"/>
-          </p:nvPr>
-        </p:nvSpPr>
-        <p:spPr/>
-        <p:txBody>
-          <a:bodyPr rtlCol="0"/>
-          <a:lstStyle/>
-          <a:p>
-            <a:pPr rtl="0"/>
-            <a:endParaRPr lang="de-DE"/>
-          </a:p>
-        </p:txBody>
-      </p:sp>
-      <p:sp>
-        <p:nvSpPr>
-          <p:cNvPr id="4" name="Foliennummernplatzhalter 3"/>
-          <p:cNvSpPr>
-            <a:spLocks noGrp="1"/>
-          </p:cNvSpPr>
-          <p:nvPr>
-            <p:ph type="sldNum" sz="quarter" idx="5"/>
-          </p:nvPr>
-        </p:nvSpPr>
-        <p:spPr/>
-        <p:txBody>
-          <a:bodyPr rtlCol="0"/>
-          <a:lstStyle/>
-          <a:p>
-            <a:pPr rtl="0"/>
-            <a:fld id="{1734D747-9380-41EE-9946-EC9EC0CA5D1E}" type="slidenum">
-              <a:rPr lang="de-DE" smtClean="0"/>
-              <a:t>16</a:t>
-            </a:fld>
-            <a:endParaRPr lang="de-DE"/>
-          </a:p>
-        </p:txBody>
-      </p:sp>
-    </p:spTree>
-    <p:extLst>
-      <p:ext uri="{BB962C8B-B14F-4D97-AF65-F5344CB8AC3E}">
-        <p14:creationId xmlns:p14="http://schemas.microsoft.com/office/powerpoint/2010/main" val="147783104"/>
-      </p:ext>
-    </p:extLst>
-  </p:cSld>
-  <p:clrMapOvr>
-    <a:masterClrMapping/>
-  </p:clrMapOvr>
-</p:notes>
-</file>
-
-<file path=ppt/notesSlides/notesSlide17.xml><?xml version="1.0" encoding="utf-8"?>
-<p:notes xmlns:a="http://schemas.openxmlformats.org/drawingml/2006/main" xmlns:r="http://schemas.openxmlformats.org/officeDocument/2006/relationships" xmlns:p="http://schemas.openxmlformats.org/presentationml/2006/main">
-  <p:cSld>
-    <p:spTree>
-      <p:nvGrpSpPr>
-        <p:cNvPr id="1" name="">
-          <a:extLst>
-            <a:ext uri="{FF2B5EF4-FFF2-40B4-BE49-F238E27FC236}">
-              <a16:creationId xmlns:a16="http://schemas.microsoft.com/office/drawing/2014/main" id="{48BB64BF-E84E-E740-96DA-D9AA1F314E0C}"/>
-            </a:ext>
-          </a:extLst>
-        </p:cNvPr>
-        <p:cNvGrpSpPr/>
-        <p:nvPr/>
-      </p:nvGrpSpPr>
-      <p:grpSpPr>
-        <a:xfrm>
-          <a:off x="0" y="0"/>
-          <a:ext cx="0" cy="0"/>
-          <a:chOff x="0" y="0"/>
-          <a:chExt cx="0" cy="0"/>
-        </a:xfrm>
-      </p:grpSpPr>
-      <p:sp>
-        <p:nvSpPr>
-          <p:cNvPr id="2" name="Folienbildplatzhalter 1">
-            <a:extLst>
-              <a:ext uri="{FF2B5EF4-FFF2-40B4-BE49-F238E27FC236}">
-                <a16:creationId xmlns:a16="http://schemas.microsoft.com/office/drawing/2014/main" id="{87FFA04B-E944-0521-A7BF-500473CFF5FB}"/>
-              </a:ext>
-            </a:extLst>
-          </p:cNvPr>
-          <p:cNvSpPr>
-            <a:spLocks noGrp="1" noRot="1" noChangeAspect="1"/>
-          </p:cNvSpPr>
-          <p:nvPr>
-            <p:ph type="sldImg"/>
-          </p:nvPr>
-        </p:nvSpPr>
-        <p:spPr/>
-      </p:sp>
-      <p:sp>
-        <p:nvSpPr>
-          <p:cNvPr id="3" name="Notizenplatzhalter 2">
-            <a:extLst>
-              <a:ext uri="{FF2B5EF4-FFF2-40B4-BE49-F238E27FC236}">
-                <a16:creationId xmlns:a16="http://schemas.microsoft.com/office/drawing/2014/main" id="{893CB337-6096-066B-F885-3A5CC6E635AB}"/>
-              </a:ext>
-            </a:extLst>
-          </p:cNvPr>
-          <p:cNvSpPr>
-            <a:spLocks noGrp="1"/>
-          </p:cNvSpPr>
-          <p:nvPr>
-            <p:ph type="body" idx="1"/>
-          </p:nvPr>
-        </p:nvSpPr>
-        <p:spPr/>
-        <p:txBody>
-          <a:bodyPr rtlCol="0"/>
-          <a:lstStyle/>
-          <a:p>
-            <a:pPr rtl="0"/>
-            <a:endParaRPr lang="de-DE"/>
-          </a:p>
-        </p:txBody>
-      </p:sp>
-      <p:sp>
-        <p:nvSpPr>
-          <p:cNvPr id="4" name="Foliennummernplatzhalter 3">
-            <a:extLst>
-              <a:ext uri="{FF2B5EF4-FFF2-40B4-BE49-F238E27FC236}">
-                <a16:creationId xmlns:a16="http://schemas.microsoft.com/office/drawing/2014/main" id="{5A627818-713A-BA6C-97FB-849E046AC044}"/>
-              </a:ext>
-            </a:extLst>
-          </p:cNvPr>
-          <p:cNvSpPr>
-            <a:spLocks noGrp="1"/>
-          </p:cNvSpPr>
-          <p:nvPr>
-            <p:ph type="sldNum" sz="quarter" idx="5"/>
-          </p:nvPr>
-        </p:nvSpPr>
-        <p:spPr/>
-        <p:txBody>
-          <a:bodyPr rtlCol="0"/>
-          <a:lstStyle/>
-          <a:p>
-            <a:pPr rtl="0"/>
-            <a:fld id="{1734D747-9380-41EE-9946-EC9EC0CA5D1E}" type="slidenum">
-              <a:rPr lang="de-DE" smtClean="0"/>
-              <a:t>18</a:t>
-            </a:fld>
-            <a:endParaRPr lang="de-DE"/>
-          </a:p>
-        </p:txBody>
-      </p:sp>
-    </p:spTree>
-    <p:extLst>
-      <p:ext uri="{BB962C8B-B14F-4D97-AF65-F5344CB8AC3E}">
-        <p14:creationId xmlns:p14="http://schemas.microsoft.com/office/powerpoint/2010/main" val="1468440959"/>
-      </p:ext>
-    </p:extLst>
-  </p:cSld>
-  <p:clrMapOvr>
-    <a:masterClrMapping/>
-  </p:clrMapOvr>
-</p:notes>
-</file>
-
-<file path=ppt/notesSlides/notesSlide18.xml><?xml version="1.0" encoding="utf-8"?>
-<p:notes xmlns:a="http://schemas.openxmlformats.org/drawingml/2006/main" xmlns:r="http://schemas.openxmlformats.org/officeDocument/2006/relationships" xmlns:p="http://schemas.openxmlformats.org/presentationml/2006/main">
-  <p:cSld>
-    <p:spTree>
-      <p:nvGrpSpPr>
-        <p:cNvPr id="1" name=""/>
-        <p:cNvGrpSpPr/>
-        <p:nvPr/>
-      </p:nvGrpSpPr>
-      <p:grpSpPr>
-        <a:xfrm>
-          <a:off x="0" y="0"/>
-          <a:ext cx="0" cy="0"/>
-          <a:chOff x="0" y="0"/>
-          <a:chExt cx="0" cy="0"/>
-        </a:xfrm>
-      </p:grpSpPr>
-      <p:sp>
-        <p:nvSpPr>
-          <p:cNvPr id="2" name="Folienbildplatzhalter 1"/>
-          <p:cNvSpPr>
-            <a:spLocks noGrp="1" noRot="1" noChangeAspect="1"/>
-          </p:cNvSpPr>
-          <p:nvPr>
-            <p:ph type="sldImg"/>
-          </p:nvPr>
-        </p:nvSpPr>
-        <p:spPr/>
-      </p:sp>
-      <p:sp>
-        <p:nvSpPr>
-          <p:cNvPr id="3" name="Notizenplatzhalter 2"/>
-          <p:cNvSpPr>
-            <a:spLocks noGrp="1"/>
-          </p:cNvSpPr>
-          <p:nvPr>
-            <p:ph type="body" idx="1"/>
-          </p:nvPr>
-        </p:nvSpPr>
-        <p:spPr/>
-        <p:txBody>
-          <a:bodyPr rtlCol="0"/>
-          <a:lstStyle/>
-          <a:p>
-            <a:pPr rtl="0"/>
-            <a:endParaRPr lang="de-DE"/>
-          </a:p>
-        </p:txBody>
-      </p:sp>
-      <p:sp>
-        <p:nvSpPr>
-          <p:cNvPr id="4" name="Foliennummernplatzhalter 3"/>
-          <p:cNvSpPr>
-            <a:spLocks noGrp="1"/>
-          </p:cNvSpPr>
-          <p:nvPr>
-            <p:ph type="sldNum" sz="quarter" idx="5"/>
-          </p:nvPr>
-        </p:nvSpPr>
-        <p:spPr/>
-        <p:txBody>
-          <a:bodyPr rtlCol="0"/>
-          <a:lstStyle/>
-          <a:p>
-            <a:pPr rtl="0"/>
-            <a:fld id="{1734D747-9380-41EE-9946-EC9EC0CA5D1E}" type="slidenum">
-              <a:rPr lang="de-DE" smtClean="0"/>
-              <a:t>19</a:t>
-            </a:fld>
-            <a:endParaRPr lang="de-DE"/>
-          </a:p>
-        </p:txBody>
-      </p:sp>
-    </p:spTree>
-    <p:extLst>
-      <p:ext uri="{BB962C8B-B14F-4D97-AF65-F5344CB8AC3E}">
-        <p14:creationId xmlns:p14="http://schemas.microsoft.com/office/powerpoint/2010/main" val="2223578390"/>
       </p:ext>
     </p:extLst>
   </p:cSld>
@@ -2712,7 +2763,7 @@
             <a:pPr rtl="0"/>
             <a:fld id="{1734D747-9380-41EE-9946-EC9EC0CA5D1E}" type="slidenum">
               <a:rPr lang="de-DE" smtClean="0"/>
-              <a:t>20</a:t>
+              <a:t>19</a:t>
             </a:fld>
             <a:endParaRPr lang="de-DE"/>
           </a:p>
@@ -2721,7 +2772,7 @@
     </p:spTree>
     <p:extLst>
       <p:ext uri="{BB962C8B-B14F-4D97-AF65-F5344CB8AC3E}">
-        <p14:creationId xmlns:p14="http://schemas.microsoft.com/office/powerpoint/2010/main" val="1841121318"/>
+        <p14:creationId xmlns:p14="http://schemas.microsoft.com/office/powerpoint/2010/main" val="147783104"/>
       </p:ext>
     </p:extLst>
   </p:cSld>
@@ -2846,7 +2897,13 @@
   <p:cSld>
     <p:spTree>
       <p:nvGrpSpPr>
-        <p:cNvPr id="1" name=""/>
+        <p:cNvPr id="1" name="">
+          <a:extLst>
+            <a:ext uri="{FF2B5EF4-FFF2-40B4-BE49-F238E27FC236}">
+              <a16:creationId xmlns:a16="http://schemas.microsoft.com/office/drawing/2014/main" id="{48BB64BF-E84E-E740-96DA-D9AA1F314E0C}"/>
+            </a:ext>
+          </a:extLst>
+        </p:cNvPr>
         <p:cNvGrpSpPr/>
         <p:nvPr/>
       </p:nvGrpSpPr>
@@ -2860,7 +2917,13 @@
       </p:grpSpPr>
       <p:sp>
         <p:nvSpPr>
-          <p:cNvPr id="2" name="Folienbildplatzhalter 1"/>
+          <p:cNvPr id="2" name="Folienbildplatzhalter 1">
+            <a:extLst>
+              <a:ext uri="{FF2B5EF4-FFF2-40B4-BE49-F238E27FC236}">
+                <a16:creationId xmlns:a16="http://schemas.microsoft.com/office/drawing/2014/main" id="{87FFA04B-E944-0521-A7BF-500473CFF5FB}"/>
+              </a:ext>
+            </a:extLst>
+          </p:cNvPr>
           <p:cNvSpPr>
             <a:spLocks noGrp="1" noRot="1" noChangeAspect="1"/>
           </p:cNvSpPr>
@@ -2872,7 +2935,13 @@
       </p:sp>
       <p:sp>
         <p:nvSpPr>
-          <p:cNvPr id="3" name="Notizenplatzhalter 2"/>
+          <p:cNvPr id="3" name="Notizenplatzhalter 2">
+            <a:extLst>
+              <a:ext uri="{FF2B5EF4-FFF2-40B4-BE49-F238E27FC236}">
+                <a16:creationId xmlns:a16="http://schemas.microsoft.com/office/drawing/2014/main" id="{893CB337-6096-066B-F885-3A5CC6E635AB}"/>
+              </a:ext>
+            </a:extLst>
+          </p:cNvPr>
           <p:cNvSpPr>
             <a:spLocks noGrp="1"/>
           </p:cNvSpPr>
@@ -2892,7 +2961,13 @@
       </p:sp>
       <p:sp>
         <p:nvSpPr>
-          <p:cNvPr id="4" name="Foliennummernplatzhalter 3"/>
+          <p:cNvPr id="4" name="Foliennummernplatzhalter 3">
+            <a:extLst>
+              <a:ext uri="{FF2B5EF4-FFF2-40B4-BE49-F238E27FC236}">
+                <a16:creationId xmlns:a16="http://schemas.microsoft.com/office/drawing/2014/main" id="{5A627818-713A-BA6C-97FB-849E046AC044}"/>
+              </a:ext>
+            </a:extLst>
+          </p:cNvPr>
           <p:cNvSpPr>
             <a:spLocks noGrp="1"/>
           </p:cNvSpPr>
@@ -2917,7 +2992,7 @@
     </p:spTree>
     <p:extLst>
       <p:ext uri="{BB962C8B-B14F-4D97-AF65-F5344CB8AC3E}">
-        <p14:creationId xmlns:p14="http://schemas.microsoft.com/office/powerpoint/2010/main" val="1802593720"/>
+        <p14:creationId xmlns:p14="http://schemas.microsoft.com/office/powerpoint/2010/main" val="1468440959"/>
       </p:ext>
     </p:extLst>
   </p:cSld>
@@ -3003,7 +3078,7 @@
     </p:spTree>
     <p:extLst>
       <p:ext uri="{BB962C8B-B14F-4D97-AF65-F5344CB8AC3E}">
-        <p14:creationId xmlns:p14="http://schemas.microsoft.com/office/powerpoint/2010/main" val="3799446063"/>
+        <p14:creationId xmlns:p14="http://schemas.microsoft.com/office/powerpoint/2010/main" val="2223578390"/>
       </p:ext>
     </p:extLst>
   </p:cSld>
@@ -3089,7 +3164,7 @@
     </p:spTree>
     <p:extLst>
       <p:ext uri="{BB962C8B-B14F-4D97-AF65-F5344CB8AC3E}">
-        <p14:creationId xmlns:p14="http://schemas.microsoft.com/office/powerpoint/2010/main" val="3658271123"/>
+        <p14:creationId xmlns:p14="http://schemas.microsoft.com/office/powerpoint/2010/main" val="1841121318"/>
       </p:ext>
     </p:extLst>
   </p:cSld>
@@ -3175,7 +3250,7 @@
     </p:spTree>
     <p:extLst>
       <p:ext uri="{BB962C8B-B14F-4D97-AF65-F5344CB8AC3E}">
-        <p14:creationId xmlns:p14="http://schemas.microsoft.com/office/powerpoint/2010/main" val="1427706640"/>
+        <p14:creationId xmlns:p14="http://schemas.microsoft.com/office/powerpoint/2010/main" val="1802593720"/>
       </p:ext>
     </p:extLst>
   </p:cSld>
@@ -3261,7 +3336,7 @@
     </p:spTree>
     <p:extLst>
       <p:ext uri="{BB962C8B-B14F-4D97-AF65-F5344CB8AC3E}">
-        <p14:creationId xmlns:p14="http://schemas.microsoft.com/office/powerpoint/2010/main" val="2002461683"/>
+        <p14:creationId xmlns:p14="http://schemas.microsoft.com/office/powerpoint/2010/main" val="3799446063"/>
       </p:ext>
     </p:extLst>
   </p:cSld>
@@ -3339,6 +3414,264 @@
             <a:fld id="{1734D747-9380-41EE-9946-EC9EC0CA5D1E}" type="slidenum">
               <a:rPr lang="de-DE" smtClean="0"/>
               <a:t>26</a:t>
+            </a:fld>
+            <a:endParaRPr lang="de-DE"/>
+          </a:p>
+        </p:txBody>
+      </p:sp>
+    </p:spTree>
+    <p:extLst>
+      <p:ext uri="{BB962C8B-B14F-4D97-AF65-F5344CB8AC3E}">
+        <p14:creationId xmlns:p14="http://schemas.microsoft.com/office/powerpoint/2010/main" val="3658271123"/>
+      </p:ext>
+    </p:extLst>
+  </p:cSld>
+  <p:clrMapOvr>
+    <a:masterClrMapping/>
+  </p:clrMapOvr>
+</p:notes>
+</file>
+
+<file path=ppt/notesSlides/notesSlide26.xml><?xml version="1.0" encoding="utf-8"?>
+<p:notes xmlns:a="http://schemas.openxmlformats.org/drawingml/2006/main" xmlns:r="http://schemas.openxmlformats.org/officeDocument/2006/relationships" xmlns:p="http://schemas.openxmlformats.org/presentationml/2006/main">
+  <p:cSld>
+    <p:spTree>
+      <p:nvGrpSpPr>
+        <p:cNvPr id="1" name=""/>
+        <p:cNvGrpSpPr/>
+        <p:nvPr/>
+      </p:nvGrpSpPr>
+      <p:grpSpPr>
+        <a:xfrm>
+          <a:off x="0" y="0"/>
+          <a:ext cx="0" cy="0"/>
+          <a:chOff x="0" y="0"/>
+          <a:chExt cx="0" cy="0"/>
+        </a:xfrm>
+      </p:grpSpPr>
+      <p:sp>
+        <p:nvSpPr>
+          <p:cNvPr id="2" name="Folienbildplatzhalter 1"/>
+          <p:cNvSpPr>
+            <a:spLocks noGrp="1" noRot="1" noChangeAspect="1"/>
+          </p:cNvSpPr>
+          <p:nvPr>
+            <p:ph type="sldImg"/>
+          </p:nvPr>
+        </p:nvSpPr>
+        <p:spPr/>
+      </p:sp>
+      <p:sp>
+        <p:nvSpPr>
+          <p:cNvPr id="3" name="Notizenplatzhalter 2"/>
+          <p:cNvSpPr>
+            <a:spLocks noGrp="1"/>
+          </p:cNvSpPr>
+          <p:nvPr>
+            <p:ph type="body" idx="1"/>
+          </p:nvPr>
+        </p:nvSpPr>
+        <p:spPr/>
+        <p:txBody>
+          <a:bodyPr rtlCol="0"/>
+          <a:lstStyle/>
+          <a:p>
+            <a:pPr rtl="0"/>
+            <a:endParaRPr lang="de-DE"/>
+          </a:p>
+        </p:txBody>
+      </p:sp>
+      <p:sp>
+        <p:nvSpPr>
+          <p:cNvPr id="4" name="Foliennummernplatzhalter 3"/>
+          <p:cNvSpPr>
+            <a:spLocks noGrp="1"/>
+          </p:cNvSpPr>
+          <p:nvPr>
+            <p:ph type="sldNum" sz="quarter" idx="5"/>
+          </p:nvPr>
+        </p:nvSpPr>
+        <p:spPr/>
+        <p:txBody>
+          <a:bodyPr rtlCol="0"/>
+          <a:lstStyle/>
+          <a:p>
+            <a:pPr rtl="0"/>
+            <a:fld id="{1734D747-9380-41EE-9946-EC9EC0CA5D1E}" type="slidenum">
+              <a:rPr lang="de-DE" smtClean="0"/>
+              <a:t>27</a:t>
+            </a:fld>
+            <a:endParaRPr lang="de-DE"/>
+          </a:p>
+        </p:txBody>
+      </p:sp>
+    </p:spTree>
+    <p:extLst>
+      <p:ext uri="{BB962C8B-B14F-4D97-AF65-F5344CB8AC3E}">
+        <p14:creationId xmlns:p14="http://schemas.microsoft.com/office/powerpoint/2010/main" val="1427706640"/>
+      </p:ext>
+    </p:extLst>
+  </p:cSld>
+  <p:clrMapOvr>
+    <a:masterClrMapping/>
+  </p:clrMapOvr>
+</p:notes>
+</file>
+
+<file path=ppt/notesSlides/notesSlide27.xml><?xml version="1.0" encoding="utf-8"?>
+<p:notes xmlns:a="http://schemas.openxmlformats.org/drawingml/2006/main" xmlns:r="http://schemas.openxmlformats.org/officeDocument/2006/relationships" xmlns:p="http://schemas.openxmlformats.org/presentationml/2006/main">
+  <p:cSld>
+    <p:spTree>
+      <p:nvGrpSpPr>
+        <p:cNvPr id="1" name=""/>
+        <p:cNvGrpSpPr/>
+        <p:nvPr/>
+      </p:nvGrpSpPr>
+      <p:grpSpPr>
+        <a:xfrm>
+          <a:off x="0" y="0"/>
+          <a:ext cx="0" cy="0"/>
+          <a:chOff x="0" y="0"/>
+          <a:chExt cx="0" cy="0"/>
+        </a:xfrm>
+      </p:grpSpPr>
+      <p:sp>
+        <p:nvSpPr>
+          <p:cNvPr id="2" name="Folienbildplatzhalter 1"/>
+          <p:cNvSpPr>
+            <a:spLocks noGrp="1" noRot="1" noChangeAspect="1"/>
+          </p:cNvSpPr>
+          <p:nvPr>
+            <p:ph type="sldImg"/>
+          </p:nvPr>
+        </p:nvSpPr>
+        <p:spPr/>
+      </p:sp>
+      <p:sp>
+        <p:nvSpPr>
+          <p:cNvPr id="3" name="Notizenplatzhalter 2"/>
+          <p:cNvSpPr>
+            <a:spLocks noGrp="1"/>
+          </p:cNvSpPr>
+          <p:nvPr>
+            <p:ph type="body" idx="1"/>
+          </p:nvPr>
+        </p:nvSpPr>
+        <p:spPr/>
+        <p:txBody>
+          <a:bodyPr rtlCol="0"/>
+          <a:lstStyle/>
+          <a:p>
+            <a:pPr rtl="0"/>
+            <a:endParaRPr lang="de-DE"/>
+          </a:p>
+        </p:txBody>
+      </p:sp>
+      <p:sp>
+        <p:nvSpPr>
+          <p:cNvPr id="4" name="Foliennummernplatzhalter 3"/>
+          <p:cNvSpPr>
+            <a:spLocks noGrp="1"/>
+          </p:cNvSpPr>
+          <p:nvPr>
+            <p:ph type="sldNum" sz="quarter" idx="5"/>
+          </p:nvPr>
+        </p:nvSpPr>
+        <p:spPr/>
+        <p:txBody>
+          <a:bodyPr rtlCol="0"/>
+          <a:lstStyle/>
+          <a:p>
+            <a:pPr rtl="0"/>
+            <a:fld id="{1734D747-9380-41EE-9946-EC9EC0CA5D1E}" type="slidenum">
+              <a:rPr lang="de-DE" smtClean="0"/>
+              <a:t>28</a:t>
+            </a:fld>
+            <a:endParaRPr lang="de-DE"/>
+          </a:p>
+        </p:txBody>
+      </p:sp>
+    </p:spTree>
+    <p:extLst>
+      <p:ext uri="{BB962C8B-B14F-4D97-AF65-F5344CB8AC3E}">
+        <p14:creationId xmlns:p14="http://schemas.microsoft.com/office/powerpoint/2010/main" val="2002461683"/>
+      </p:ext>
+    </p:extLst>
+  </p:cSld>
+  <p:clrMapOvr>
+    <a:masterClrMapping/>
+  </p:clrMapOvr>
+</p:notes>
+</file>
+
+<file path=ppt/notesSlides/notesSlide28.xml><?xml version="1.0" encoding="utf-8"?>
+<p:notes xmlns:a="http://schemas.openxmlformats.org/drawingml/2006/main" xmlns:r="http://schemas.openxmlformats.org/officeDocument/2006/relationships" xmlns:p="http://schemas.openxmlformats.org/presentationml/2006/main">
+  <p:cSld>
+    <p:spTree>
+      <p:nvGrpSpPr>
+        <p:cNvPr id="1" name=""/>
+        <p:cNvGrpSpPr/>
+        <p:nvPr/>
+      </p:nvGrpSpPr>
+      <p:grpSpPr>
+        <a:xfrm>
+          <a:off x="0" y="0"/>
+          <a:ext cx="0" cy="0"/>
+          <a:chOff x="0" y="0"/>
+          <a:chExt cx="0" cy="0"/>
+        </a:xfrm>
+      </p:grpSpPr>
+      <p:sp>
+        <p:nvSpPr>
+          <p:cNvPr id="2" name="Folienbildplatzhalter 1"/>
+          <p:cNvSpPr>
+            <a:spLocks noGrp="1" noRot="1" noChangeAspect="1"/>
+          </p:cNvSpPr>
+          <p:nvPr>
+            <p:ph type="sldImg"/>
+          </p:nvPr>
+        </p:nvSpPr>
+        <p:spPr/>
+      </p:sp>
+      <p:sp>
+        <p:nvSpPr>
+          <p:cNvPr id="3" name="Notizenplatzhalter 2"/>
+          <p:cNvSpPr>
+            <a:spLocks noGrp="1"/>
+          </p:cNvSpPr>
+          <p:nvPr>
+            <p:ph type="body" idx="1"/>
+          </p:nvPr>
+        </p:nvSpPr>
+        <p:spPr/>
+        <p:txBody>
+          <a:bodyPr rtlCol="0"/>
+          <a:lstStyle/>
+          <a:p>
+            <a:pPr rtl="0"/>
+            <a:endParaRPr lang="de-DE"/>
+          </a:p>
+        </p:txBody>
+      </p:sp>
+      <p:sp>
+        <p:nvSpPr>
+          <p:cNvPr id="4" name="Foliennummernplatzhalter 3"/>
+          <p:cNvSpPr>
+            <a:spLocks noGrp="1"/>
+          </p:cNvSpPr>
+          <p:nvPr>
+            <p:ph type="sldNum" sz="quarter" idx="5"/>
+          </p:nvPr>
+        </p:nvSpPr>
+        <p:spPr/>
+        <p:txBody>
+          <a:bodyPr rtlCol="0"/>
+          <a:lstStyle/>
+          <a:p>
+            <a:pPr rtl="0"/>
+            <a:fld id="{1734D747-9380-41EE-9946-EC9EC0CA5D1E}" type="slidenum">
+              <a:rPr lang="de-DE" smtClean="0"/>
+              <a:t>29</a:t>
             </a:fld>
             <a:endParaRPr lang="de-DE"/>
           </a:p>
@@ -27940,7 +28273,7 @@
         <p:cNvPr id="1" name="">
           <a:extLst>
             <a:ext uri="{FF2B5EF4-FFF2-40B4-BE49-F238E27FC236}">
-              <a16:creationId xmlns:a16="http://schemas.microsoft.com/office/drawing/2014/main" id="{BB42AECB-326B-F9D0-6570-57D6DED3CE68}"/>
+              <a16:creationId xmlns:a16="http://schemas.microsoft.com/office/drawing/2014/main" id="{08F23CA4-89F3-244A-87AA-803F6C4038B9}"/>
             </a:ext>
           </a:extLst>
         </p:cNvPr>
@@ -27957,10 +28290,10 @@
       </p:grpSpPr>
       <p:sp>
         <p:nvSpPr>
-          <p:cNvPr id="4" name="Titel 3">
-            <a:extLst>
-              <a:ext uri="{FF2B5EF4-FFF2-40B4-BE49-F238E27FC236}">
-                <a16:creationId xmlns:a16="http://schemas.microsoft.com/office/drawing/2014/main" id="{67E49FFA-0C2D-0264-B7CB-9B40C432FA4C}"/>
+          <p:cNvPr id="7" name="Titel 6">
+            <a:extLst>
+              <a:ext uri="{FF2B5EF4-FFF2-40B4-BE49-F238E27FC236}">
+                <a16:creationId xmlns:a16="http://schemas.microsoft.com/office/drawing/2014/main" id="{93493556-C3C0-75A0-26E8-FFF00BFF896B}"/>
               </a:ext>
             </a:extLst>
           </p:cNvPr>
@@ -27971,41 +28304,25 @@
             <p:ph type="title"/>
           </p:nvPr>
         </p:nvSpPr>
-        <p:spPr>
-          <a:xfrm>
-            <a:off x="832103" y="3886200"/>
-            <a:ext cx="10159747" cy="859055"/>
-          </a:xfrm>
-        </p:spPr>
+        <p:spPr/>
         <p:txBody>
-          <a:bodyPr rtlCol="0">
-            <a:normAutofit/>
-          </a:bodyPr>
+          <a:bodyPr rtlCol="0"/>
           <a:lstStyle/>
           <a:p>
             <a:pPr rtl="0"/>
             <a:r>
-              <a:rPr lang="de-DE" dirty="0" err="1"/>
-              <a:t>Lessons</a:t>
+              <a:rPr lang="de-DE" dirty="0"/>
+              <a:t>Zusammenarbeit &amp; Kommunikation</a:t>
             </a:r>
-            <a:r>
-              <a:rPr lang="de-DE" dirty="0"/>
-              <a:t> </a:t>
-            </a:r>
-            <a:r>
-              <a:rPr lang="de-DE" dirty="0" err="1"/>
-              <a:t>learned</a:t>
-            </a:r>
-            <a:endParaRPr lang="de-DE" dirty="0"/>
           </a:p>
         </p:txBody>
       </p:sp>
       <p:sp>
         <p:nvSpPr>
-          <p:cNvPr id="5" name="Textplatzhalter 4">
-            <a:extLst>
-              <a:ext uri="{FF2B5EF4-FFF2-40B4-BE49-F238E27FC236}">
-                <a16:creationId xmlns:a16="http://schemas.microsoft.com/office/drawing/2014/main" id="{4BA5F54E-D4B4-2445-E186-042508035F80}"/>
+          <p:cNvPr id="10" name="Textplatzhalter 9">
+            <a:extLst>
+              <a:ext uri="{FF2B5EF4-FFF2-40B4-BE49-F238E27FC236}">
+                <a16:creationId xmlns:a16="http://schemas.microsoft.com/office/drawing/2014/main" id="{F41DB8CF-03D5-B925-7D13-7D6FF69D04F6}"/>
               </a:ext>
             </a:extLst>
           </p:cNvPr>
@@ -28013,7 +28330,7 @@
             <a:spLocks noGrp="1"/>
           </p:cNvSpPr>
           <p:nvPr>
-            <p:ph type="body" idx="1"/>
+            <p:ph type="body" sz="quarter" idx="13"/>
           </p:nvPr>
         </p:nvSpPr>
         <p:spPr/>
@@ -28023,10 +28340,24 @@
           <a:p>
             <a:pPr rtl="0"/>
             <a:r>
-              <a:rPr lang="de-DE"/>
-              <a:t>Untertitel</a:t>
+              <a:rPr lang="de-DE" dirty="0"/>
+              <a:t>Initiales Kick-off-Meeting zur Rollenverteilung</a:t>
             </a:r>
           </a:p>
+          <a:p>
+            <a:pPr rtl="0"/>
+            <a:r>
+              <a:rPr lang="de-DE" dirty="0"/>
+              <a:t>Absprachen bei Bedarf über WhatsApp</a:t>
+            </a:r>
+          </a:p>
+          <a:p>
+            <a:pPr rtl="0"/>
+            <a:r>
+              <a:rPr lang="de-DE" dirty="0"/>
+              <a:t>Wöchentliche Treffen während der Vorlesungszeit (MS Teams oder vor Ort)</a:t>
+            </a:r>
+          </a:p>
         </p:txBody>
       </p:sp>
       <p:sp>
@@ -28034,7 +28365,7 @@
           <p:cNvPr id="2" name="Foliennummernplatzhalter 1">
             <a:extLst>
               <a:ext uri="{FF2B5EF4-FFF2-40B4-BE49-F238E27FC236}">
-                <a16:creationId xmlns:a16="http://schemas.microsoft.com/office/drawing/2014/main" id="{1CE2D10D-7E59-13B9-2104-D164C228DFA1}"/>
+                <a16:creationId xmlns:a16="http://schemas.microsoft.com/office/drawing/2014/main" id="{779684CC-9035-21AD-5A74-3FD15B270569}"/>
               </a:ext>
             </a:extLst>
           </p:cNvPr>
@@ -28063,7 +28394,7 @@
     </p:spTree>
     <p:extLst>
       <p:ext uri="{BB962C8B-B14F-4D97-AF65-F5344CB8AC3E}">
-        <p14:creationId xmlns:p14="http://schemas.microsoft.com/office/powerpoint/2010/main" val="533201138"/>
+        <p14:creationId xmlns:p14="http://schemas.microsoft.com/office/powerpoint/2010/main" val="1108612514"/>
       </p:ext>
     </p:extLst>
   </p:cSld>
@@ -28093,7 +28424,7 @@
         <p:cNvPr id="1" name="">
           <a:extLst>
             <a:ext uri="{FF2B5EF4-FFF2-40B4-BE49-F238E27FC236}">
-              <a16:creationId xmlns:a16="http://schemas.microsoft.com/office/drawing/2014/main" id="{36524055-5218-7EFD-E5BB-9F3140E56AA2}"/>
+              <a16:creationId xmlns:a16="http://schemas.microsoft.com/office/drawing/2014/main" id="{D2D25985-9691-6BE9-D560-91989D85572E}"/>
             </a:ext>
           </a:extLst>
         </p:cNvPr>
@@ -28110,10 +28441,10 @@
       </p:grpSpPr>
       <p:sp>
         <p:nvSpPr>
-          <p:cNvPr id="4" name="Titel 3">
-            <a:extLst>
-              <a:ext uri="{FF2B5EF4-FFF2-40B4-BE49-F238E27FC236}">
-                <a16:creationId xmlns:a16="http://schemas.microsoft.com/office/drawing/2014/main" id="{3CDC6B14-C700-749A-7C19-C649E6AD5F50}"/>
+          <p:cNvPr id="7" name="Titel 6">
+            <a:extLst>
+              <a:ext uri="{FF2B5EF4-FFF2-40B4-BE49-F238E27FC236}">
+                <a16:creationId xmlns:a16="http://schemas.microsoft.com/office/drawing/2014/main" id="{8907D902-EBB8-6C96-7B64-4377294A3F93}"/>
               </a:ext>
             </a:extLst>
           </p:cNvPr>
@@ -28124,32 +28455,25 @@
             <p:ph type="title"/>
           </p:nvPr>
         </p:nvSpPr>
-        <p:spPr>
-          <a:xfrm>
-            <a:off x="832103" y="3886200"/>
-            <a:ext cx="10159747" cy="859055"/>
-          </a:xfrm>
-        </p:spPr>
+        <p:spPr/>
         <p:txBody>
-          <a:bodyPr rtlCol="0">
-            <a:normAutofit/>
-          </a:bodyPr>
+          <a:bodyPr rtlCol="0"/>
           <a:lstStyle/>
           <a:p>
             <a:pPr rtl="0"/>
             <a:r>
               <a:rPr lang="de-DE" dirty="0"/>
-              <a:t>Design</a:t>
+              <a:t>Teamstruktur &amp; Aufgabenverteilung</a:t>
             </a:r>
           </a:p>
         </p:txBody>
       </p:sp>
       <p:sp>
         <p:nvSpPr>
-          <p:cNvPr id="5" name="Textplatzhalter 4">
-            <a:extLst>
-              <a:ext uri="{FF2B5EF4-FFF2-40B4-BE49-F238E27FC236}">
-                <a16:creationId xmlns:a16="http://schemas.microsoft.com/office/drawing/2014/main" id="{882CB1AC-2F11-4860-FD50-96C1DCF68079}"/>
+          <p:cNvPr id="10" name="Textplatzhalter 9">
+            <a:extLst>
+              <a:ext uri="{FF2B5EF4-FFF2-40B4-BE49-F238E27FC236}">
+                <a16:creationId xmlns:a16="http://schemas.microsoft.com/office/drawing/2014/main" id="{8DA1336B-BA27-3A80-CEEC-94E58406909A}"/>
               </a:ext>
             </a:extLst>
           </p:cNvPr>
@@ -28157,20 +28481,63 @@
             <a:spLocks noGrp="1"/>
           </p:cNvSpPr>
           <p:nvPr>
-            <p:ph type="body" idx="1"/>
+            <p:ph type="body" sz="quarter" idx="13"/>
           </p:nvPr>
         </p:nvSpPr>
-        <p:spPr/>
+        <p:spPr>
+          <a:xfrm>
+            <a:off x="444499" y="1625385"/>
+            <a:ext cx="8046357" cy="4093243"/>
+          </a:xfrm>
+        </p:spPr>
         <p:txBody>
           <a:bodyPr rtlCol="0"/>
           <a:lstStyle/>
           <a:p>
+            <a:pPr marL="0" indent="0" rtl="0">
+              <a:buNone/>
+            </a:pPr>
+            <a:r>
+              <a:rPr lang="de-DE" dirty="0"/>
+              <a:t>Aufgabenverteilung anhand Stärken und Nutzbarkeit:</a:t>
+            </a:r>
+          </a:p>
+          <a:p>
+            <a:pPr rtl="0"/>
+            <a:endParaRPr lang="de-DE" dirty="0"/>
+          </a:p>
+          <a:p>
             <a:pPr rtl="0"/>
             <a:r>
-              <a:rPr lang="de-DE"/>
-              <a:t>Untertitel</a:t>
+              <a:rPr lang="de-DE" dirty="0"/>
+              <a:t>Max: Koordination, Dokumentation</a:t>
             </a:r>
           </a:p>
+          <a:p>
+            <a:pPr rtl="0"/>
+            <a:r>
+              <a:rPr lang="de-DE" dirty="0" err="1"/>
+              <a:t>Finnley</a:t>
+            </a:r>
+            <a:r>
+              <a:rPr lang="de-DE" dirty="0"/>
+              <a:t>: Spezifikation, Datenmodellierung</a:t>
+            </a:r>
+          </a:p>
+          <a:p>
+            <a:pPr rtl="0"/>
+            <a:r>
+              <a:rPr lang="de-DE" dirty="0"/>
+              <a:t>Leon: Frontend, Design, Datenbankanbindung</a:t>
+            </a:r>
+          </a:p>
+          <a:p>
+            <a:pPr rtl="0"/>
+            <a:r>
+              <a:rPr lang="de-DE" dirty="0"/>
+              <a:t>Olli: Backend, teilweise Frontend</a:t>
+            </a:r>
+          </a:p>
         </p:txBody>
       </p:sp>
       <p:sp>
@@ -28178,7 +28545,7 @@
           <p:cNvPr id="2" name="Foliennummernplatzhalter 1">
             <a:extLst>
               <a:ext uri="{FF2B5EF4-FFF2-40B4-BE49-F238E27FC236}">
-                <a16:creationId xmlns:a16="http://schemas.microsoft.com/office/drawing/2014/main" id="{F5D872D1-FC64-20E1-6AE2-DC6CFCCF97B4}"/>
+                <a16:creationId xmlns:a16="http://schemas.microsoft.com/office/drawing/2014/main" id="{47ADAFE6-6B4A-4F26-B46F-B5568A254337}"/>
               </a:ext>
             </a:extLst>
           </p:cNvPr>
@@ -28207,7 +28574,7 @@
     </p:spTree>
     <p:extLst>
       <p:ext uri="{BB962C8B-B14F-4D97-AF65-F5344CB8AC3E}">
-        <p14:creationId xmlns:p14="http://schemas.microsoft.com/office/powerpoint/2010/main" val="2540720352"/>
+        <p14:creationId xmlns:p14="http://schemas.microsoft.com/office/powerpoint/2010/main" val="1901105602"/>
       </p:ext>
     </p:extLst>
   </p:cSld>
@@ -28237,7 +28604,7 @@
         <p:cNvPr id="1" name="">
           <a:extLst>
             <a:ext uri="{FF2B5EF4-FFF2-40B4-BE49-F238E27FC236}">
-              <a16:creationId xmlns:a16="http://schemas.microsoft.com/office/drawing/2014/main" id="{2E91DF8D-51C2-26E0-26C9-8DB3D619BF9A}"/>
+              <a16:creationId xmlns:a16="http://schemas.microsoft.com/office/drawing/2014/main" id="{E743664D-F8FB-8AA4-E4FC-57774B1EDC15}"/>
             </a:ext>
           </a:extLst>
         </p:cNvPr>
@@ -28254,10 +28621,10 @@
       </p:grpSpPr>
       <p:sp>
         <p:nvSpPr>
-          <p:cNvPr id="4" name="Titel 3">
-            <a:extLst>
-              <a:ext uri="{FF2B5EF4-FFF2-40B4-BE49-F238E27FC236}">
-                <a16:creationId xmlns:a16="http://schemas.microsoft.com/office/drawing/2014/main" id="{A78756BB-878B-3CD7-E25C-E1746B5EBBEB}"/>
+          <p:cNvPr id="7" name="Titel 6">
+            <a:extLst>
+              <a:ext uri="{FF2B5EF4-FFF2-40B4-BE49-F238E27FC236}">
+                <a16:creationId xmlns:a16="http://schemas.microsoft.com/office/drawing/2014/main" id="{D48358A2-87BF-2784-6E66-273D233BEDD6}"/>
               </a:ext>
             </a:extLst>
           </p:cNvPr>
@@ -28268,37 +28635,25 @@
             <p:ph type="title"/>
           </p:nvPr>
         </p:nvSpPr>
-        <p:spPr>
-          <a:xfrm>
-            <a:off x="832103" y="3886200"/>
-            <a:ext cx="10159747" cy="859055"/>
-          </a:xfrm>
-        </p:spPr>
+        <p:spPr/>
         <p:txBody>
-          <a:bodyPr rtlCol="0">
-            <a:normAutofit/>
-          </a:bodyPr>
+          <a:bodyPr rtlCol="0"/>
           <a:lstStyle/>
           <a:p>
             <a:pPr rtl="0"/>
             <a:r>
               <a:rPr lang="de-DE" dirty="0"/>
-              <a:t>Technikkram/</a:t>
+              <a:t>Tools &amp; Projektverwaltung</a:t>
             </a:r>
-            <a:r>
-              <a:rPr lang="de-DE" dirty="0" err="1"/>
-              <a:t>Specs</a:t>
-            </a:r>
-            <a:endParaRPr lang="de-DE" dirty="0"/>
           </a:p>
         </p:txBody>
       </p:sp>
       <p:sp>
         <p:nvSpPr>
-          <p:cNvPr id="5" name="Textplatzhalter 4">
-            <a:extLst>
-              <a:ext uri="{FF2B5EF4-FFF2-40B4-BE49-F238E27FC236}">
-                <a16:creationId xmlns:a16="http://schemas.microsoft.com/office/drawing/2014/main" id="{D8744C7D-90B6-7062-B2B1-F8CA8A102B92}"/>
+          <p:cNvPr id="10" name="Textplatzhalter 9">
+            <a:extLst>
+              <a:ext uri="{FF2B5EF4-FFF2-40B4-BE49-F238E27FC236}">
+                <a16:creationId xmlns:a16="http://schemas.microsoft.com/office/drawing/2014/main" id="{7CB6C06C-FA47-B614-7543-FDFE0F28BD1B}"/>
               </a:ext>
             </a:extLst>
           </p:cNvPr>
@@ -28306,7 +28661,7 @@
             <a:spLocks noGrp="1"/>
           </p:cNvSpPr>
           <p:nvPr>
-            <p:ph type="body" idx="1"/>
+            <p:ph type="body" sz="quarter" idx="13"/>
           </p:nvPr>
         </p:nvSpPr>
         <p:spPr/>
@@ -28316,10 +28671,61 @@
           <a:p>
             <a:pPr rtl="0"/>
             <a:r>
-              <a:rPr lang="de-DE"/>
-              <a:t>Untertitel</a:t>
+              <a:rPr lang="de-DE" dirty="0"/>
+              <a:t>GitHub als zentrale Plattform:</a:t>
             </a:r>
           </a:p>
+          <a:p>
+            <a:pPr lvl="1"/>
+            <a:r>
+              <a:rPr lang="de-DE" dirty="0"/>
+              <a:t>Quellcodeverwaltung (</a:t>
+            </a:r>
+            <a:r>
+              <a:rPr lang="de-DE" dirty="0" err="1"/>
+              <a:t>Branching</a:t>
+            </a:r>
+            <a:r>
+              <a:rPr lang="de-DE" dirty="0"/>
+              <a:t>, </a:t>
+            </a:r>
+            <a:r>
+              <a:rPr lang="de-DE" dirty="0" err="1"/>
+              <a:t>Commits</a:t>
+            </a:r>
+            <a:r>
+              <a:rPr lang="de-DE" dirty="0"/>
+              <a:t>)</a:t>
+            </a:r>
+          </a:p>
+          <a:p>
+            <a:pPr lvl="1"/>
+            <a:r>
+              <a:rPr lang="de-DE" dirty="0"/>
+              <a:t>Dokumentenablage</a:t>
+            </a:r>
+          </a:p>
+          <a:p>
+            <a:pPr rtl="0"/>
+            <a:r>
+              <a:rPr lang="de-DE" dirty="0"/>
+              <a:t>Dokumentation in Word-Dateien:</a:t>
+            </a:r>
+          </a:p>
+          <a:p>
+            <a:pPr lvl="1"/>
+            <a:r>
+              <a:rPr lang="de-DE" dirty="0"/>
+              <a:t>Spezifikation, Anforderungen, Planung</a:t>
+            </a:r>
+          </a:p>
+          <a:p>
+            <a:pPr rtl="0"/>
+            <a:r>
+              <a:rPr lang="de-DE" dirty="0"/>
+              <a:t>Kommunikation: WhatsApp &amp; MS Teams</a:t>
+            </a:r>
+          </a:p>
         </p:txBody>
       </p:sp>
       <p:sp>
@@ -28327,7 +28733,7 @@
           <p:cNvPr id="2" name="Foliennummernplatzhalter 1">
             <a:extLst>
               <a:ext uri="{FF2B5EF4-FFF2-40B4-BE49-F238E27FC236}">
-                <a16:creationId xmlns:a16="http://schemas.microsoft.com/office/drawing/2014/main" id="{EA0E3BCC-5F74-1374-8891-00B8DE45EC2F}"/>
+                <a16:creationId xmlns:a16="http://schemas.microsoft.com/office/drawing/2014/main" id="{7F102B05-E653-7481-8470-FC5124B6E42B}"/>
               </a:ext>
             </a:extLst>
           </p:cNvPr>
@@ -28356,7 +28762,7 @@
     </p:spTree>
     <p:extLst>
       <p:ext uri="{BB962C8B-B14F-4D97-AF65-F5344CB8AC3E}">
-        <p14:creationId xmlns:p14="http://schemas.microsoft.com/office/powerpoint/2010/main" val="1726933895"/>
+        <p14:creationId xmlns:p14="http://schemas.microsoft.com/office/powerpoint/2010/main" val="69949027"/>
       </p:ext>
     </p:extLst>
   </p:cSld>
@@ -28386,7 +28792,7 @@
         <p:cNvPr id="1" name="">
           <a:extLst>
             <a:ext uri="{FF2B5EF4-FFF2-40B4-BE49-F238E27FC236}">
-              <a16:creationId xmlns:a16="http://schemas.microsoft.com/office/drawing/2014/main" id="{B1E33606-7784-CF36-F090-A24E3E4C973E}"/>
+              <a16:creationId xmlns:a16="http://schemas.microsoft.com/office/drawing/2014/main" id="{BB42AECB-326B-F9D0-6570-57D6DED3CE68}"/>
             </a:ext>
           </a:extLst>
         </p:cNvPr>
@@ -28406,7 +28812,7 @@
           <p:cNvPr id="4" name="Titel 3">
             <a:extLst>
               <a:ext uri="{FF2B5EF4-FFF2-40B4-BE49-F238E27FC236}">
-                <a16:creationId xmlns:a16="http://schemas.microsoft.com/office/drawing/2014/main" id="{EC1F5093-E48A-5F97-8038-13F124D7823F}"/>
+                <a16:creationId xmlns:a16="http://schemas.microsoft.com/office/drawing/2014/main" id="{67E49FFA-0C2D-0264-B7CB-9B40C432FA4C}"/>
               </a:ext>
             </a:extLst>
           </p:cNvPr>
@@ -28431,9 +28837,18 @@
           <a:p>
             <a:pPr rtl="0"/>
             <a:r>
+              <a:rPr lang="de-DE" dirty="0" err="1"/>
+              <a:t>Lessons</a:t>
+            </a:r>
+            <a:r>
               <a:rPr lang="de-DE" dirty="0"/>
-              <a:t>Code</a:t>
+              <a:t> </a:t>
             </a:r>
+            <a:r>
+              <a:rPr lang="de-DE" dirty="0" err="1"/>
+              <a:t>learned</a:t>
+            </a:r>
+            <a:endParaRPr lang="de-DE" dirty="0"/>
           </a:p>
         </p:txBody>
       </p:sp>
@@ -28442,7 +28857,7 @@
           <p:cNvPr id="5" name="Textplatzhalter 4">
             <a:extLst>
               <a:ext uri="{FF2B5EF4-FFF2-40B4-BE49-F238E27FC236}">
-                <a16:creationId xmlns:a16="http://schemas.microsoft.com/office/drawing/2014/main" id="{713A794B-47EF-09E7-B7B3-42339AB6E62E}"/>
+                <a16:creationId xmlns:a16="http://schemas.microsoft.com/office/drawing/2014/main" id="{4BA5F54E-D4B4-2445-E186-042508035F80}"/>
               </a:ext>
             </a:extLst>
           </p:cNvPr>
@@ -28460,8 +28875,8 @@
           <a:p>
             <a:pPr rtl="0"/>
             <a:r>
-              <a:rPr lang="de-DE" dirty="0"/>
-              <a:t>Live-Demo</a:t>
+              <a:rPr lang="de-DE"/>
+              <a:t>Untertitel</a:t>
             </a:r>
           </a:p>
         </p:txBody>
@@ -28471,7 +28886,7 @@
           <p:cNvPr id="2" name="Foliennummernplatzhalter 1">
             <a:extLst>
               <a:ext uri="{FF2B5EF4-FFF2-40B4-BE49-F238E27FC236}">
-                <a16:creationId xmlns:a16="http://schemas.microsoft.com/office/drawing/2014/main" id="{727899DB-4439-8603-0B31-FFE80CDD977B}"/>
+                <a16:creationId xmlns:a16="http://schemas.microsoft.com/office/drawing/2014/main" id="{1CE2D10D-7E59-13B9-2104-D164C228DFA1}"/>
               </a:ext>
             </a:extLst>
           </p:cNvPr>
@@ -28500,7 +28915,7 @@
     </p:spTree>
     <p:extLst>
       <p:ext uri="{BB962C8B-B14F-4D97-AF65-F5344CB8AC3E}">
-        <p14:creationId xmlns:p14="http://schemas.microsoft.com/office/powerpoint/2010/main" val="2944609724"/>
+        <p14:creationId xmlns:p14="http://schemas.microsoft.com/office/powerpoint/2010/main" val="533201138"/>
       </p:ext>
     </p:extLst>
   </p:cSld>
@@ -28530,7 +28945,7 @@
         <p:cNvPr id="1" name="">
           <a:extLst>
             <a:ext uri="{FF2B5EF4-FFF2-40B4-BE49-F238E27FC236}">
-              <a16:creationId xmlns:a16="http://schemas.microsoft.com/office/drawing/2014/main" id="{3605B77D-CD55-ACD4-E1EB-794211FD7E4E}"/>
+              <a16:creationId xmlns:a16="http://schemas.microsoft.com/office/drawing/2014/main" id="{36524055-5218-7EFD-E5BB-9F3140E56AA2}"/>
             </a:ext>
           </a:extLst>
         </p:cNvPr>
@@ -28550,7 +28965,7 @@
           <p:cNvPr id="4" name="Titel 3">
             <a:extLst>
               <a:ext uri="{FF2B5EF4-FFF2-40B4-BE49-F238E27FC236}">
-                <a16:creationId xmlns:a16="http://schemas.microsoft.com/office/drawing/2014/main" id="{C98F2789-07B7-277C-48AA-F19917B27A97}"/>
+                <a16:creationId xmlns:a16="http://schemas.microsoft.com/office/drawing/2014/main" id="{3CDC6B14-C700-749A-7C19-C649E6AD5F50}"/>
               </a:ext>
             </a:extLst>
           </p:cNvPr>
@@ -28561,6 +28976,42 @@
             <p:ph type="title"/>
           </p:nvPr>
         </p:nvSpPr>
+        <p:spPr>
+          <a:xfrm>
+            <a:off x="832103" y="3886200"/>
+            <a:ext cx="10159747" cy="859055"/>
+          </a:xfrm>
+        </p:spPr>
+        <p:txBody>
+          <a:bodyPr rtlCol="0">
+            <a:normAutofit/>
+          </a:bodyPr>
+          <a:lstStyle/>
+          <a:p>
+            <a:pPr rtl="0"/>
+            <a:r>
+              <a:rPr lang="de-DE" dirty="0"/>
+              <a:t>Design</a:t>
+            </a:r>
+          </a:p>
+        </p:txBody>
+      </p:sp>
+      <p:sp>
+        <p:nvSpPr>
+          <p:cNvPr id="5" name="Textplatzhalter 4">
+            <a:extLst>
+              <a:ext uri="{FF2B5EF4-FFF2-40B4-BE49-F238E27FC236}">
+                <a16:creationId xmlns:a16="http://schemas.microsoft.com/office/drawing/2014/main" id="{882CB1AC-2F11-4860-FD50-96C1DCF68079}"/>
+              </a:ext>
+            </a:extLst>
+          </p:cNvPr>
+          <p:cNvSpPr>
+            <a:spLocks noGrp="1"/>
+          </p:cNvSpPr>
+          <p:nvPr>
+            <p:ph type="body" idx="1"/>
+          </p:nvPr>
+        </p:nvSpPr>
         <p:spPr/>
         <p:txBody>
           <a:bodyPr rtlCol="0"/>
@@ -28568,8 +29019,8 @@
           <a:p>
             <a:pPr rtl="0"/>
             <a:r>
-              <a:rPr lang="de-DE" dirty="0"/>
-              <a:t>Fazit</a:t>
+              <a:rPr lang="de-DE"/>
+              <a:t>Untertitel</a:t>
             </a:r>
           </a:p>
         </p:txBody>
@@ -28579,7 +29030,7 @@
           <p:cNvPr id="2" name="Foliennummernplatzhalter 1">
             <a:extLst>
               <a:ext uri="{FF2B5EF4-FFF2-40B4-BE49-F238E27FC236}">
-                <a16:creationId xmlns:a16="http://schemas.microsoft.com/office/drawing/2014/main" id="{235F21F6-78C1-F12D-372D-5EC6203DC16A}"/>
+                <a16:creationId xmlns:a16="http://schemas.microsoft.com/office/drawing/2014/main" id="{F5D872D1-FC64-20E1-6AE2-DC6CFCCF97B4}"/>
               </a:ext>
             </a:extLst>
           </p:cNvPr>
@@ -28605,133 +29056,10 @@
           </a:p>
         </p:txBody>
       </p:sp>
-      <p:sp>
-        <p:nvSpPr>
-          <p:cNvPr id="7" name="Textplatzhalter 6">
-            <a:extLst>
-              <a:ext uri="{FF2B5EF4-FFF2-40B4-BE49-F238E27FC236}">
-                <a16:creationId xmlns:a16="http://schemas.microsoft.com/office/drawing/2014/main" id="{C1F42AE6-37B8-C4F8-64FE-A0FDA62596D6}"/>
-              </a:ext>
-            </a:extLst>
-          </p:cNvPr>
-          <p:cNvSpPr>
-            <a:spLocks noGrp="1"/>
-          </p:cNvSpPr>
-          <p:nvPr>
-            <p:ph type="body" sz="quarter" idx="1"/>
-          </p:nvPr>
-        </p:nvSpPr>
-        <p:spPr/>
-        <p:txBody>
-          <a:bodyPr rtlCol="0"/>
-          <a:lstStyle/>
-          <a:p>
-            <a:pPr rtl="0"/>
-            <a:r>
-              <a:rPr lang="de-DE" dirty="0"/>
-              <a:t>Fazit Worte</a:t>
-            </a:r>
-          </a:p>
-        </p:txBody>
-      </p:sp>
-      <p:sp>
-        <p:nvSpPr>
-          <p:cNvPr id="8" name="Textplatzhalter 7">
-            <a:extLst>
-              <a:ext uri="{FF2B5EF4-FFF2-40B4-BE49-F238E27FC236}">
-                <a16:creationId xmlns:a16="http://schemas.microsoft.com/office/drawing/2014/main" id="{90ABD2DE-DE3A-BA13-1030-3B31D4DC25C2}"/>
-              </a:ext>
-            </a:extLst>
-          </p:cNvPr>
-          <p:cNvSpPr>
-            <a:spLocks noGrp="1"/>
-          </p:cNvSpPr>
-          <p:nvPr>
-            <p:ph type="body" sz="quarter" idx="2"/>
-          </p:nvPr>
-        </p:nvSpPr>
-        <p:spPr/>
-        <p:txBody>
-          <a:bodyPr rtlCol="0"/>
-          <a:lstStyle/>
-          <a:p>
-            <a:pPr rtl="0"/>
-            <a:r>
-              <a:rPr lang="de-DE" dirty="0" err="1"/>
-              <a:t>Bla</a:t>
-            </a:r>
-            <a:r>
-              <a:rPr lang="de-DE" dirty="0"/>
-              <a:t> </a:t>
-            </a:r>
-            <a:r>
-              <a:rPr lang="de-DE" dirty="0" err="1"/>
-              <a:t>bla</a:t>
-            </a:r>
-            <a:endParaRPr lang="de-DE" dirty="0"/>
-          </a:p>
-        </p:txBody>
-      </p:sp>
-      <p:pic>
-        <p:nvPicPr>
-          <p:cNvPr id="12" name="Grafik 11">
-            <a:extLst>
-              <a:ext uri="{FF2B5EF4-FFF2-40B4-BE49-F238E27FC236}">
-                <a16:creationId xmlns:a16="http://schemas.microsoft.com/office/drawing/2014/main" id="{88494A84-A1C9-6C3A-7E01-B6BAEFC24031}"/>
-              </a:ext>
-            </a:extLst>
-          </p:cNvPr>
-          <p:cNvPicPr>
-            <a:picLocks noChangeAspect="1"/>
-          </p:cNvPicPr>
-          <p:nvPr/>
-        </p:nvPicPr>
-        <p:blipFill>
-          <a:blip r:embed="rId3"/>
-          <a:stretch>
-            <a:fillRect/>
-          </a:stretch>
-        </p:blipFill>
-        <p:spPr>
-          <a:xfrm>
-            <a:off x="5897381" y="1891610"/>
-            <a:ext cx="5761219" cy="4298053"/>
-          </a:xfrm>
-          <a:prstGeom prst="rect">
-            <a:avLst/>
-          </a:prstGeom>
-        </p:spPr>
-      </p:pic>
-      <p:sp>
-        <p:nvSpPr>
-          <p:cNvPr id="6" name="Textplatzhalter 5">
-            <a:extLst>
-              <a:ext uri="{FF2B5EF4-FFF2-40B4-BE49-F238E27FC236}">
-                <a16:creationId xmlns:a16="http://schemas.microsoft.com/office/drawing/2014/main" id="{225ED319-28C1-B6CD-D057-28466BF1C264}"/>
-              </a:ext>
-            </a:extLst>
-          </p:cNvPr>
-          <p:cNvSpPr>
-            <a:spLocks noGrp="1"/>
-          </p:cNvSpPr>
-          <p:nvPr>
-            <p:ph type="body" sz="quarter" idx="4"/>
-          </p:nvPr>
-        </p:nvSpPr>
-        <p:spPr/>
-        <p:txBody>
-          <a:bodyPr rtlCol="0"/>
-          <a:lstStyle/>
-          <a:p>
-            <a:pPr rtl="0"/>
-            <a:endParaRPr lang="de-DE" dirty="0"/>
-          </a:p>
-        </p:txBody>
-      </p:sp>
     </p:spTree>
     <p:extLst>
       <p:ext uri="{BB962C8B-B14F-4D97-AF65-F5344CB8AC3E}">
-        <p14:creationId xmlns:p14="http://schemas.microsoft.com/office/powerpoint/2010/main" val="1749850572"/>
+        <p14:creationId xmlns:p14="http://schemas.microsoft.com/office/powerpoint/2010/main" val="2540720352"/>
       </p:ext>
     </p:extLst>
   </p:cSld>
@@ -28758,246 +29086,10 @@
   <p:cSld>
     <p:spTree>
       <p:nvGrpSpPr>
-        <p:cNvPr id="1" name=""/>
-        <p:cNvGrpSpPr/>
-        <p:nvPr/>
-      </p:nvGrpSpPr>
-      <p:grpSpPr>
-        <a:xfrm>
-          <a:off x="0" y="0"/>
-          <a:ext cx="0" cy="0"/>
-          <a:chOff x="0" y="0"/>
-          <a:chExt cx="0" cy="0"/>
-        </a:xfrm>
-      </p:grpSpPr>
-      <p:sp>
-        <p:nvSpPr>
-          <p:cNvPr id="2" name="Titel 1">
-            <a:extLst>
-              <a:ext uri="{FF2B5EF4-FFF2-40B4-BE49-F238E27FC236}">
-                <a16:creationId xmlns:a16="http://schemas.microsoft.com/office/drawing/2014/main" id="{632BE5BF-9922-45FB-8F3F-4446D40A051B}"/>
-              </a:ext>
-            </a:extLst>
-          </p:cNvPr>
-          <p:cNvSpPr>
-            <a:spLocks noGrp="1"/>
-          </p:cNvSpPr>
-          <p:nvPr>
-            <p:ph type="ctrTitle"/>
-          </p:nvPr>
-        </p:nvSpPr>
-        <p:spPr>
-          <a:xfrm>
-            <a:off x="5854535" y="3429000"/>
-            <a:ext cx="5451305" cy="1243584"/>
-          </a:xfrm>
-        </p:spPr>
-        <p:txBody>
-          <a:bodyPr rtlCol="0"/>
-          <a:lstStyle/>
-          <a:p>
-            <a:pPr rtl="0"/>
-            <a:r>
-              <a:rPr lang="de-DE" dirty="0"/>
-              <a:t>Vielen Dank</a:t>
-            </a:r>
-            <a:br>
-              <a:rPr lang="de-DE" dirty="0"/>
-            </a:br>
-            <a:r>
-              <a:rPr lang="de-DE" dirty="0"/>
-              <a:t>Zeit für Fragen</a:t>
-            </a:r>
-          </a:p>
-        </p:txBody>
-      </p:sp>
-    </p:spTree>
-    <p:extLst>
-      <p:ext uri="{BB962C8B-B14F-4D97-AF65-F5344CB8AC3E}">
-        <p14:creationId xmlns:p14="http://schemas.microsoft.com/office/powerpoint/2010/main" val="44069682"/>
-      </p:ext>
-    </p:extLst>
-  </p:cSld>
-  <p:clrMapOvr>
-    <a:masterClrMapping/>
-  </p:clrMapOvr>
-  <p:transition spd="slow">
-    <p:wipe/>
-  </p:transition>
-</p:sld>
-</file>
-
-<file path=ppt/slides/slide17.xml><?xml version="1.0" encoding="utf-8"?>
-<p:sld xmlns:a="http://schemas.openxmlformats.org/drawingml/2006/main" xmlns:r="http://schemas.openxmlformats.org/officeDocument/2006/relationships" xmlns:p="http://schemas.openxmlformats.org/presentationml/2006/main">
-  <p:cSld>
-    <p:spTree>
-      <p:nvGrpSpPr>
-        <p:cNvPr id="1" name=""/>
-        <p:cNvGrpSpPr/>
-        <p:nvPr/>
-      </p:nvGrpSpPr>
-      <p:grpSpPr>
-        <a:xfrm>
-          <a:off x="0" y="0"/>
-          <a:ext cx="0" cy="0"/>
-          <a:chOff x="0" y="0"/>
-          <a:chExt cx="0" cy="0"/>
-        </a:xfrm>
-      </p:grpSpPr>
-      <p:sp>
-        <p:nvSpPr>
-          <p:cNvPr id="2" name="Textplatzhalter 1">
-            <a:extLst>
-              <a:ext uri="{FF2B5EF4-FFF2-40B4-BE49-F238E27FC236}">
-                <a16:creationId xmlns:a16="http://schemas.microsoft.com/office/drawing/2014/main" id="{713112E5-24AC-3EA3-AFAC-DB2ACBA6D755}"/>
-              </a:ext>
-            </a:extLst>
-          </p:cNvPr>
-          <p:cNvSpPr>
-            <a:spLocks noGrp="1"/>
-          </p:cNvSpPr>
-          <p:nvPr>
-            <p:ph type="body" idx="1"/>
-          </p:nvPr>
-        </p:nvSpPr>
-        <p:spPr/>
-        <p:txBody>
-          <a:bodyPr/>
-          <a:lstStyle/>
-          <a:p>
-            <a:endParaRPr lang="de-DE" dirty="0"/>
-          </a:p>
-        </p:txBody>
-      </p:sp>
-      <p:sp>
-        <p:nvSpPr>
-          <p:cNvPr id="3" name="Foliennummernplatzhalter 2">
-            <a:extLst>
-              <a:ext uri="{FF2B5EF4-FFF2-40B4-BE49-F238E27FC236}">
-                <a16:creationId xmlns:a16="http://schemas.microsoft.com/office/drawing/2014/main" id="{DD28D966-4E68-B3AB-6F7F-38CC1C6C2B33}"/>
-              </a:ext>
-            </a:extLst>
-          </p:cNvPr>
-          <p:cNvSpPr>
-            <a:spLocks noGrp="1"/>
-          </p:cNvSpPr>
-          <p:nvPr>
-            <p:ph type="sldNum" sz="quarter" idx="12"/>
-          </p:nvPr>
-        </p:nvSpPr>
-        <p:spPr/>
-        <p:txBody>
-          <a:bodyPr/>
-          <a:lstStyle/>
-          <a:p>
-            <a:pPr rtl="0"/>
-            <a:fld id="{C263D6C4-4840-40CC-AC84-17E24B3B7BDE}" type="slidenum">
-              <a:rPr lang="de-DE" noProof="0" smtClean="0"/>
-              <a:pPr rtl="0"/>
-              <a:t>17</a:t>
-            </a:fld>
-            <a:endParaRPr lang="de-DE" noProof="0"/>
-          </a:p>
-        </p:txBody>
-      </p:sp>
-      <p:sp>
-        <p:nvSpPr>
-          <p:cNvPr id="4" name="Titel 3">
-            <a:extLst>
-              <a:ext uri="{FF2B5EF4-FFF2-40B4-BE49-F238E27FC236}">
-                <a16:creationId xmlns:a16="http://schemas.microsoft.com/office/drawing/2014/main" id="{7EA52FA1-6915-D788-3679-5C28736C9C5A}"/>
-              </a:ext>
-            </a:extLst>
-          </p:cNvPr>
-          <p:cNvSpPr>
-            <a:spLocks noGrp="1"/>
-          </p:cNvSpPr>
-          <p:nvPr>
-            <p:ph type="title"/>
-          </p:nvPr>
-        </p:nvSpPr>
-        <p:spPr/>
-        <p:txBody>
-          <a:bodyPr>
-            <a:normAutofit fontScale="90000"/>
-          </a:bodyPr>
-          <a:lstStyle/>
-          <a:p>
-            <a:r>
-              <a:rPr lang="de-DE" dirty="0"/>
-              <a:t>Ab hier sind nur Vorlagen </a:t>
-            </a:r>
-          </a:p>
-        </p:txBody>
-      </p:sp>
-      <p:sp>
-        <p:nvSpPr>
-          <p:cNvPr id="5" name="Pfeil: nach unten 4">
-            <a:extLst>
-              <a:ext uri="{FF2B5EF4-FFF2-40B4-BE49-F238E27FC236}">
-                <a16:creationId xmlns:a16="http://schemas.microsoft.com/office/drawing/2014/main" id="{74A0EBA7-547F-A0F6-D038-B770A970B295}"/>
-              </a:ext>
-            </a:extLst>
-          </p:cNvPr>
-          <p:cNvSpPr/>
-          <p:nvPr/>
-        </p:nvSpPr>
-        <p:spPr>
-          <a:xfrm>
-            <a:off x="3922815" y="1088571"/>
-            <a:ext cx="1262743" cy="2252353"/>
-          </a:xfrm>
-          <a:prstGeom prst="downArrow">
-            <a:avLst/>
-          </a:prstGeom>
-        </p:spPr>
-        <p:style>
-          <a:lnRef idx="2">
-            <a:schemeClr val="accent1">
-              <a:shade val="15000"/>
-            </a:schemeClr>
-          </a:lnRef>
-          <a:fillRef idx="1">
-            <a:schemeClr val="accent1"/>
-          </a:fillRef>
-          <a:effectRef idx="0">
-            <a:schemeClr val="accent1"/>
-          </a:effectRef>
-          <a:fontRef idx="minor">
-            <a:schemeClr val="lt1"/>
-          </a:fontRef>
-        </p:style>
-        <p:txBody>
-          <a:bodyPr rtlCol="0" anchor="ctr"/>
-          <a:lstStyle/>
-          <a:p>
-            <a:pPr algn="ctr"/>
-            <a:endParaRPr lang="de-DE"/>
-          </a:p>
-        </p:txBody>
-      </p:sp>
-    </p:spTree>
-    <p:extLst>
-      <p:ext uri="{BB962C8B-B14F-4D97-AF65-F5344CB8AC3E}">
-        <p14:creationId xmlns:p14="http://schemas.microsoft.com/office/powerpoint/2010/main" val="2280450547"/>
-      </p:ext>
-    </p:extLst>
-  </p:cSld>
-  <p:clrMapOvr>
-    <a:masterClrMapping/>
-  </p:clrMapOvr>
-</p:sld>
-</file>
-
-<file path=ppt/slides/slide18.xml><?xml version="1.0" encoding="utf-8"?>
-<p:sld xmlns:a="http://schemas.openxmlformats.org/drawingml/2006/main" xmlns:r="http://schemas.openxmlformats.org/officeDocument/2006/relationships" xmlns:p="http://schemas.openxmlformats.org/presentationml/2006/main">
-  <p:cSld>
-    <p:spTree>
-      <p:nvGrpSpPr>
         <p:cNvPr id="1" name="">
           <a:extLst>
             <a:ext uri="{FF2B5EF4-FFF2-40B4-BE49-F238E27FC236}">
-              <a16:creationId xmlns:a16="http://schemas.microsoft.com/office/drawing/2014/main" id="{44962606-3DAA-6819-54B7-C5888AD9E5BA}"/>
+              <a16:creationId xmlns:a16="http://schemas.microsoft.com/office/drawing/2014/main" id="{2E91DF8D-51C2-26E0-26C9-8DB3D619BF9A}"/>
             </a:ext>
           </a:extLst>
         </p:cNvPr>
@@ -29017,7 +29109,7 @@
           <p:cNvPr id="4" name="Titel 3">
             <a:extLst>
               <a:ext uri="{FF2B5EF4-FFF2-40B4-BE49-F238E27FC236}">
-                <a16:creationId xmlns:a16="http://schemas.microsoft.com/office/drawing/2014/main" id="{67B0999B-DC03-FBBD-B795-ADF91427059E}"/>
+                <a16:creationId xmlns:a16="http://schemas.microsoft.com/office/drawing/2014/main" id="{A78756BB-878B-3CD7-E25C-E1746B5EBBEB}"/>
               </a:ext>
             </a:extLst>
           </p:cNvPr>
@@ -29031,18 +29123,25 @@
         <p:spPr>
           <a:xfrm>
             <a:off x="832103" y="3886200"/>
-            <a:ext cx="8247241" cy="859055"/>
+            <a:ext cx="10159747" cy="859055"/>
           </a:xfrm>
         </p:spPr>
         <p:txBody>
-          <a:bodyPr rtlCol="0"/>
+          <a:bodyPr rtlCol="0">
+            <a:normAutofit/>
+          </a:bodyPr>
           <a:lstStyle/>
           <a:p>
             <a:pPr rtl="0"/>
             <a:r>
-              <a:rPr lang="de-DE"/>
-              <a:t>Abschnittsüberschrift01</a:t>
+              <a:rPr lang="de-DE" dirty="0"/>
+              <a:t>Technikkram/</a:t>
             </a:r>
+            <a:r>
+              <a:rPr lang="de-DE" dirty="0" err="1"/>
+              <a:t>Specs</a:t>
+            </a:r>
+            <a:endParaRPr lang="de-DE" dirty="0"/>
           </a:p>
         </p:txBody>
       </p:sp>
@@ -29051,7 +29150,7 @@
           <p:cNvPr id="5" name="Textplatzhalter 4">
             <a:extLst>
               <a:ext uri="{FF2B5EF4-FFF2-40B4-BE49-F238E27FC236}">
-                <a16:creationId xmlns:a16="http://schemas.microsoft.com/office/drawing/2014/main" id="{8DD86B78-5861-8FDF-CA1D-3FF874A7A39A}"/>
+                <a16:creationId xmlns:a16="http://schemas.microsoft.com/office/drawing/2014/main" id="{D8744C7D-90B6-7062-B2B1-F8CA8A102B92}"/>
               </a:ext>
             </a:extLst>
           </p:cNvPr>
@@ -29080,7 +29179,259 @@
           <p:cNvPr id="2" name="Foliennummernplatzhalter 1">
             <a:extLst>
               <a:ext uri="{FF2B5EF4-FFF2-40B4-BE49-F238E27FC236}">
-                <a16:creationId xmlns:a16="http://schemas.microsoft.com/office/drawing/2014/main" id="{9B629AA9-0DDC-57C9-7CD2-6A7BE5B4FDE6}"/>
+                <a16:creationId xmlns:a16="http://schemas.microsoft.com/office/drawing/2014/main" id="{EA0E3BCC-5F74-1374-8891-00B8DE45EC2F}"/>
+              </a:ext>
+            </a:extLst>
+          </p:cNvPr>
+          <p:cNvSpPr>
+            <a:spLocks noGrp="1"/>
+          </p:cNvSpPr>
+          <p:nvPr>
+            <p:ph type="sldNum" sz="quarter" idx="12"/>
+          </p:nvPr>
+        </p:nvSpPr>
+        <p:spPr/>
+        <p:txBody>
+          <a:bodyPr rtlCol="0"/>
+          <a:lstStyle/>
+          <a:p>
+            <a:pPr rtl="0"/>
+            <a:fld id="{C263D6C4-4840-40CC-AC84-17E24B3B7BDE}" type="slidenum">
+              <a:rPr lang="de-DE" smtClean="0"/>
+              <a:pPr rtl="0"/>
+              <a:t>16</a:t>
+            </a:fld>
+            <a:endParaRPr lang="de-DE"/>
+          </a:p>
+        </p:txBody>
+      </p:sp>
+    </p:spTree>
+    <p:extLst>
+      <p:ext uri="{BB962C8B-B14F-4D97-AF65-F5344CB8AC3E}">
+        <p14:creationId xmlns:p14="http://schemas.microsoft.com/office/powerpoint/2010/main" val="1726933895"/>
+      </p:ext>
+    </p:extLst>
+  </p:cSld>
+  <p:clrMapOvr>
+    <a:masterClrMapping/>
+  </p:clrMapOvr>
+  <mc:AlternateContent xmlns:mc="http://schemas.openxmlformats.org/markup-compatibility/2006" xmlns:p14="http://schemas.microsoft.com/office/powerpoint/2010/main">
+    <mc:Choice Requires="p14">
+      <p:transition spd="med" p14:dur="700">
+        <p:fade/>
+      </p:transition>
+    </mc:Choice>
+    <mc:Fallback xmlns="">
+      <p:transition spd="med">
+        <p:fade/>
+      </p:transition>
+    </mc:Fallback>
+  </mc:AlternateContent>
+</p:sld>
+</file>
+
+<file path=ppt/slides/slide17.xml><?xml version="1.0" encoding="utf-8"?>
+<p:sld xmlns:a="http://schemas.openxmlformats.org/drawingml/2006/main" xmlns:r="http://schemas.openxmlformats.org/officeDocument/2006/relationships" xmlns:p="http://schemas.openxmlformats.org/presentationml/2006/main">
+  <p:cSld>
+    <p:spTree>
+      <p:nvGrpSpPr>
+        <p:cNvPr id="1" name="">
+          <a:extLst>
+            <a:ext uri="{FF2B5EF4-FFF2-40B4-BE49-F238E27FC236}">
+              <a16:creationId xmlns:a16="http://schemas.microsoft.com/office/drawing/2014/main" id="{B1E33606-7784-CF36-F090-A24E3E4C973E}"/>
+            </a:ext>
+          </a:extLst>
+        </p:cNvPr>
+        <p:cNvGrpSpPr/>
+        <p:nvPr/>
+      </p:nvGrpSpPr>
+      <p:grpSpPr>
+        <a:xfrm>
+          <a:off x="0" y="0"/>
+          <a:ext cx="0" cy="0"/>
+          <a:chOff x="0" y="0"/>
+          <a:chExt cx="0" cy="0"/>
+        </a:xfrm>
+      </p:grpSpPr>
+      <p:sp>
+        <p:nvSpPr>
+          <p:cNvPr id="4" name="Titel 3">
+            <a:extLst>
+              <a:ext uri="{FF2B5EF4-FFF2-40B4-BE49-F238E27FC236}">
+                <a16:creationId xmlns:a16="http://schemas.microsoft.com/office/drawing/2014/main" id="{EC1F5093-E48A-5F97-8038-13F124D7823F}"/>
+              </a:ext>
+            </a:extLst>
+          </p:cNvPr>
+          <p:cNvSpPr>
+            <a:spLocks noGrp="1"/>
+          </p:cNvSpPr>
+          <p:nvPr>
+            <p:ph type="title"/>
+          </p:nvPr>
+        </p:nvSpPr>
+        <p:spPr>
+          <a:xfrm>
+            <a:off x="832103" y="3886200"/>
+            <a:ext cx="10159747" cy="859055"/>
+          </a:xfrm>
+        </p:spPr>
+        <p:txBody>
+          <a:bodyPr rtlCol="0">
+            <a:normAutofit/>
+          </a:bodyPr>
+          <a:lstStyle/>
+          <a:p>
+            <a:pPr rtl="0"/>
+            <a:r>
+              <a:rPr lang="de-DE" dirty="0"/>
+              <a:t>Code</a:t>
+            </a:r>
+          </a:p>
+        </p:txBody>
+      </p:sp>
+      <p:sp>
+        <p:nvSpPr>
+          <p:cNvPr id="5" name="Textplatzhalter 4">
+            <a:extLst>
+              <a:ext uri="{FF2B5EF4-FFF2-40B4-BE49-F238E27FC236}">
+                <a16:creationId xmlns:a16="http://schemas.microsoft.com/office/drawing/2014/main" id="{713A794B-47EF-09E7-B7B3-42339AB6E62E}"/>
+              </a:ext>
+            </a:extLst>
+          </p:cNvPr>
+          <p:cNvSpPr>
+            <a:spLocks noGrp="1"/>
+          </p:cNvSpPr>
+          <p:nvPr>
+            <p:ph type="body" idx="1"/>
+          </p:nvPr>
+        </p:nvSpPr>
+        <p:spPr/>
+        <p:txBody>
+          <a:bodyPr rtlCol="0"/>
+          <a:lstStyle/>
+          <a:p>
+            <a:pPr rtl="0"/>
+            <a:r>
+              <a:rPr lang="de-DE" dirty="0"/>
+              <a:t>Live-Demo</a:t>
+            </a:r>
+          </a:p>
+        </p:txBody>
+      </p:sp>
+      <p:sp>
+        <p:nvSpPr>
+          <p:cNvPr id="2" name="Foliennummernplatzhalter 1">
+            <a:extLst>
+              <a:ext uri="{FF2B5EF4-FFF2-40B4-BE49-F238E27FC236}">
+                <a16:creationId xmlns:a16="http://schemas.microsoft.com/office/drawing/2014/main" id="{727899DB-4439-8603-0B31-FFE80CDD977B}"/>
+              </a:ext>
+            </a:extLst>
+          </p:cNvPr>
+          <p:cNvSpPr>
+            <a:spLocks noGrp="1"/>
+          </p:cNvSpPr>
+          <p:nvPr>
+            <p:ph type="sldNum" sz="quarter" idx="12"/>
+          </p:nvPr>
+        </p:nvSpPr>
+        <p:spPr/>
+        <p:txBody>
+          <a:bodyPr rtlCol="0"/>
+          <a:lstStyle/>
+          <a:p>
+            <a:pPr rtl="0"/>
+            <a:fld id="{C263D6C4-4840-40CC-AC84-17E24B3B7BDE}" type="slidenum">
+              <a:rPr lang="de-DE" smtClean="0"/>
+              <a:pPr rtl="0"/>
+              <a:t>17</a:t>
+            </a:fld>
+            <a:endParaRPr lang="de-DE"/>
+          </a:p>
+        </p:txBody>
+      </p:sp>
+    </p:spTree>
+    <p:extLst>
+      <p:ext uri="{BB962C8B-B14F-4D97-AF65-F5344CB8AC3E}">
+        <p14:creationId xmlns:p14="http://schemas.microsoft.com/office/powerpoint/2010/main" val="2944609724"/>
+      </p:ext>
+    </p:extLst>
+  </p:cSld>
+  <p:clrMapOvr>
+    <a:masterClrMapping/>
+  </p:clrMapOvr>
+  <mc:AlternateContent xmlns:mc="http://schemas.openxmlformats.org/markup-compatibility/2006" xmlns:p14="http://schemas.microsoft.com/office/powerpoint/2010/main">
+    <mc:Choice Requires="p14">
+      <p:transition spd="med" p14:dur="700">
+        <p:fade/>
+      </p:transition>
+    </mc:Choice>
+    <mc:Fallback xmlns="">
+      <p:transition spd="med">
+        <p:fade/>
+      </p:transition>
+    </mc:Fallback>
+  </mc:AlternateContent>
+</p:sld>
+</file>
+
+<file path=ppt/slides/slide18.xml><?xml version="1.0" encoding="utf-8"?>
+<p:sld xmlns:a="http://schemas.openxmlformats.org/drawingml/2006/main" xmlns:r="http://schemas.openxmlformats.org/officeDocument/2006/relationships" xmlns:p="http://schemas.openxmlformats.org/presentationml/2006/main">
+  <p:cSld>
+    <p:spTree>
+      <p:nvGrpSpPr>
+        <p:cNvPr id="1" name="">
+          <a:extLst>
+            <a:ext uri="{FF2B5EF4-FFF2-40B4-BE49-F238E27FC236}">
+              <a16:creationId xmlns:a16="http://schemas.microsoft.com/office/drawing/2014/main" id="{3605B77D-CD55-ACD4-E1EB-794211FD7E4E}"/>
+            </a:ext>
+          </a:extLst>
+        </p:cNvPr>
+        <p:cNvGrpSpPr/>
+        <p:nvPr/>
+      </p:nvGrpSpPr>
+      <p:grpSpPr>
+        <a:xfrm>
+          <a:off x="0" y="0"/>
+          <a:ext cx="0" cy="0"/>
+          <a:chOff x="0" y="0"/>
+          <a:chExt cx="0" cy="0"/>
+        </a:xfrm>
+      </p:grpSpPr>
+      <p:sp>
+        <p:nvSpPr>
+          <p:cNvPr id="4" name="Titel 3">
+            <a:extLst>
+              <a:ext uri="{FF2B5EF4-FFF2-40B4-BE49-F238E27FC236}">
+                <a16:creationId xmlns:a16="http://schemas.microsoft.com/office/drawing/2014/main" id="{C98F2789-07B7-277C-48AA-F19917B27A97}"/>
+              </a:ext>
+            </a:extLst>
+          </p:cNvPr>
+          <p:cNvSpPr>
+            <a:spLocks noGrp="1"/>
+          </p:cNvSpPr>
+          <p:nvPr>
+            <p:ph type="title"/>
+          </p:nvPr>
+        </p:nvSpPr>
+        <p:spPr/>
+        <p:txBody>
+          <a:bodyPr rtlCol="0"/>
+          <a:lstStyle/>
+          <a:p>
+            <a:pPr rtl="0"/>
+            <a:r>
+              <a:rPr lang="de-DE" dirty="0"/>
+              <a:t>Fazit</a:t>
+            </a:r>
+          </a:p>
+        </p:txBody>
+      </p:sp>
+      <p:sp>
+        <p:nvSpPr>
+          <p:cNvPr id="2" name="Foliennummernplatzhalter 1">
+            <a:extLst>
+              <a:ext uri="{FF2B5EF4-FFF2-40B4-BE49-F238E27FC236}">
+                <a16:creationId xmlns:a16="http://schemas.microsoft.com/office/drawing/2014/main" id="{235F21F6-78C1-F12D-372D-5EC6203DC16A}"/>
               </a:ext>
             </a:extLst>
           </p:cNvPr>
@@ -29106,10 +29457,133 @@
           </a:p>
         </p:txBody>
       </p:sp>
+      <p:sp>
+        <p:nvSpPr>
+          <p:cNvPr id="7" name="Textplatzhalter 6">
+            <a:extLst>
+              <a:ext uri="{FF2B5EF4-FFF2-40B4-BE49-F238E27FC236}">
+                <a16:creationId xmlns:a16="http://schemas.microsoft.com/office/drawing/2014/main" id="{C1F42AE6-37B8-C4F8-64FE-A0FDA62596D6}"/>
+              </a:ext>
+            </a:extLst>
+          </p:cNvPr>
+          <p:cNvSpPr>
+            <a:spLocks noGrp="1"/>
+          </p:cNvSpPr>
+          <p:nvPr>
+            <p:ph type="body" sz="quarter" idx="1"/>
+          </p:nvPr>
+        </p:nvSpPr>
+        <p:spPr/>
+        <p:txBody>
+          <a:bodyPr rtlCol="0"/>
+          <a:lstStyle/>
+          <a:p>
+            <a:pPr rtl="0"/>
+            <a:r>
+              <a:rPr lang="de-DE" dirty="0"/>
+              <a:t>Fazit Worte</a:t>
+            </a:r>
+          </a:p>
+        </p:txBody>
+      </p:sp>
+      <p:sp>
+        <p:nvSpPr>
+          <p:cNvPr id="8" name="Textplatzhalter 7">
+            <a:extLst>
+              <a:ext uri="{FF2B5EF4-FFF2-40B4-BE49-F238E27FC236}">
+                <a16:creationId xmlns:a16="http://schemas.microsoft.com/office/drawing/2014/main" id="{90ABD2DE-DE3A-BA13-1030-3B31D4DC25C2}"/>
+              </a:ext>
+            </a:extLst>
+          </p:cNvPr>
+          <p:cNvSpPr>
+            <a:spLocks noGrp="1"/>
+          </p:cNvSpPr>
+          <p:nvPr>
+            <p:ph type="body" sz="quarter" idx="2"/>
+          </p:nvPr>
+        </p:nvSpPr>
+        <p:spPr/>
+        <p:txBody>
+          <a:bodyPr rtlCol="0"/>
+          <a:lstStyle/>
+          <a:p>
+            <a:pPr rtl="0"/>
+            <a:r>
+              <a:rPr lang="de-DE" dirty="0" err="1"/>
+              <a:t>Bla</a:t>
+            </a:r>
+            <a:r>
+              <a:rPr lang="de-DE" dirty="0"/>
+              <a:t> </a:t>
+            </a:r>
+            <a:r>
+              <a:rPr lang="de-DE" dirty="0" err="1"/>
+              <a:t>bla</a:t>
+            </a:r>
+            <a:endParaRPr lang="de-DE" dirty="0"/>
+          </a:p>
+        </p:txBody>
+      </p:sp>
+      <p:pic>
+        <p:nvPicPr>
+          <p:cNvPr id="12" name="Grafik 11">
+            <a:extLst>
+              <a:ext uri="{FF2B5EF4-FFF2-40B4-BE49-F238E27FC236}">
+                <a16:creationId xmlns:a16="http://schemas.microsoft.com/office/drawing/2014/main" id="{88494A84-A1C9-6C3A-7E01-B6BAEFC24031}"/>
+              </a:ext>
+            </a:extLst>
+          </p:cNvPr>
+          <p:cNvPicPr>
+            <a:picLocks noChangeAspect="1"/>
+          </p:cNvPicPr>
+          <p:nvPr/>
+        </p:nvPicPr>
+        <p:blipFill>
+          <a:blip r:embed="rId3"/>
+          <a:stretch>
+            <a:fillRect/>
+          </a:stretch>
+        </p:blipFill>
+        <p:spPr>
+          <a:xfrm>
+            <a:off x="5897381" y="1891610"/>
+            <a:ext cx="5761219" cy="4298053"/>
+          </a:xfrm>
+          <a:prstGeom prst="rect">
+            <a:avLst/>
+          </a:prstGeom>
+        </p:spPr>
+      </p:pic>
+      <p:sp>
+        <p:nvSpPr>
+          <p:cNvPr id="6" name="Textplatzhalter 5">
+            <a:extLst>
+              <a:ext uri="{FF2B5EF4-FFF2-40B4-BE49-F238E27FC236}">
+                <a16:creationId xmlns:a16="http://schemas.microsoft.com/office/drawing/2014/main" id="{225ED319-28C1-B6CD-D057-28466BF1C264}"/>
+              </a:ext>
+            </a:extLst>
+          </p:cNvPr>
+          <p:cNvSpPr>
+            <a:spLocks noGrp="1"/>
+          </p:cNvSpPr>
+          <p:nvPr>
+            <p:ph type="body" sz="quarter" idx="4"/>
+          </p:nvPr>
+        </p:nvSpPr>
+        <p:spPr/>
+        <p:txBody>
+          <a:bodyPr rtlCol="0"/>
+          <a:lstStyle/>
+          <a:p>
+            <a:pPr rtl="0"/>
+            <a:endParaRPr lang="de-DE" dirty="0"/>
+          </a:p>
+        </p:txBody>
+      </p:sp>
     </p:spTree>
     <p:extLst>
       <p:ext uri="{BB962C8B-B14F-4D97-AF65-F5344CB8AC3E}">
-        <p14:creationId xmlns:p14="http://schemas.microsoft.com/office/powerpoint/2010/main" val="2651543461"/>
+        <p14:creationId xmlns:p14="http://schemas.microsoft.com/office/powerpoint/2010/main" val="1749850572"/>
       </p:ext>
     </p:extLst>
   </p:cSld>
@@ -29150,10 +29624,10 @@
       </p:grpSpPr>
       <p:sp>
         <p:nvSpPr>
-          <p:cNvPr id="7" name="Titel 6">
-            <a:extLst>
-              <a:ext uri="{FF2B5EF4-FFF2-40B4-BE49-F238E27FC236}">
-                <a16:creationId xmlns:a16="http://schemas.microsoft.com/office/drawing/2014/main" id="{7875C19A-1AAE-476A-A316-A2CF92D763D3}"/>
+          <p:cNvPr id="2" name="Titel 1">
+            <a:extLst>
+              <a:ext uri="{FF2B5EF4-FFF2-40B4-BE49-F238E27FC236}">
+                <a16:creationId xmlns:a16="http://schemas.microsoft.com/office/drawing/2014/main" id="{632BE5BF-9922-45FB-8F3F-4446D40A051B}"/>
               </a:ext>
             </a:extLst>
           </p:cNvPr>
@@ -29161,118 +29635,47 @@
             <a:spLocks noGrp="1"/>
           </p:cNvSpPr>
           <p:nvPr>
-            <p:ph type="title"/>
+            <p:ph type="ctrTitle"/>
           </p:nvPr>
         </p:nvSpPr>
-        <p:spPr/>
+        <p:spPr>
+          <a:xfrm>
+            <a:off x="5854535" y="3429000"/>
+            <a:ext cx="5451305" cy="1243584"/>
+          </a:xfrm>
+        </p:spPr>
         <p:txBody>
           <a:bodyPr rtlCol="0"/>
           <a:lstStyle/>
           <a:p>
             <a:pPr rtl="0"/>
             <a:r>
-              <a:rPr lang="de-DE"/>
-              <a:t>Titel des Inhalts</a:t>
+              <a:rPr lang="de-DE" dirty="0"/>
+              <a:t>Vielen Dank</a:t>
             </a:r>
-          </a:p>
-        </p:txBody>
-      </p:sp>
-      <p:sp>
-        <p:nvSpPr>
-          <p:cNvPr id="10" name="Textplatzhalter 9">
-            <a:extLst>
-              <a:ext uri="{FF2B5EF4-FFF2-40B4-BE49-F238E27FC236}">
-                <a16:creationId xmlns:a16="http://schemas.microsoft.com/office/drawing/2014/main" id="{EF2BC084-E6DB-4DE7-B309-042A85EBA700}"/>
-              </a:ext>
-            </a:extLst>
-          </p:cNvPr>
-          <p:cNvSpPr>
-            <a:spLocks noGrp="1"/>
-          </p:cNvSpPr>
-          <p:nvPr>
-            <p:ph type="body" sz="quarter" idx="13"/>
-          </p:nvPr>
-        </p:nvSpPr>
-        <p:spPr/>
-        <p:txBody>
-          <a:bodyPr rtlCol="0"/>
-          <a:lstStyle/>
-          <a:p>
-            <a:pPr rtl="0"/>
+            <a:br>
+              <a:rPr lang="de-DE" dirty="0"/>
+            </a:br>
             <a:r>
-              <a:rPr lang="de-DE"/>
-              <a:t>Lorem ipsum dolor sit amet, consectetuer adipiscing elit. Maecenas porttitor congue massa. Fusce posuere, magna sed pulvinar ultricies, purus lectus malesuada libero, sit amet commodo magna eros quis urna.</a:t>
+              <a:rPr lang="de-DE" dirty="0"/>
+              <a:t>Zeit für Fragen</a:t>
             </a:r>
-          </a:p>
-          <a:p>
-            <a:pPr rtl="0"/>
-            <a:r>
-              <a:rPr lang="de-DE"/>
-              <a:t>Nunc viverra imperdiet enim. Fusce est. Vivamus a tellus.</a:t>
-            </a:r>
-          </a:p>
-          <a:p>
-            <a:pPr rtl="0"/>
-            <a:r>
-              <a:rPr lang="de-DE"/>
-              <a:t>Pellentesque habitant morbi tristique senectus et netus et malesuada fames ac turpis egestas. Proin pharetra nonummy pede. Mauris et orci.</a:t>
-            </a:r>
-          </a:p>
-        </p:txBody>
-      </p:sp>
-      <p:sp>
-        <p:nvSpPr>
-          <p:cNvPr id="2" name="Foliennummernplatzhalter 1">
-            <a:extLst>
-              <a:ext uri="{FF2B5EF4-FFF2-40B4-BE49-F238E27FC236}">
-                <a16:creationId xmlns:a16="http://schemas.microsoft.com/office/drawing/2014/main" id="{BE9800F6-D571-48C4-8466-12AA1ADB6599}"/>
-              </a:ext>
-            </a:extLst>
-          </p:cNvPr>
-          <p:cNvSpPr>
-            <a:spLocks noGrp="1"/>
-          </p:cNvSpPr>
-          <p:nvPr>
-            <p:ph type="sldNum" sz="quarter" idx="12"/>
-          </p:nvPr>
-        </p:nvSpPr>
-        <p:spPr/>
-        <p:txBody>
-          <a:bodyPr rtlCol="0"/>
-          <a:lstStyle/>
-          <a:p>
-            <a:pPr rtl="0"/>
-            <a:fld id="{C263D6C4-4840-40CC-AC84-17E24B3B7BDE}" type="slidenum">
-              <a:rPr lang="de-DE" smtClean="0"/>
-              <a:pPr rtl="0"/>
-              <a:t>19</a:t>
-            </a:fld>
-            <a:endParaRPr lang="de-DE"/>
           </a:p>
         </p:txBody>
       </p:sp>
     </p:spTree>
     <p:extLst>
       <p:ext uri="{BB962C8B-B14F-4D97-AF65-F5344CB8AC3E}">
-        <p14:creationId xmlns:p14="http://schemas.microsoft.com/office/powerpoint/2010/main" val="3733486012"/>
+        <p14:creationId xmlns:p14="http://schemas.microsoft.com/office/powerpoint/2010/main" val="44069682"/>
       </p:ext>
     </p:extLst>
   </p:cSld>
   <p:clrMapOvr>
     <a:masterClrMapping/>
   </p:clrMapOvr>
-  <mc:AlternateContent xmlns:mc="http://schemas.openxmlformats.org/markup-compatibility/2006" xmlns:p14="http://schemas.microsoft.com/office/powerpoint/2010/main">
-    <mc:Choice Requires="p14">
-      <p:transition spd="med" p14:dur="700">
-        <p:fade/>
-      </p:transition>
-    </mc:Choice>
-    <mc:Fallback xmlns="">
-      <p:transition spd="med">
-        <p:fade/>
-      </p:transition>
-    </mc:Fallback>
-  </mc:AlternateContent>
+  <p:transition spd="slow">
+    <p:wipe/>
+  </p:transition>
 </p:sld>
 </file>
 
@@ -29388,21 +29791,11 @@
             </a:pPr>
             <a:r>
               <a:rPr lang="de-DE" dirty="0"/>
-              <a:t>Projektorganisation (Max)</a:t>
+              <a:t>Projektorganisation (Max) </a:t>
             </a:r>
           </a:p>
           <a:p>
-            <a:pPr marL="800100" lvl="1" indent="-342900">
-              <a:buFont typeface="+mj-lt"/>
-              <a:buAutoNum type="arabicPeriod"/>
-            </a:pPr>
-            <a:r>
-              <a:rPr lang="de-DE" dirty="0"/>
-              <a:t>Dokumentationsstrategie, Versionierung </a:t>
-            </a:r>
-          </a:p>
-          <a:p>
-            <a:pPr marL="342900" indent="-342900" rtl="0">
+            <a:pPr marL="342900" indent="-342900">
               <a:buFont typeface="+mj-lt"/>
               <a:buAutoNum type="arabicPeriod"/>
             </a:pPr>
@@ -29583,10 +29976,66 @@
       </p:grpSpPr>
       <p:sp>
         <p:nvSpPr>
+          <p:cNvPr id="2" name="Textplatzhalter 1">
+            <a:extLst>
+              <a:ext uri="{FF2B5EF4-FFF2-40B4-BE49-F238E27FC236}">
+                <a16:creationId xmlns:a16="http://schemas.microsoft.com/office/drawing/2014/main" id="{713112E5-24AC-3EA3-AFAC-DB2ACBA6D755}"/>
+              </a:ext>
+            </a:extLst>
+          </p:cNvPr>
+          <p:cNvSpPr>
+            <a:spLocks noGrp="1"/>
+          </p:cNvSpPr>
+          <p:nvPr>
+            <p:ph type="body" idx="1"/>
+          </p:nvPr>
+        </p:nvSpPr>
+        <p:spPr/>
+        <p:txBody>
+          <a:bodyPr/>
+          <a:lstStyle/>
+          <a:p>
+            <a:endParaRPr lang="de-DE" dirty="0"/>
+          </a:p>
+        </p:txBody>
+      </p:sp>
+      <p:sp>
+        <p:nvSpPr>
+          <p:cNvPr id="3" name="Foliennummernplatzhalter 2">
+            <a:extLst>
+              <a:ext uri="{FF2B5EF4-FFF2-40B4-BE49-F238E27FC236}">
+                <a16:creationId xmlns:a16="http://schemas.microsoft.com/office/drawing/2014/main" id="{DD28D966-4E68-B3AB-6F7F-38CC1C6C2B33}"/>
+              </a:ext>
+            </a:extLst>
+          </p:cNvPr>
+          <p:cNvSpPr>
+            <a:spLocks noGrp="1"/>
+          </p:cNvSpPr>
+          <p:nvPr>
+            <p:ph type="sldNum" sz="quarter" idx="12"/>
+          </p:nvPr>
+        </p:nvSpPr>
+        <p:spPr/>
+        <p:txBody>
+          <a:bodyPr/>
+          <a:lstStyle/>
+          <a:p>
+            <a:pPr rtl="0"/>
+            <a:fld id="{C263D6C4-4840-40CC-AC84-17E24B3B7BDE}" type="slidenum">
+              <a:rPr lang="de-DE" noProof="0" smtClean="0"/>
+              <a:pPr rtl="0"/>
+              <a:t>20</a:t>
+            </a:fld>
+            <a:endParaRPr lang="de-DE" noProof="0"/>
+          </a:p>
+        </p:txBody>
+      </p:sp>
+      <p:sp>
+        <p:nvSpPr>
           <p:cNvPr id="4" name="Titel 3">
             <a:extLst>
               <a:ext uri="{FF2B5EF4-FFF2-40B4-BE49-F238E27FC236}">
-                <a16:creationId xmlns:a16="http://schemas.microsoft.com/office/drawing/2014/main" id="{315E3981-F0D7-482C-A8E0-6A57700BECA7}"/>
+                <a16:creationId xmlns:a16="http://schemas.microsoft.com/office/drawing/2014/main" id="{7EA52FA1-6915-D788-3679-5C28736C9C5A}"/>
               </a:ext>
             </a:extLst>
           </p:cNvPr>
@@ -29599,186 +30048,60 @@
         </p:nvSpPr>
         <p:spPr/>
         <p:txBody>
-          <a:bodyPr rtlCol="0"/>
+          <a:bodyPr>
+            <a:normAutofit fontScale="90000"/>
+          </a:bodyPr>
           <a:lstStyle/>
           <a:p>
-            <a:pPr rtl="0"/>
             <a:r>
-              <a:rPr lang="de-DE"/>
-              <a:t>Titel des Inhalts</a:t>
+              <a:rPr lang="de-DE" dirty="0"/>
+              <a:t>Ab hier sind nur Vorlagen </a:t>
             </a:r>
           </a:p>
         </p:txBody>
       </p:sp>
       <p:sp>
         <p:nvSpPr>
-          <p:cNvPr id="2" name="Foliennummernplatzhalter 1">
-            <a:extLst>
-              <a:ext uri="{FF2B5EF4-FFF2-40B4-BE49-F238E27FC236}">
-                <a16:creationId xmlns:a16="http://schemas.microsoft.com/office/drawing/2014/main" id="{520FC4EE-F318-4344-9E3C-B950ADB63865}"/>
-              </a:ext>
-            </a:extLst>
-          </p:cNvPr>
-          <p:cNvSpPr>
-            <a:spLocks noGrp="1"/>
-          </p:cNvSpPr>
-          <p:nvPr>
-            <p:ph type="sldNum" sz="quarter" idx="12"/>
-          </p:nvPr>
-        </p:nvSpPr>
-        <p:spPr/>
+          <p:cNvPr id="5" name="Pfeil: nach unten 4">
+            <a:extLst>
+              <a:ext uri="{FF2B5EF4-FFF2-40B4-BE49-F238E27FC236}">
+                <a16:creationId xmlns:a16="http://schemas.microsoft.com/office/drawing/2014/main" id="{74A0EBA7-547F-A0F6-D038-B770A970B295}"/>
+              </a:ext>
+            </a:extLst>
+          </p:cNvPr>
+          <p:cNvSpPr/>
+          <p:nvPr/>
+        </p:nvSpPr>
+        <p:spPr>
+          <a:xfrm>
+            <a:off x="3922815" y="1088571"/>
+            <a:ext cx="1262743" cy="2252353"/>
+          </a:xfrm>
+          <a:prstGeom prst="downArrow">
+            <a:avLst/>
+          </a:prstGeom>
+        </p:spPr>
+        <p:style>
+          <a:lnRef idx="2">
+            <a:schemeClr val="accent1">
+              <a:shade val="15000"/>
+            </a:schemeClr>
+          </a:lnRef>
+          <a:fillRef idx="1">
+            <a:schemeClr val="accent1"/>
+          </a:fillRef>
+          <a:effectRef idx="0">
+            <a:schemeClr val="accent1"/>
+          </a:effectRef>
+          <a:fontRef idx="minor">
+            <a:schemeClr val="lt1"/>
+          </a:fontRef>
+        </p:style>
         <p:txBody>
-          <a:bodyPr rtlCol="0"/>
+          <a:bodyPr rtlCol="0" anchor="ctr"/>
           <a:lstStyle/>
           <a:p>
-            <a:pPr rtl="0"/>
-            <a:fld id="{C263D6C4-4840-40CC-AC84-17E24B3B7BDE}" type="slidenum">
-              <a:rPr lang="de-DE" smtClean="0"/>
-              <a:pPr rtl="0"/>
-              <a:t>20</a:t>
-            </a:fld>
-            <a:endParaRPr lang="de-DE"/>
-          </a:p>
-        </p:txBody>
-      </p:sp>
-      <p:sp>
-        <p:nvSpPr>
-          <p:cNvPr id="7" name="Textplatzhalter 6">
-            <a:extLst>
-              <a:ext uri="{FF2B5EF4-FFF2-40B4-BE49-F238E27FC236}">
-                <a16:creationId xmlns:a16="http://schemas.microsoft.com/office/drawing/2014/main" id="{B74126B4-1E6C-4FFF-9282-40E18A85A07F}"/>
-              </a:ext>
-            </a:extLst>
-          </p:cNvPr>
-          <p:cNvSpPr>
-            <a:spLocks noGrp="1"/>
-          </p:cNvSpPr>
-          <p:nvPr>
-            <p:ph type="body" sz="quarter" idx="1"/>
-          </p:nvPr>
-        </p:nvSpPr>
-        <p:spPr/>
-        <p:txBody>
-          <a:bodyPr rtlCol="0"/>
-          <a:lstStyle/>
-          <a:p>
-            <a:pPr rtl="0"/>
-            <a:r>
-              <a:rPr lang="de-DE"/>
-              <a:t>Lorem ipsum dolor sit amet</a:t>
-            </a:r>
-          </a:p>
-        </p:txBody>
-      </p:sp>
-      <p:sp>
-        <p:nvSpPr>
-          <p:cNvPr id="5" name="Textplatzhalter 4">
-            <a:extLst>
-              <a:ext uri="{FF2B5EF4-FFF2-40B4-BE49-F238E27FC236}">
-                <a16:creationId xmlns:a16="http://schemas.microsoft.com/office/drawing/2014/main" id="{E0C87788-476B-4620-8002-A5C1177AD6C1}"/>
-              </a:ext>
-            </a:extLst>
-          </p:cNvPr>
-          <p:cNvSpPr>
-            <a:spLocks noGrp="1"/>
-          </p:cNvSpPr>
-          <p:nvPr>
-            <p:ph type="body" sz="quarter" idx="3"/>
-          </p:nvPr>
-        </p:nvSpPr>
-        <p:spPr/>
-        <p:txBody>
-          <a:bodyPr rtlCol="0"/>
-          <a:lstStyle/>
-          <a:p>
-            <a:pPr rtl="0"/>
-            <a:r>
-              <a:rPr lang="de-DE"/>
-              <a:t>Lorem ipsum dolor sit amet</a:t>
-            </a:r>
-          </a:p>
-        </p:txBody>
-      </p:sp>
-      <p:sp>
-        <p:nvSpPr>
-          <p:cNvPr id="8" name="Textplatzhalter 7">
-            <a:extLst>
-              <a:ext uri="{FF2B5EF4-FFF2-40B4-BE49-F238E27FC236}">
-                <a16:creationId xmlns:a16="http://schemas.microsoft.com/office/drawing/2014/main" id="{47DC4E62-1A34-4F98-A451-214F1808519C}"/>
-              </a:ext>
-            </a:extLst>
-          </p:cNvPr>
-          <p:cNvSpPr>
-            <a:spLocks noGrp="1"/>
-          </p:cNvSpPr>
-          <p:nvPr>
-            <p:ph type="body" sz="quarter" idx="2"/>
-          </p:nvPr>
-        </p:nvSpPr>
-        <p:spPr/>
-        <p:txBody>
-          <a:bodyPr rtlCol="0"/>
-          <a:lstStyle/>
-          <a:p>
-            <a:pPr rtl="0"/>
-            <a:r>
-              <a:rPr lang="de-DE"/>
-              <a:t>Lorem ipsum dolor sit amet, consectetuer adipiscing elit. Maecenas porttitor congue massa. Fusce posuere, magna sed pulvinar ultricies, purus lectus malesuada libero, sit amet commodo magna eros quis urna. Nunc viverra imperdiet enim. Fusce est. Vivamus a tellus.</a:t>
-            </a:r>
-          </a:p>
-          <a:p>
-            <a:pPr rtl="0"/>
-            <a:r>
-              <a:rPr lang="de-DE"/>
-              <a:t>Pellentesque habitant morbi tristique senectus et netus et malesuada fames ac turpis egestas. Proin pharetra nonummy pede. Mauris et orci.</a:t>
-            </a:r>
-          </a:p>
-          <a:p>
-            <a:pPr rtl="0"/>
-            <a:endParaRPr lang="de-DE"/>
-          </a:p>
-          <a:p>
-            <a:pPr rtl="0"/>
-            <a:endParaRPr lang="de-DE"/>
-          </a:p>
-        </p:txBody>
-      </p:sp>
-      <p:sp>
-        <p:nvSpPr>
-          <p:cNvPr id="6" name="Textplatzhalter 5">
-            <a:extLst>
-              <a:ext uri="{FF2B5EF4-FFF2-40B4-BE49-F238E27FC236}">
-                <a16:creationId xmlns:a16="http://schemas.microsoft.com/office/drawing/2014/main" id="{000A9570-5EF6-4AFB-9FCA-7C8998E3FEB1}"/>
-              </a:ext>
-            </a:extLst>
-          </p:cNvPr>
-          <p:cNvSpPr>
-            <a:spLocks noGrp="1"/>
-          </p:cNvSpPr>
-          <p:nvPr>
-            <p:ph type="body" sz="quarter" idx="4"/>
-          </p:nvPr>
-        </p:nvSpPr>
-        <p:spPr/>
-        <p:txBody>
-          <a:bodyPr rtlCol="0"/>
-          <a:lstStyle/>
-          <a:p>
-            <a:pPr rtl="0"/>
-            <a:r>
-              <a:rPr lang="de-DE"/>
-              <a:t>Lorem ipsum dolor sit amet, consectetuer adipiscing elit. Maecenas porttitor congue massa. Fusce posuere, magna sed pulvinar ultricies, purus lectus malesuada libero, sit amet commodo magna eros quis urna. Nunc viverra imperdiet enim. Fusce est. Vivamus a tellus.</a:t>
-            </a:r>
-          </a:p>
-          <a:p>
-            <a:pPr rtl="0"/>
-            <a:r>
-              <a:rPr lang="de-DE"/>
-              <a:t>Pellentesque habitant morbi tristique senectus et netus et malesuada fames ac turpis egestas. Proin pharetra nonummy pede. Mauris et orci.</a:t>
-            </a:r>
-          </a:p>
-          <a:p>
-            <a:pPr rtl="0"/>
+            <a:pPr algn="ctr"/>
             <a:endParaRPr lang="de-DE"/>
           </a:p>
         </p:txBody>
@@ -29786,25 +30109,13 @@
     </p:spTree>
     <p:extLst>
       <p:ext uri="{BB962C8B-B14F-4D97-AF65-F5344CB8AC3E}">
-        <p14:creationId xmlns:p14="http://schemas.microsoft.com/office/powerpoint/2010/main" val="3607270498"/>
+        <p14:creationId xmlns:p14="http://schemas.microsoft.com/office/powerpoint/2010/main" val="2280450547"/>
       </p:ext>
     </p:extLst>
   </p:cSld>
   <p:clrMapOvr>
     <a:masterClrMapping/>
   </p:clrMapOvr>
-  <mc:AlternateContent xmlns:mc="http://schemas.openxmlformats.org/markup-compatibility/2006" xmlns:p14="http://schemas.microsoft.com/office/powerpoint/2010/main">
-    <mc:Choice Requires="p14">
-      <p:transition spd="med" p14:dur="700">
-        <p:fade/>
-      </p:transition>
-    </mc:Choice>
-    <mc:Fallback xmlns="">
-      <p:transition spd="med">
-        <p:fade/>
-      </p:transition>
-    </mc:Fallback>
-  </mc:AlternateContent>
 </p:sld>
 </file>
 
@@ -29813,7 +30124,13 @@
   <p:cSld>
     <p:spTree>
       <p:nvGrpSpPr>
-        <p:cNvPr id="1" name=""/>
+        <p:cNvPr id="1" name="">
+          <a:extLst>
+            <a:ext uri="{FF2B5EF4-FFF2-40B4-BE49-F238E27FC236}">
+              <a16:creationId xmlns:a16="http://schemas.microsoft.com/office/drawing/2014/main" id="{44962606-3DAA-6819-54B7-C5888AD9E5BA}"/>
+            </a:ext>
+          </a:extLst>
+        </p:cNvPr>
         <p:cNvGrpSpPr/>
         <p:nvPr/>
       </p:nvGrpSpPr>
@@ -29830,7 +30147,7 @@
           <p:cNvPr id="4" name="Titel 3">
             <a:extLst>
               <a:ext uri="{FF2B5EF4-FFF2-40B4-BE49-F238E27FC236}">
-                <a16:creationId xmlns:a16="http://schemas.microsoft.com/office/drawing/2014/main" id="{315E3981-F0D7-482C-A8E0-6A57700BECA7}"/>
+                <a16:creationId xmlns:a16="http://schemas.microsoft.com/office/drawing/2014/main" id="{67B0999B-DC03-FBBD-B795-ADF91427059E}"/>
               </a:ext>
             </a:extLst>
           </p:cNvPr>
@@ -29841,6 +30158,40 @@
             <p:ph type="title"/>
           </p:nvPr>
         </p:nvSpPr>
+        <p:spPr>
+          <a:xfrm>
+            <a:off x="832103" y="3886200"/>
+            <a:ext cx="8247241" cy="859055"/>
+          </a:xfrm>
+        </p:spPr>
+        <p:txBody>
+          <a:bodyPr rtlCol="0"/>
+          <a:lstStyle/>
+          <a:p>
+            <a:pPr rtl="0"/>
+            <a:r>
+              <a:rPr lang="de-DE"/>
+              <a:t>Abschnittsüberschrift01</a:t>
+            </a:r>
+          </a:p>
+        </p:txBody>
+      </p:sp>
+      <p:sp>
+        <p:nvSpPr>
+          <p:cNvPr id="5" name="Textplatzhalter 4">
+            <a:extLst>
+              <a:ext uri="{FF2B5EF4-FFF2-40B4-BE49-F238E27FC236}">
+                <a16:creationId xmlns:a16="http://schemas.microsoft.com/office/drawing/2014/main" id="{8DD86B78-5861-8FDF-CA1D-3FF874A7A39A}"/>
+              </a:ext>
+            </a:extLst>
+          </p:cNvPr>
+          <p:cNvSpPr>
+            <a:spLocks noGrp="1"/>
+          </p:cNvSpPr>
+          <p:nvPr>
+            <p:ph type="body" idx="1"/>
+          </p:nvPr>
+        </p:nvSpPr>
         <p:spPr/>
         <p:txBody>
           <a:bodyPr rtlCol="0"/>
@@ -29849,337 +30200,17 @@
             <a:pPr rtl="0"/>
             <a:r>
               <a:rPr lang="de-DE"/>
-              <a:t>Titel des Inhalts</a:t>
+              <a:t>Untertitel</a:t>
             </a:r>
           </a:p>
         </p:txBody>
       </p:sp>
-      <p:pic>
-        <p:nvPicPr>
-          <p:cNvPr id="25" name="Bildplatzhalter 24" descr="Balkendiagramm">
-            <a:extLst>
-              <a:ext uri="{FF2B5EF4-FFF2-40B4-BE49-F238E27FC236}">
-                <a16:creationId xmlns:a16="http://schemas.microsoft.com/office/drawing/2014/main" id="{C03AAFA7-022A-47F8-9DA1-7DC3897D1E52}"/>
-              </a:ext>
-            </a:extLst>
-          </p:cNvPr>
-          <p:cNvPicPr>
-            <a:picLocks noGrp="1" noChangeAspect="1"/>
-          </p:cNvPicPr>
-          <p:nvPr>
-            <p:ph type="pic" sz="quarter" idx="13"/>
-          </p:nvPr>
-        </p:nvPicPr>
-        <p:blipFill>
-          <a:blip r:embed="rId3">
-            <a:extLst>
-              <a:ext uri="{28A0092B-C50C-407E-A947-70E740481C1C}">
-                <a14:useLocalDpi xmlns:a14="http://schemas.microsoft.com/office/drawing/2010/main"/>
-              </a:ext>
-              <a:ext uri="{96DAC541-7B7A-43D3-8B79-37D633B846F1}">
-                <asvg:svgBlip xmlns:asvg="http://schemas.microsoft.com/office/drawing/2016/SVG/main" r:embed="rId4"/>
-              </a:ext>
-            </a:extLst>
-          </a:blip>
-          <a:srcRect t="63" b="63"/>
-          <a:stretch>
-            <a:fillRect/>
-          </a:stretch>
-        </p:blipFill>
-        <p:spPr>
-          <a:xfrm>
-            <a:off x="978212" y="2096716"/>
-            <a:ext cx="1259505" cy="1259505"/>
-          </a:xfrm>
-        </p:spPr>
-      </p:pic>
-      <p:sp>
-        <p:nvSpPr>
-          <p:cNvPr id="19" name="Textplatzhalter 18">
-            <a:extLst>
-              <a:ext uri="{FF2B5EF4-FFF2-40B4-BE49-F238E27FC236}">
-                <a16:creationId xmlns:a16="http://schemas.microsoft.com/office/drawing/2014/main" id="{782206B1-586F-4254-9B36-D06C4E294ACF}"/>
-              </a:ext>
-            </a:extLst>
-          </p:cNvPr>
-          <p:cNvSpPr>
-            <a:spLocks noGrp="1"/>
-          </p:cNvSpPr>
-          <p:nvPr>
-            <p:ph type="body" sz="quarter" idx="18"/>
-          </p:nvPr>
-        </p:nvSpPr>
-        <p:spPr/>
-        <p:txBody>
-          <a:bodyPr rtlCol="0"/>
-          <a:lstStyle/>
-          <a:p>
-            <a:pPr rtl="0"/>
-            <a:r>
-              <a:rPr lang="de-DE"/>
-              <a:t>Beschriftung01 wird hier angezeigt</a:t>
-            </a:r>
-          </a:p>
-        </p:txBody>
-      </p:sp>
-      <p:pic>
-        <p:nvPicPr>
-          <p:cNvPr id="27" name="Bildplatzhalter 26" descr="Uhr">
-            <a:extLst>
-              <a:ext uri="{FF2B5EF4-FFF2-40B4-BE49-F238E27FC236}">
-                <a16:creationId xmlns:a16="http://schemas.microsoft.com/office/drawing/2014/main" id="{6F737161-FE67-434D-A781-59EDB9EDCB23}"/>
-              </a:ext>
-            </a:extLst>
-          </p:cNvPr>
-          <p:cNvPicPr>
-            <a:picLocks noGrp="1" noChangeAspect="1"/>
-          </p:cNvPicPr>
-          <p:nvPr>
-            <p:ph type="pic" sz="quarter" idx="14"/>
-          </p:nvPr>
-        </p:nvPicPr>
-        <p:blipFill>
-          <a:blip r:embed="rId5">
-            <a:extLst>
-              <a:ext uri="{28A0092B-C50C-407E-A947-70E740481C1C}">
-                <a14:useLocalDpi xmlns:a14="http://schemas.microsoft.com/office/drawing/2010/main"/>
-              </a:ext>
-              <a:ext uri="{96DAC541-7B7A-43D3-8B79-37D633B846F1}">
-                <asvg:svgBlip xmlns:asvg="http://schemas.microsoft.com/office/drawing/2016/SVG/main" r:embed="rId6"/>
-              </a:ext>
-            </a:extLst>
-          </a:blip>
-          <a:srcRect/>
-          <a:stretch>
-            <a:fillRect/>
-          </a:stretch>
-        </p:blipFill>
-        <p:spPr/>
-      </p:pic>
-      <p:sp>
-        <p:nvSpPr>
-          <p:cNvPr id="20" name="Textplatzhalter 19">
-            <a:extLst>
-              <a:ext uri="{FF2B5EF4-FFF2-40B4-BE49-F238E27FC236}">
-                <a16:creationId xmlns:a16="http://schemas.microsoft.com/office/drawing/2014/main" id="{CB924A29-3538-4A3F-82A6-D2A7538C2111}"/>
-              </a:ext>
-            </a:extLst>
-          </p:cNvPr>
-          <p:cNvSpPr>
-            <a:spLocks noGrp="1"/>
-          </p:cNvSpPr>
-          <p:nvPr>
-            <p:ph type="body" sz="quarter" idx="19"/>
-          </p:nvPr>
-        </p:nvSpPr>
-        <p:spPr/>
-        <p:txBody>
-          <a:bodyPr rtlCol="0"/>
-          <a:lstStyle/>
-          <a:p>
-            <a:pPr rtl="0"/>
-            <a:r>
-              <a:rPr lang="de-DE"/>
-              <a:t>Beschriftung02 wird hier angezeigt</a:t>
-            </a:r>
-          </a:p>
-        </p:txBody>
-      </p:sp>
-      <p:pic>
-        <p:nvPicPr>
-          <p:cNvPr id="29" name="Bildplatzhalter 28" descr="Mikroskop">
-            <a:extLst>
-              <a:ext uri="{FF2B5EF4-FFF2-40B4-BE49-F238E27FC236}">
-                <a16:creationId xmlns:a16="http://schemas.microsoft.com/office/drawing/2014/main" id="{9E5BF01B-21D6-4D43-9CAE-0298685C1A7B}"/>
-              </a:ext>
-            </a:extLst>
-          </p:cNvPr>
-          <p:cNvPicPr>
-            <a:picLocks noGrp="1" noChangeAspect="1"/>
-          </p:cNvPicPr>
-          <p:nvPr>
-            <p:ph type="pic" sz="quarter" idx="15"/>
-          </p:nvPr>
-        </p:nvPicPr>
-        <p:blipFill>
-          <a:blip r:embed="rId7">
-            <a:extLst>
-              <a:ext uri="{28A0092B-C50C-407E-A947-70E740481C1C}">
-                <a14:useLocalDpi xmlns:a14="http://schemas.microsoft.com/office/drawing/2010/main"/>
-              </a:ext>
-              <a:ext uri="{96DAC541-7B7A-43D3-8B79-37D633B846F1}">
-                <asvg:svgBlip xmlns:asvg="http://schemas.microsoft.com/office/drawing/2016/SVG/main" r:embed="rId8"/>
-              </a:ext>
-            </a:extLst>
-          </a:blip>
-          <a:srcRect t="63" b="63"/>
-          <a:stretch>
-            <a:fillRect/>
-          </a:stretch>
-        </p:blipFill>
-        <p:spPr/>
-      </p:pic>
-      <p:sp>
-        <p:nvSpPr>
-          <p:cNvPr id="21" name="Textplatzhalter 20">
-            <a:extLst>
-              <a:ext uri="{FF2B5EF4-FFF2-40B4-BE49-F238E27FC236}">
-                <a16:creationId xmlns:a16="http://schemas.microsoft.com/office/drawing/2014/main" id="{1B8F0371-4F69-4131-91BF-9AB99E6EE89B}"/>
-              </a:ext>
-            </a:extLst>
-          </p:cNvPr>
-          <p:cNvSpPr>
-            <a:spLocks noGrp="1"/>
-          </p:cNvSpPr>
-          <p:nvPr>
-            <p:ph type="body" sz="quarter" idx="20"/>
-          </p:nvPr>
-        </p:nvSpPr>
-        <p:spPr/>
-        <p:txBody>
-          <a:bodyPr rtlCol="0"/>
-          <a:lstStyle/>
-          <a:p>
-            <a:pPr rtl="0"/>
-            <a:r>
-              <a:rPr lang="de-DE"/>
-              <a:t>Beschriftung03 wird hier angezeigt</a:t>
-            </a:r>
-          </a:p>
-        </p:txBody>
-      </p:sp>
-      <p:pic>
-        <p:nvPicPr>
-          <p:cNvPr id="31" name="Bildplatzhalter 30" descr="Lupe">
-            <a:extLst>
-              <a:ext uri="{FF2B5EF4-FFF2-40B4-BE49-F238E27FC236}">
-                <a16:creationId xmlns:a16="http://schemas.microsoft.com/office/drawing/2014/main" id="{089E8AB6-C16E-4752-810F-8F98DB929DB5}"/>
-              </a:ext>
-            </a:extLst>
-          </p:cNvPr>
-          <p:cNvPicPr>
-            <a:picLocks noGrp="1" noChangeAspect="1"/>
-          </p:cNvPicPr>
-          <p:nvPr>
-            <p:ph type="pic" sz="quarter" idx="16"/>
-          </p:nvPr>
-        </p:nvPicPr>
-        <p:blipFill>
-          <a:blip r:embed="rId9">
-            <a:extLst>
-              <a:ext uri="{28A0092B-C50C-407E-A947-70E740481C1C}">
-                <a14:useLocalDpi xmlns:a14="http://schemas.microsoft.com/office/drawing/2010/main"/>
-              </a:ext>
-              <a:ext uri="{96DAC541-7B7A-43D3-8B79-37D633B846F1}">
-                <asvg:svgBlip xmlns:asvg="http://schemas.microsoft.com/office/drawing/2016/SVG/main" r:embed="rId10"/>
-              </a:ext>
-            </a:extLst>
-          </a:blip>
-          <a:srcRect/>
-          <a:stretch>
-            <a:fillRect/>
-          </a:stretch>
-        </p:blipFill>
-        <p:spPr/>
-      </p:pic>
-      <p:sp>
-        <p:nvSpPr>
-          <p:cNvPr id="22" name="Textplatzhalter 21">
-            <a:extLst>
-              <a:ext uri="{FF2B5EF4-FFF2-40B4-BE49-F238E27FC236}">
-                <a16:creationId xmlns:a16="http://schemas.microsoft.com/office/drawing/2014/main" id="{78CACAF1-61EA-4605-A8FE-2EEE752B49FF}"/>
-              </a:ext>
-            </a:extLst>
-          </p:cNvPr>
-          <p:cNvSpPr>
-            <a:spLocks noGrp="1"/>
-          </p:cNvSpPr>
-          <p:nvPr>
-            <p:ph type="body" sz="quarter" idx="21"/>
-          </p:nvPr>
-        </p:nvSpPr>
-        <p:spPr/>
-        <p:txBody>
-          <a:bodyPr rtlCol="0"/>
-          <a:lstStyle/>
-          <a:p>
-            <a:pPr rtl="0"/>
-            <a:r>
-              <a:rPr lang="de-DE"/>
-              <a:t>Beschriftung04 wird hier angezeigt</a:t>
-            </a:r>
-          </a:p>
-        </p:txBody>
-      </p:sp>
-      <p:pic>
-        <p:nvPicPr>
-          <p:cNvPr id="33" name="Bildplatzhalter 32" descr="Kopf mit Zahnrädern">
-            <a:extLst>
-              <a:ext uri="{FF2B5EF4-FFF2-40B4-BE49-F238E27FC236}">
-                <a16:creationId xmlns:a16="http://schemas.microsoft.com/office/drawing/2014/main" id="{CC9DBBE5-5AD0-41E8-A719-84509E5D9F9E}"/>
-              </a:ext>
-            </a:extLst>
-          </p:cNvPr>
-          <p:cNvPicPr>
-            <a:picLocks noGrp="1" noChangeAspect="1"/>
-          </p:cNvPicPr>
-          <p:nvPr>
-            <p:ph type="pic" sz="quarter" idx="17"/>
-          </p:nvPr>
-        </p:nvPicPr>
-        <p:blipFill>
-          <a:blip r:embed="rId11">
-            <a:extLst>
-              <a:ext uri="{28A0092B-C50C-407E-A947-70E740481C1C}">
-                <a14:useLocalDpi xmlns:a14="http://schemas.microsoft.com/office/drawing/2010/main"/>
-              </a:ext>
-              <a:ext uri="{96DAC541-7B7A-43D3-8B79-37D633B846F1}">
-                <asvg:svgBlip xmlns:asvg="http://schemas.microsoft.com/office/drawing/2016/SVG/main" r:embed="rId12"/>
-              </a:ext>
-            </a:extLst>
-          </a:blip>
-          <a:srcRect t="63" b="63"/>
-          <a:stretch>
-            <a:fillRect/>
-          </a:stretch>
-        </p:blipFill>
-        <p:spPr/>
-      </p:pic>
-      <p:sp>
-        <p:nvSpPr>
-          <p:cNvPr id="23" name="Textplatzhalter 22">
-            <a:extLst>
-              <a:ext uri="{FF2B5EF4-FFF2-40B4-BE49-F238E27FC236}">
-                <a16:creationId xmlns:a16="http://schemas.microsoft.com/office/drawing/2014/main" id="{8D05A34F-7712-46DB-AB5B-272E294B62EE}"/>
-              </a:ext>
-            </a:extLst>
-          </p:cNvPr>
-          <p:cNvSpPr>
-            <a:spLocks noGrp="1"/>
-          </p:cNvSpPr>
-          <p:nvPr>
-            <p:ph type="body" sz="quarter" idx="22"/>
-          </p:nvPr>
-        </p:nvSpPr>
-        <p:spPr/>
-        <p:txBody>
-          <a:bodyPr rtlCol="0"/>
-          <a:lstStyle/>
-          <a:p>
-            <a:pPr rtl="0"/>
-            <a:r>
-              <a:rPr lang="de-DE"/>
-              <a:t>Beschriftung05 wird hier angezeigt</a:t>
-            </a:r>
-          </a:p>
-        </p:txBody>
-      </p:sp>
       <p:sp>
         <p:nvSpPr>
           <p:cNvPr id="2" name="Foliennummernplatzhalter 1">
             <a:extLst>
               <a:ext uri="{FF2B5EF4-FFF2-40B4-BE49-F238E27FC236}">
-                <a16:creationId xmlns:a16="http://schemas.microsoft.com/office/drawing/2014/main" id="{CC1F11E7-EDE5-4119-BA64-4FC57C285D19}"/>
+                <a16:creationId xmlns:a16="http://schemas.microsoft.com/office/drawing/2014/main" id="{9B629AA9-0DDC-57C9-7CD2-6A7BE5B4FDE6}"/>
               </a:ext>
             </a:extLst>
           </p:cNvPr>
@@ -30208,7 +30239,7 @@
     </p:spTree>
     <p:extLst>
       <p:ext uri="{BB962C8B-B14F-4D97-AF65-F5344CB8AC3E}">
-        <p14:creationId xmlns:p14="http://schemas.microsoft.com/office/powerpoint/2010/main" val="3892131414"/>
+        <p14:creationId xmlns:p14="http://schemas.microsoft.com/office/powerpoint/2010/main" val="2651543461"/>
       </p:ext>
     </p:extLst>
   </p:cSld>
@@ -30249,10 +30280,10 @@
       </p:grpSpPr>
       <p:sp>
         <p:nvSpPr>
-          <p:cNvPr id="4" name="Titel 3">
-            <a:extLst>
-              <a:ext uri="{FF2B5EF4-FFF2-40B4-BE49-F238E27FC236}">
-                <a16:creationId xmlns:a16="http://schemas.microsoft.com/office/drawing/2014/main" id="{315E3981-F0D7-482C-A8E0-6A57700BECA7}"/>
+          <p:cNvPr id="7" name="Titel 6">
+            <a:extLst>
+              <a:ext uri="{FF2B5EF4-FFF2-40B4-BE49-F238E27FC236}">
+                <a16:creationId xmlns:a16="http://schemas.microsoft.com/office/drawing/2014/main" id="{7875C19A-1AAE-476A-A316-A2CF92D763D3}"/>
               </a:ext>
             </a:extLst>
           </p:cNvPr>
@@ -30276,43 +30307,12 @@
           </a:p>
         </p:txBody>
       </p:sp>
-      <p:pic>
-        <p:nvPicPr>
-          <p:cNvPr id="20" name="Bildplatzhalter 19" descr="Dreieckiges Musterdesign mit Dimension">
-            <a:extLst>
-              <a:ext uri="{FF2B5EF4-FFF2-40B4-BE49-F238E27FC236}">
-                <a16:creationId xmlns:a16="http://schemas.microsoft.com/office/drawing/2014/main" id="{3DCA2B8E-64D3-7645-8DEB-688ED5756F52}"/>
-              </a:ext>
-            </a:extLst>
-          </p:cNvPr>
-          <p:cNvPicPr>
-            <a:picLocks noGrp="1" noChangeAspect="1"/>
-          </p:cNvPicPr>
-          <p:nvPr>
-            <p:ph type="pic" sz="quarter" idx="19"/>
-          </p:nvPr>
-        </p:nvPicPr>
-        <p:blipFill>
-          <a:blip r:embed="rId3">
-            <a:extLst>
-              <a:ext uri="{28A0092B-C50C-407E-A947-70E740481C1C}">
-                <a14:useLocalDpi xmlns:a14="http://schemas.microsoft.com/office/drawing/2010/main" val="0"/>
-              </a:ext>
-            </a:extLst>
-          </a:blip>
-          <a:srcRect/>
-          <a:stretch>
-            <a:fillRect/>
-          </a:stretch>
-        </p:blipFill>
-        <p:spPr/>
-      </p:pic>
-      <p:sp>
-        <p:nvSpPr>
-          <p:cNvPr id="19" name="Textplatzhalter 18">
-            <a:extLst>
-              <a:ext uri="{FF2B5EF4-FFF2-40B4-BE49-F238E27FC236}">
-                <a16:creationId xmlns:a16="http://schemas.microsoft.com/office/drawing/2014/main" id="{782206B1-586F-4254-9B36-D06C4E294ACF}"/>
+      <p:sp>
+        <p:nvSpPr>
+          <p:cNvPr id="10" name="Textplatzhalter 9">
+            <a:extLst>
+              <a:ext uri="{FF2B5EF4-FFF2-40B4-BE49-F238E27FC236}">
+                <a16:creationId xmlns:a16="http://schemas.microsoft.com/office/drawing/2014/main" id="{EF2BC084-E6DB-4DE7-B309-042A85EBA700}"/>
               </a:ext>
             </a:extLst>
           </p:cNvPr>
@@ -30320,7 +30320,7 @@
             <a:spLocks noGrp="1"/>
           </p:cNvSpPr>
           <p:nvPr>
-            <p:ph type="body" sz="quarter" idx="18"/>
+            <p:ph type="body" sz="quarter" idx="13"/>
           </p:nvPr>
         </p:nvSpPr>
         <p:spPr/>
@@ -30331,65 +30331,21 @@
             <a:pPr rtl="0"/>
             <a:r>
               <a:rPr lang="de-DE"/>
-              <a:t>Beschriftung01 wird hier angezeigt</a:t>
+              <a:t>Lorem ipsum dolor sit amet, consectetuer adipiscing elit. Maecenas porttitor congue massa. Fusce posuere, magna sed pulvinar ultricies, purus lectus malesuada libero, sit amet commodo magna eros quis urna.</a:t>
             </a:r>
           </a:p>
-        </p:txBody>
-      </p:sp>
-      <p:sp>
-        <p:nvSpPr>
-          <p:cNvPr id="21" name="Textplatzhalter 20">
-            <a:extLst>
-              <a:ext uri="{FF2B5EF4-FFF2-40B4-BE49-F238E27FC236}">
-                <a16:creationId xmlns:a16="http://schemas.microsoft.com/office/drawing/2014/main" id="{1B8F0371-4F69-4131-91BF-9AB99E6EE89B}"/>
-              </a:ext>
-            </a:extLst>
-          </p:cNvPr>
-          <p:cNvSpPr>
-            <a:spLocks noGrp="1"/>
-          </p:cNvSpPr>
-          <p:nvPr>
-            <p:ph type="body" sz="quarter" idx="20"/>
-          </p:nvPr>
-        </p:nvSpPr>
-        <p:spPr/>
-        <p:txBody>
-          <a:bodyPr rtlCol="0"/>
-          <a:lstStyle/>
           <a:p>
             <a:pPr rtl="0"/>
             <a:r>
               <a:rPr lang="de-DE"/>
-              <a:t>Beschriftung02 wird hier angezeigt</a:t>
+              <a:t>Nunc viverra imperdiet enim. Fusce est. Vivamus a tellus.</a:t>
             </a:r>
           </a:p>
-        </p:txBody>
-      </p:sp>
-      <p:sp>
-        <p:nvSpPr>
-          <p:cNvPr id="22" name="Textplatzhalter 21">
-            <a:extLst>
-              <a:ext uri="{FF2B5EF4-FFF2-40B4-BE49-F238E27FC236}">
-                <a16:creationId xmlns:a16="http://schemas.microsoft.com/office/drawing/2014/main" id="{78CACAF1-61EA-4605-A8FE-2EEE752B49FF}"/>
-              </a:ext>
-            </a:extLst>
-          </p:cNvPr>
-          <p:cNvSpPr>
-            <a:spLocks noGrp="1"/>
-          </p:cNvSpPr>
-          <p:nvPr>
-            <p:ph type="body" sz="quarter" idx="21"/>
-          </p:nvPr>
-        </p:nvSpPr>
-        <p:spPr/>
-        <p:txBody>
-          <a:bodyPr rtlCol="0"/>
-          <a:lstStyle/>
           <a:p>
             <a:pPr rtl="0"/>
             <a:r>
               <a:rPr lang="de-DE"/>
-              <a:t>Beschriftung03 wird hier angezeigt</a:t>
+              <a:t>Pellentesque habitant morbi tristique senectus et netus et malesuada fames ac turpis egestas. Proin pharetra nonummy pede. Mauris et orci.</a:t>
             </a:r>
           </a:p>
         </p:txBody>
@@ -30399,7 +30355,7 @@
           <p:cNvPr id="2" name="Foliennummernplatzhalter 1">
             <a:extLst>
               <a:ext uri="{FF2B5EF4-FFF2-40B4-BE49-F238E27FC236}">
-                <a16:creationId xmlns:a16="http://schemas.microsoft.com/office/drawing/2014/main" id="{2F478C69-0A1D-45FF-8600-ED903803FFE1}"/>
+                <a16:creationId xmlns:a16="http://schemas.microsoft.com/office/drawing/2014/main" id="{BE9800F6-D571-48C4-8466-12AA1ADB6599}"/>
               </a:ext>
             </a:extLst>
           </p:cNvPr>
@@ -30428,7 +30384,7 @@
     </p:spTree>
     <p:extLst>
       <p:ext uri="{BB962C8B-B14F-4D97-AF65-F5344CB8AC3E}">
-        <p14:creationId xmlns:p14="http://schemas.microsoft.com/office/powerpoint/2010/main" val="451187730"/>
+        <p14:creationId xmlns:p14="http://schemas.microsoft.com/office/powerpoint/2010/main" val="3733486012"/>
       </p:ext>
     </p:extLst>
   </p:cSld>
@@ -30496,6 +30452,892 @@
           </a:p>
         </p:txBody>
       </p:sp>
+      <p:sp>
+        <p:nvSpPr>
+          <p:cNvPr id="2" name="Foliennummernplatzhalter 1">
+            <a:extLst>
+              <a:ext uri="{FF2B5EF4-FFF2-40B4-BE49-F238E27FC236}">
+                <a16:creationId xmlns:a16="http://schemas.microsoft.com/office/drawing/2014/main" id="{520FC4EE-F318-4344-9E3C-B950ADB63865}"/>
+              </a:ext>
+            </a:extLst>
+          </p:cNvPr>
+          <p:cNvSpPr>
+            <a:spLocks noGrp="1"/>
+          </p:cNvSpPr>
+          <p:nvPr>
+            <p:ph type="sldNum" sz="quarter" idx="12"/>
+          </p:nvPr>
+        </p:nvSpPr>
+        <p:spPr/>
+        <p:txBody>
+          <a:bodyPr rtlCol="0"/>
+          <a:lstStyle/>
+          <a:p>
+            <a:pPr rtl="0"/>
+            <a:fld id="{C263D6C4-4840-40CC-AC84-17E24B3B7BDE}" type="slidenum">
+              <a:rPr lang="de-DE" smtClean="0"/>
+              <a:pPr rtl="0"/>
+              <a:t>23</a:t>
+            </a:fld>
+            <a:endParaRPr lang="de-DE"/>
+          </a:p>
+        </p:txBody>
+      </p:sp>
+      <p:sp>
+        <p:nvSpPr>
+          <p:cNvPr id="7" name="Textplatzhalter 6">
+            <a:extLst>
+              <a:ext uri="{FF2B5EF4-FFF2-40B4-BE49-F238E27FC236}">
+                <a16:creationId xmlns:a16="http://schemas.microsoft.com/office/drawing/2014/main" id="{B74126B4-1E6C-4FFF-9282-40E18A85A07F}"/>
+              </a:ext>
+            </a:extLst>
+          </p:cNvPr>
+          <p:cNvSpPr>
+            <a:spLocks noGrp="1"/>
+          </p:cNvSpPr>
+          <p:nvPr>
+            <p:ph type="body" sz="quarter" idx="1"/>
+          </p:nvPr>
+        </p:nvSpPr>
+        <p:spPr/>
+        <p:txBody>
+          <a:bodyPr rtlCol="0"/>
+          <a:lstStyle/>
+          <a:p>
+            <a:pPr rtl="0"/>
+            <a:r>
+              <a:rPr lang="de-DE"/>
+              <a:t>Lorem ipsum dolor sit amet</a:t>
+            </a:r>
+          </a:p>
+        </p:txBody>
+      </p:sp>
+      <p:sp>
+        <p:nvSpPr>
+          <p:cNvPr id="5" name="Textplatzhalter 4">
+            <a:extLst>
+              <a:ext uri="{FF2B5EF4-FFF2-40B4-BE49-F238E27FC236}">
+                <a16:creationId xmlns:a16="http://schemas.microsoft.com/office/drawing/2014/main" id="{E0C87788-476B-4620-8002-A5C1177AD6C1}"/>
+              </a:ext>
+            </a:extLst>
+          </p:cNvPr>
+          <p:cNvSpPr>
+            <a:spLocks noGrp="1"/>
+          </p:cNvSpPr>
+          <p:nvPr>
+            <p:ph type="body" sz="quarter" idx="3"/>
+          </p:nvPr>
+        </p:nvSpPr>
+        <p:spPr/>
+        <p:txBody>
+          <a:bodyPr rtlCol="0"/>
+          <a:lstStyle/>
+          <a:p>
+            <a:pPr rtl="0"/>
+            <a:r>
+              <a:rPr lang="de-DE"/>
+              <a:t>Lorem ipsum dolor sit amet</a:t>
+            </a:r>
+          </a:p>
+        </p:txBody>
+      </p:sp>
+      <p:sp>
+        <p:nvSpPr>
+          <p:cNvPr id="8" name="Textplatzhalter 7">
+            <a:extLst>
+              <a:ext uri="{FF2B5EF4-FFF2-40B4-BE49-F238E27FC236}">
+                <a16:creationId xmlns:a16="http://schemas.microsoft.com/office/drawing/2014/main" id="{47DC4E62-1A34-4F98-A451-214F1808519C}"/>
+              </a:ext>
+            </a:extLst>
+          </p:cNvPr>
+          <p:cNvSpPr>
+            <a:spLocks noGrp="1"/>
+          </p:cNvSpPr>
+          <p:nvPr>
+            <p:ph type="body" sz="quarter" idx="2"/>
+          </p:nvPr>
+        </p:nvSpPr>
+        <p:spPr/>
+        <p:txBody>
+          <a:bodyPr rtlCol="0"/>
+          <a:lstStyle/>
+          <a:p>
+            <a:pPr rtl="0"/>
+            <a:r>
+              <a:rPr lang="de-DE"/>
+              <a:t>Lorem ipsum dolor sit amet, consectetuer adipiscing elit. Maecenas porttitor congue massa. Fusce posuere, magna sed pulvinar ultricies, purus lectus malesuada libero, sit amet commodo magna eros quis urna. Nunc viverra imperdiet enim. Fusce est. Vivamus a tellus.</a:t>
+            </a:r>
+          </a:p>
+          <a:p>
+            <a:pPr rtl="0"/>
+            <a:r>
+              <a:rPr lang="de-DE"/>
+              <a:t>Pellentesque habitant morbi tristique senectus et netus et malesuada fames ac turpis egestas. Proin pharetra nonummy pede. Mauris et orci.</a:t>
+            </a:r>
+          </a:p>
+          <a:p>
+            <a:pPr rtl="0"/>
+            <a:endParaRPr lang="de-DE"/>
+          </a:p>
+          <a:p>
+            <a:pPr rtl="0"/>
+            <a:endParaRPr lang="de-DE"/>
+          </a:p>
+        </p:txBody>
+      </p:sp>
+      <p:sp>
+        <p:nvSpPr>
+          <p:cNvPr id="6" name="Textplatzhalter 5">
+            <a:extLst>
+              <a:ext uri="{FF2B5EF4-FFF2-40B4-BE49-F238E27FC236}">
+                <a16:creationId xmlns:a16="http://schemas.microsoft.com/office/drawing/2014/main" id="{000A9570-5EF6-4AFB-9FCA-7C8998E3FEB1}"/>
+              </a:ext>
+            </a:extLst>
+          </p:cNvPr>
+          <p:cNvSpPr>
+            <a:spLocks noGrp="1"/>
+          </p:cNvSpPr>
+          <p:nvPr>
+            <p:ph type="body" sz="quarter" idx="4"/>
+          </p:nvPr>
+        </p:nvSpPr>
+        <p:spPr/>
+        <p:txBody>
+          <a:bodyPr rtlCol="0"/>
+          <a:lstStyle/>
+          <a:p>
+            <a:pPr rtl="0"/>
+            <a:r>
+              <a:rPr lang="de-DE"/>
+              <a:t>Lorem ipsum dolor sit amet, consectetuer adipiscing elit. Maecenas porttitor congue massa. Fusce posuere, magna sed pulvinar ultricies, purus lectus malesuada libero, sit amet commodo magna eros quis urna. Nunc viverra imperdiet enim. Fusce est. Vivamus a tellus.</a:t>
+            </a:r>
+          </a:p>
+          <a:p>
+            <a:pPr rtl="0"/>
+            <a:r>
+              <a:rPr lang="de-DE"/>
+              <a:t>Pellentesque habitant morbi tristique senectus et netus et malesuada fames ac turpis egestas. Proin pharetra nonummy pede. Mauris et orci.</a:t>
+            </a:r>
+          </a:p>
+          <a:p>
+            <a:pPr rtl="0"/>
+            <a:endParaRPr lang="de-DE"/>
+          </a:p>
+        </p:txBody>
+      </p:sp>
+    </p:spTree>
+    <p:extLst>
+      <p:ext uri="{BB962C8B-B14F-4D97-AF65-F5344CB8AC3E}">
+        <p14:creationId xmlns:p14="http://schemas.microsoft.com/office/powerpoint/2010/main" val="3607270498"/>
+      </p:ext>
+    </p:extLst>
+  </p:cSld>
+  <p:clrMapOvr>
+    <a:masterClrMapping/>
+  </p:clrMapOvr>
+  <mc:AlternateContent xmlns:mc="http://schemas.openxmlformats.org/markup-compatibility/2006" xmlns:p14="http://schemas.microsoft.com/office/powerpoint/2010/main">
+    <mc:Choice Requires="p14">
+      <p:transition spd="med" p14:dur="700">
+        <p:fade/>
+      </p:transition>
+    </mc:Choice>
+    <mc:Fallback xmlns="">
+      <p:transition spd="med">
+        <p:fade/>
+      </p:transition>
+    </mc:Fallback>
+  </mc:AlternateContent>
+</p:sld>
+</file>
+
+<file path=ppt/slides/slide24.xml><?xml version="1.0" encoding="utf-8"?>
+<p:sld xmlns:a="http://schemas.openxmlformats.org/drawingml/2006/main" xmlns:r="http://schemas.openxmlformats.org/officeDocument/2006/relationships" xmlns:p="http://schemas.openxmlformats.org/presentationml/2006/main">
+  <p:cSld>
+    <p:spTree>
+      <p:nvGrpSpPr>
+        <p:cNvPr id="1" name=""/>
+        <p:cNvGrpSpPr/>
+        <p:nvPr/>
+      </p:nvGrpSpPr>
+      <p:grpSpPr>
+        <a:xfrm>
+          <a:off x="0" y="0"/>
+          <a:ext cx="0" cy="0"/>
+          <a:chOff x="0" y="0"/>
+          <a:chExt cx="0" cy="0"/>
+        </a:xfrm>
+      </p:grpSpPr>
+      <p:sp>
+        <p:nvSpPr>
+          <p:cNvPr id="4" name="Titel 3">
+            <a:extLst>
+              <a:ext uri="{FF2B5EF4-FFF2-40B4-BE49-F238E27FC236}">
+                <a16:creationId xmlns:a16="http://schemas.microsoft.com/office/drawing/2014/main" id="{315E3981-F0D7-482C-A8E0-6A57700BECA7}"/>
+              </a:ext>
+            </a:extLst>
+          </p:cNvPr>
+          <p:cNvSpPr>
+            <a:spLocks noGrp="1"/>
+          </p:cNvSpPr>
+          <p:nvPr>
+            <p:ph type="title"/>
+          </p:nvPr>
+        </p:nvSpPr>
+        <p:spPr/>
+        <p:txBody>
+          <a:bodyPr rtlCol="0"/>
+          <a:lstStyle/>
+          <a:p>
+            <a:pPr rtl="0"/>
+            <a:r>
+              <a:rPr lang="de-DE"/>
+              <a:t>Titel des Inhalts</a:t>
+            </a:r>
+          </a:p>
+        </p:txBody>
+      </p:sp>
+      <p:pic>
+        <p:nvPicPr>
+          <p:cNvPr id="25" name="Bildplatzhalter 24" descr="Balkendiagramm">
+            <a:extLst>
+              <a:ext uri="{FF2B5EF4-FFF2-40B4-BE49-F238E27FC236}">
+                <a16:creationId xmlns:a16="http://schemas.microsoft.com/office/drawing/2014/main" id="{C03AAFA7-022A-47F8-9DA1-7DC3897D1E52}"/>
+              </a:ext>
+            </a:extLst>
+          </p:cNvPr>
+          <p:cNvPicPr>
+            <a:picLocks noGrp="1" noChangeAspect="1"/>
+          </p:cNvPicPr>
+          <p:nvPr>
+            <p:ph type="pic" sz="quarter" idx="13"/>
+          </p:nvPr>
+        </p:nvPicPr>
+        <p:blipFill>
+          <a:blip r:embed="rId3">
+            <a:extLst>
+              <a:ext uri="{28A0092B-C50C-407E-A947-70E740481C1C}">
+                <a14:useLocalDpi xmlns:a14="http://schemas.microsoft.com/office/drawing/2010/main"/>
+              </a:ext>
+              <a:ext uri="{96DAC541-7B7A-43D3-8B79-37D633B846F1}">
+                <asvg:svgBlip xmlns:asvg="http://schemas.microsoft.com/office/drawing/2016/SVG/main" r:embed="rId4"/>
+              </a:ext>
+            </a:extLst>
+          </a:blip>
+          <a:srcRect t="63" b="63"/>
+          <a:stretch>
+            <a:fillRect/>
+          </a:stretch>
+        </p:blipFill>
+        <p:spPr>
+          <a:xfrm>
+            <a:off x="978212" y="2096716"/>
+            <a:ext cx="1259505" cy="1259505"/>
+          </a:xfrm>
+        </p:spPr>
+      </p:pic>
+      <p:sp>
+        <p:nvSpPr>
+          <p:cNvPr id="19" name="Textplatzhalter 18">
+            <a:extLst>
+              <a:ext uri="{FF2B5EF4-FFF2-40B4-BE49-F238E27FC236}">
+                <a16:creationId xmlns:a16="http://schemas.microsoft.com/office/drawing/2014/main" id="{782206B1-586F-4254-9B36-D06C4E294ACF}"/>
+              </a:ext>
+            </a:extLst>
+          </p:cNvPr>
+          <p:cNvSpPr>
+            <a:spLocks noGrp="1"/>
+          </p:cNvSpPr>
+          <p:nvPr>
+            <p:ph type="body" sz="quarter" idx="18"/>
+          </p:nvPr>
+        </p:nvSpPr>
+        <p:spPr/>
+        <p:txBody>
+          <a:bodyPr rtlCol="0"/>
+          <a:lstStyle/>
+          <a:p>
+            <a:pPr rtl="0"/>
+            <a:r>
+              <a:rPr lang="de-DE"/>
+              <a:t>Beschriftung01 wird hier angezeigt</a:t>
+            </a:r>
+          </a:p>
+        </p:txBody>
+      </p:sp>
+      <p:pic>
+        <p:nvPicPr>
+          <p:cNvPr id="27" name="Bildplatzhalter 26" descr="Uhr">
+            <a:extLst>
+              <a:ext uri="{FF2B5EF4-FFF2-40B4-BE49-F238E27FC236}">
+                <a16:creationId xmlns:a16="http://schemas.microsoft.com/office/drawing/2014/main" id="{6F737161-FE67-434D-A781-59EDB9EDCB23}"/>
+              </a:ext>
+            </a:extLst>
+          </p:cNvPr>
+          <p:cNvPicPr>
+            <a:picLocks noGrp="1" noChangeAspect="1"/>
+          </p:cNvPicPr>
+          <p:nvPr>
+            <p:ph type="pic" sz="quarter" idx="14"/>
+          </p:nvPr>
+        </p:nvPicPr>
+        <p:blipFill>
+          <a:blip r:embed="rId5">
+            <a:extLst>
+              <a:ext uri="{28A0092B-C50C-407E-A947-70E740481C1C}">
+                <a14:useLocalDpi xmlns:a14="http://schemas.microsoft.com/office/drawing/2010/main"/>
+              </a:ext>
+              <a:ext uri="{96DAC541-7B7A-43D3-8B79-37D633B846F1}">
+                <asvg:svgBlip xmlns:asvg="http://schemas.microsoft.com/office/drawing/2016/SVG/main" r:embed="rId6"/>
+              </a:ext>
+            </a:extLst>
+          </a:blip>
+          <a:srcRect/>
+          <a:stretch>
+            <a:fillRect/>
+          </a:stretch>
+        </p:blipFill>
+        <p:spPr/>
+      </p:pic>
+      <p:sp>
+        <p:nvSpPr>
+          <p:cNvPr id="20" name="Textplatzhalter 19">
+            <a:extLst>
+              <a:ext uri="{FF2B5EF4-FFF2-40B4-BE49-F238E27FC236}">
+                <a16:creationId xmlns:a16="http://schemas.microsoft.com/office/drawing/2014/main" id="{CB924A29-3538-4A3F-82A6-D2A7538C2111}"/>
+              </a:ext>
+            </a:extLst>
+          </p:cNvPr>
+          <p:cNvSpPr>
+            <a:spLocks noGrp="1"/>
+          </p:cNvSpPr>
+          <p:nvPr>
+            <p:ph type="body" sz="quarter" idx="19"/>
+          </p:nvPr>
+        </p:nvSpPr>
+        <p:spPr/>
+        <p:txBody>
+          <a:bodyPr rtlCol="0"/>
+          <a:lstStyle/>
+          <a:p>
+            <a:pPr rtl="0"/>
+            <a:r>
+              <a:rPr lang="de-DE"/>
+              <a:t>Beschriftung02 wird hier angezeigt</a:t>
+            </a:r>
+          </a:p>
+        </p:txBody>
+      </p:sp>
+      <p:pic>
+        <p:nvPicPr>
+          <p:cNvPr id="29" name="Bildplatzhalter 28" descr="Mikroskop">
+            <a:extLst>
+              <a:ext uri="{FF2B5EF4-FFF2-40B4-BE49-F238E27FC236}">
+                <a16:creationId xmlns:a16="http://schemas.microsoft.com/office/drawing/2014/main" id="{9E5BF01B-21D6-4D43-9CAE-0298685C1A7B}"/>
+              </a:ext>
+            </a:extLst>
+          </p:cNvPr>
+          <p:cNvPicPr>
+            <a:picLocks noGrp="1" noChangeAspect="1"/>
+          </p:cNvPicPr>
+          <p:nvPr>
+            <p:ph type="pic" sz="quarter" idx="15"/>
+          </p:nvPr>
+        </p:nvPicPr>
+        <p:blipFill>
+          <a:blip r:embed="rId7">
+            <a:extLst>
+              <a:ext uri="{28A0092B-C50C-407E-A947-70E740481C1C}">
+                <a14:useLocalDpi xmlns:a14="http://schemas.microsoft.com/office/drawing/2010/main"/>
+              </a:ext>
+              <a:ext uri="{96DAC541-7B7A-43D3-8B79-37D633B846F1}">
+                <asvg:svgBlip xmlns:asvg="http://schemas.microsoft.com/office/drawing/2016/SVG/main" r:embed="rId8"/>
+              </a:ext>
+            </a:extLst>
+          </a:blip>
+          <a:srcRect t="63" b="63"/>
+          <a:stretch>
+            <a:fillRect/>
+          </a:stretch>
+        </p:blipFill>
+        <p:spPr/>
+      </p:pic>
+      <p:sp>
+        <p:nvSpPr>
+          <p:cNvPr id="21" name="Textplatzhalter 20">
+            <a:extLst>
+              <a:ext uri="{FF2B5EF4-FFF2-40B4-BE49-F238E27FC236}">
+                <a16:creationId xmlns:a16="http://schemas.microsoft.com/office/drawing/2014/main" id="{1B8F0371-4F69-4131-91BF-9AB99E6EE89B}"/>
+              </a:ext>
+            </a:extLst>
+          </p:cNvPr>
+          <p:cNvSpPr>
+            <a:spLocks noGrp="1"/>
+          </p:cNvSpPr>
+          <p:nvPr>
+            <p:ph type="body" sz="quarter" idx="20"/>
+          </p:nvPr>
+        </p:nvSpPr>
+        <p:spPr/>
+        <p:txBody>
+          <a:bodyPr rtlCol="0"/>
+          <a:lstStyle/>
+          <a:p>
+            <a:pPr rtl="0"/>
+            <a:r>
+              <a:rPr lang="de-DE"/>
+              <a:t>Beschriftung03 wird hier angezeigt</a:t>
+            </a:r>
+          </a:p>
+        </p:txBody>
+      </p:sp>
+      <p:pic>
+        <p:nvPicPr>
+          <p:cNvPr id="31" name="Bildplatzhalter 30" descr="Lupe">
+            <a:extLst>
+              <a:ext uri="{FF2B5EF4-FFF2-40B4-BE49-F238E27FC236}">
+                <a16:creationId xmlns:a16="http://schemas.microsoft.com/office/drawing/2014/main" id="{089E8AB6-C16E-4752-810F-8F98DB929DB5}"/>
+              </a:ext>
+            </a:extLst>
+          </p:cNvPr>
+          <p:cNvPicPr>
+            <a:picLocks noGrp="1" noChangeAspect="1"/>
+          </p:cNvPicPr>
+          <p:nvPr>
+            <p:ph type="pic" sz="quarter" idx="16"/>
+          </p:nvPr>
+        </p:nvPicPr>
+        <p:blipFill>
+          <a:blip r:embed="rId9">
+            <a:extLst>
+              <a:ext uri="{28A0092B-C50C-407E-A947-70E740481C1C}">
+                <a14:useLocalDpi xmlns:a14="http://schemas.microsoft.com/office/drawing/2010/main"/>
+              </a:ext>
+              <a:ext uri="{96DAC541-7B7A-43D3-8B79-37D633B846F1}">
+                <asvg:svgBlip xmlns:asvg="http://schemas.microsoft.com/office/drawing/2016/SVG/main" r:embed="rId10"/>
+              </a:ext>
+            </a:extLst>
+          </a:blip>
+          <a:srcRect/>
+          <a:stretch>
+            <a:fillRect/>
+          </a:stretch>
+        </p:blipFill>
+        <p:spPr/>
+      </p:pic>
+      <p:sp>
+        <p:nvSpPr>
+          <p:cNvPr id="22" name="Textplatzhalter 21">
+            <a:extLst>
+              <a:ext uri="{FF2B5EF4-FFF2-40B4-BE49-F238E27FC236}">
+                <a16:creationId xmlns:a16="http://schemas.microsoft.com/office/drawing/2014/main" id="{78CACAF1-61EA-4605-A8FE-2EEE752B49FF}"/>
+              </a:ext>
+            </a:extLst>
+          </p:cNvPr>
+          <p:cNvSpPr>
+            <a:spLocks noGrp="1"/>
+          </p:cNvSpPr>
+          <p:nvPr>
+            <p:ph type="body" sz="quarter" idx="21"/>
+          </p:nvPr>
+        </p:nvSpPr>
+        <p:spPr/>
+        <p:txBody>
+          <a:bodyPr rtlCol="0"/>
+          <a:lstStyle/>
+          <a:p>
+            <a:pPr rtl="0"/>
+            <a:r>
+              <a:rPr lang="de-DE"/>
+              <a:t>Beschriftung04 wird hier angezeigt</a:t>
+            </a:r>
+          </a:p>
+        </p:txBody>
+      </p:sp>
+      <p:pic>
+        <p:nvPicPr>
+          <p:cNvPr id="33" name="Bildplatzhalter 32" descr="Kopf mit Zahnrädern">
+            <a:extLst>
+              <a:ext uri="{FF2B5EF4-FFF2-40B4-BE49-F238E27FC236}">
+                <a16:creationId xmlns:a16="http://schemas.microsoft.com/office/drawing/2014/main" id="{CC9DBBE5-5AD0-41E8-A719-84509E5D9F9E}"/>
+              </a:ext>
+            </a:extLst>
+          </p:cNvPr>
+          <p:cNvPicPr>
+            <a:picLocks noGrp="1" noChangeAspect="1"/>
+          </p:cNvPicPr>
+          <p:nvPr>
+            <p:ph type="pic" sz="quarter" idx="17"/>
+          </p:nvPr>
+        </p:nvPicPr>
+        <p:blipFill>
+          <a:blip r:embed="rId11">
+            <a:extLst>
+              <a:ext uri="{28A0092B-C50C-407E-A947-70E740481C1C}">
+                <a14:useLocalDpi xmlns:a14="http://schemas.microsoft.com/office/drawing/2010/main"/>
+              </a:ext>
+              <a:ext uri="{96DAC541-7B7A-43D3-8B79-37D633B846F1}">
+                <asvg:svgBlip xmlns:asvg="http://schemas.microsoft.com/office/drawing/2016/SVG/main" r:embed="rId12"/>
+              </a:ext>
+            </a:extLst>
+          </a:blip>
+          <a:srcRect t="63" b="63"/>
+          <a:stretch>
+            <a:fillRect/>
+          </a:stretch>
+        </p:blipFill>
+        <p:spPr/>
+      </p:pic>
+      <p:sp>
+        <p:nvSpPr>
+          <p:cNvPr id="23" name="Textplatzhalter 22">
+            <a:extLst>
+              <a:ext uri="{FF2B5EF4-FFF2-40B4-BE49-F238E27FC236}">
+                <a16:creationId xmlns:a16="http://schemas.microsoft.com/office/drawing/2014/main" id="{8D05A34F-7712-46DB-AB5B-272E294B62EE}"/>
+              </a:ext>
+            </a:extLst>
+          </p:cNvPr>
+          <p:cNvSpPr>
+            <a:spLocks noGrp="1"/>
+          </p:cNvSpPr>
+          <p:nvPr>
+            <p:ph type="body" sz="quarter" idx="22"/>
+          </p:nvPr>
+        </p:nvSpPr>
+        <p:spPr/>
+        <p:txBody>
+          <a:bodyPr rtlCol="0"/>
+          <a:lstStyle/>
+          <a:p>
+            <a:pPr rtl="0"/>
+            <a:r>
+              <a:rPr lang="de-DE"/>
+              <a:t>Beschriftung05 wird hier angezeigt</a:t>
+            </a:r>
+          </a:p>
+        </p:txBody>
+      </p:sp>
+      <p:sp>
+        <p:nvSpPr>
+          <p:cNvPr id="2" name="Foliennummernplatzhalter 1">
+            <a:extLst>
+              <a:ext uri="{FF2B5EF4-FFF2-40B4-BE49-F238E27FC236}">
+                <a16:creationId xmlns:a16="http://schemas.microsoft.com/office/drawing/2014/main" id="{CC1F11E7-EDE5-4119-BA64-4FC57C285D19}"/>
+              </a:ext>
+            </a:extLst>
+          </p:cNvPr>
+          <p:cNvSpPr>
+            <a:spLocks noGrp="1"/>
+          </p:cNvSpPr>
+          <p:nvPr>
+            <p:ph type="sldNum" sz="quarter" idx="12"/>
+          </p:nvPr>
+        </p:nvSpPr>
+        <p:spPr/>
+        <p:txBody>
+          <a:bodyPr rtlCol="0"/>
+          <a:lstStyle/>
+          <a:p>
+            <a:pPr rtl="0"/>
+            <a:fld id="{C263D6C4-4840-40CC-AC84-17E24B3B7BDE}" type="slidenum">
+              <a:rPr lang="de-DE" smtClean="0"/>
+              <a:pPr rtl="0"/>
+              <a:t>24</a:t>
+            </a:fld>
+            <a:endParaRPr lang="de-DE"/>
+          </a:p>
+        </p:txBody>
+      </p:sp>
+    </p:spTree>
+    <p:extLst>
+      <p:ext uri="{BB962C8B-B14F-4D97-AF65-F5344CB8AC3E}">
+        <p14:creationId xmlns:p14="http://schemas.microsoft.com/office/powerpoint/2010/main" val="3892131414"/>
+      </p:ext>
+    </p:extLst>
+  </p:cSld>
+  <p:clrMapOvr>
+    <a:masterClrMapping/>
+  </p:clrMapOvr>
+  <mc:AlternateContent xmlns:mc="http://schemas.openxmlformats.org/markup-compatibility/2006" xmlns:p14="http://schemas.microsoft.com/office/powerpoint/2010/main">
+    <mc:Choice Requires="p14">
+      <p:transition spd="med" p14:dur="700">
+        <p:fade/>
+      </p:transition>
+    </mc:Choice>
+    <mc:Fallback xmlns="">
+      <p:transition spd="med">
+        <p:fade/>
+      </p:transition>
+    </mc:Fallback>
+  </mc:AlternateContent>
+</p:sld>
+</file>
+
+<file path=ppt/slides/slide25.xml><?xml version="1.0" encoding="utf-8"?>
+<p:sld xmlns:a="http://schemas.openxmlformats.org/drawingml/2006/main" xmlns:r="http://schemas.openxmlformats.org/officeDocument/2006/relationships" xmlns:p="http://schemas.openxmlformats.org/presentationml/2006/main">
+  <p:cSld>
+    <p:spTree>
+      <p:nvGrpSpPr>
+        <p:cNvPr id="1" name=""/>
+        <p:cNvGrpSpPr/>
+        <p:nvPr/>
+      </p:nvGrpSpPr>
+      <p:grpSpPr>
+        <a:xfrm>
+          <a:off x="0" y="0"/>
+          <a:ext cx="0" cy="0"/>
+          <a:chOff x="0" y="0"/>
+          <a:chExt cx="0" cy="0"/>
+        </a:xfrm>
+      </p:grpSpPr>
+      <p:sp>
+        <p:nvSpPr>
+          <p:cNvPr id="4" name="Titel 3">
+            <a:extLst>
+              <a:ext uri="{FF2B5EF4-FFF2-40B4-BE49-F238E27FC236}">
+                <a16:creationId xmlns:a16="http://schemas.microsoft.com/office/drawing/2014/main" id="{315E3981-F0D7-482C-A8E0-6A57700BECA7}"/>
+              </a:ext>
+            </a:extLst>
+          </p:cNvPr>
+          <p:cNvSpPr>
+            <a:spLocks noGrp="1"/>
+          </p:cNvSpPr>
+          <p:nvPr>
+            <p:ph type="title"/>
+          </p:nvPr>
+        </p:nvSpPr>
+        <p:spPr/>
+        <p:txBody>
+          <a:bodyPr rtlCol="0"/>
+          <a:lstStyle/>
+          <a:p>
+            <a:pPr rtl="0"/>
+            <a:r>
+              <a:rPr lang="de-DE"/>
+              <a:t>Titel des Inhalts</a:t>
+            </a:r>
+          </a:p>
+        </p:txBody>
+      </p:sp>
+      <p:pic>
+        <p:nvPicPr>
+          <p:cNvPr id="20" name="Bildplatzhalter 19" descr="Dreieckiges Musterdesign mit Dimension">
+            <a:extLst>
+              <a:ext uri="{FF2B5EF4-FFF2-40B4-BE49-F238E27FC236}">
+                <a16:creationId xmlns:a16="http://schemas.microsoft.com/office/drawing/2014/main" id="{3DCA2B8E-64D3-7645-8DEB-688ED5756F52}"/>
+              </a:ext>
+            </a:extLst>
+          </p:cNvPr>
+          <p:cNvPicPr>
+            <a:picLocks noGrp="1" noChangeAspect="1"/>
+          </p:cNvPicPr>
+          <p:nvPr>
+            <p:ph type="pic" sz="quarter" idx="19"/>
+          </p:nvPr>
+        </p:nvPicPr>
+        <p:blipFill>
+          <a:blip r:embed="rId3">
+            <a:extLst>
+              <a:ext uri="{28A0092B-C50C-407E-A947-70E740481C1C}">
+                <a14:useLocalDpi xmlns:a14="http://schemas.microsoft.com/office/drawing/2010/main" val="0"/>
+              </a:ext>
+            </a:extLst>
+          </a:blip>
+          <a:srcRect/>
+          <a:stretch>
+            <a:fillRect/>
+          </a:stretch>
+        </p:blipFill>
+        <p:spPr/>
+      </p:pic>
+      <p:sp>
+        <p:nvSpPr>
+          <p:cNvPr id="19" name="Textplatzhalter 18">
+            <a:extLst>
+              <a:ext uri="{FF2B5EF4-FFF2-40B4-BE49-F238E27FC236}">
+                <a16:creationId xmlns:a16="http://schemas.microsoft.com/office/drawing/2014/main" id="{782206B1-586F-4254-9B36-D06C4E294ACF}"/>
+              </a:ext>
+            </a:extLst>
+          </p:cNvPr>
+          <p:cNvSpPr>
+            <a:spLocks noGrp="1"/>
+          </p:cNvSpPr>
+          <p:nvPr>
+            <p:ph type="body" sz="quarter" idx="18"/>
+          </p:nvPr>
+        </p:nvSpPr>
+        <p:spPr/>
+        <p:txBody>
+          <a:bodyPr rtlCol="0"/>
+          <a:lstStyle/>
+          <a:p>
+            <a:pPr rtl="0"/>
+            <a:r>
+              <a:rPr lang="de-DE"/>
+              <a:t>Beschriftung01 wird hier angezeigt</a:t>
+            </a:r>
+          </a:p>
+        </p:txBody>
+      </p:sp>
+      <p:sp>
+        <p:nvSpPr>
+          <p:cNvPr id="21" name="Textplatzhalter 20">
+            <a:extLst>
+              <a:ext uri="{FF2B5EF4-FFF2-40B4-BE49-F238E27FC236}">
+                <a16:creationId xmlns:a16="http://schemas.microsoft.com/office/drawing/2014/main" id="{1B8F0371-4F69-4131-91BF-9AB99E6EE89B}"/>
+              </a:ext>
+            </a:extLst>
+          </p:cNvPr>
+          <p:cNvSpPr>
+            <a:spLocks noGrp="1"/>
+          </p:cNvSpPr>
+          <p:nvPr>
+            <p:ph type="body" sz="quarter" idx="20"/>
+          </p:nvPr>
+        </p:nvSpPr>
+        <p:spPr/>
+        <p:txBody>
+          <a:bodyPr rtlCol="0"/>
+          <a:lstStyle/>
+          <a:p>
+            <a:pPr rtl="0"/>
+            <a:r>
+              <a:rPr lang="de-DE"/>
+              <a:t>Beschriftung02 wird hier angezeigt</a:t>
+            </a:r>
+          </a:p>
+        </p:txBody>
+      </p:sp>
+      <p:sp>
+        <p:nvSpPr>
+          <p:cNvPr id="22" name="Textplatzhalter 21">
+            <a:extLst>
+              <a:ext uri="{FF2B5EF4-FFF2-40B4-BE49-F238E27FC236}">
+                <a16:creationId xmlns:a16="http://schemas.microsoft.com/office/drawing/2014/main" id="{78CACAF1-61EA-4605-A8FE-2EEE752B49FF}"/>
+              </a:ext>
+            </a:extLst>
+          </p:cNvPr>
+          <p:cNvSpPr>
+            <a:spLocks noGrp="1"/>
+          </p:cNvSpPr>
+          <p:nvPr>
+            <p:ph type="body" sz="quarter" idx="21"/>
+          </p:nvPr>
+        </p:nvSpPr>
+        <p:spPr/>
+        <p:txBody>
+          <a:bodyPr rtlCol="0"/>
+          <a:lstStyle/>
+          <a:p>
+            <a:pPr rtl="0"/>
+            <a:r>
+              <a:rPr lang="de-DE"/>
+              <a:t>Beschriftung03 wird hier angezeigt</a:t>
+            </a:r>
+          </a:p>
+        </p:txBody>
+      </p:sp>
+      <p:sp>
+        <p:nvSpPr>
+          <p:cNvPr id="2" name="Foliennummernplatzhalter 1">
+            <a:extLst>
+              <a:ext uri="{FF2B5EF4-FFF2-40B4-BE49-F238E27FC236}">
+                <a16:creationId xmlns:a16="http://schemas.microsoft.com/office/drawing/2014/main" id="{2F478C69-0A1D-45FF-8600-ED903803FFE1}"/>
+              </a:ext>
+            </a:extLst>
+          </p:cNvPr>
+          <p:cNvSpPr>
+            <a:spLocks noGrp="1"/>
+          </p:cNvSpPr>
+          <p:nvPr>
+            <p:ph type="sldNum" sz="quarter" idx="12"/>
+          </p:nvPr>
+        </p:nvSpPr>
+        <p:spPr/>
+        <p:txBody>
+          <a:bodyPr rtlCol="0"/>
+          <a:lstStyle/>
+          <a:p>
+            <a:pPr rtl="0"/>
+            <a:fld id="{C263D6C4-4840-40CC-AC84-17E24B3B7BDE}" type="slidenum">
+              <a:rPr lang="de-DE" smtClean="0"/>
+              <a:pPr rtl="0"/>
+              <a:t>25</a:t>
+            </a:fld>
+            <a:endParaRPr lang="de-DE"/>
+          </a:p>
+        </p:txBody>
+      </p:sp>
+    </p:spTree>
+    <p:extLst>
+      <p:ext uri="{BB962C8B-B14F-4D97-AF65-F5344CB8AC3E}">
+        <p14:creationId xmlns:p14="http://schemas.microsoft.com/office/powerpoint/2010/main" val="451187730"/>
+      </p:ext>
+    </p:extLst>
+  </p:cSld>
+  <p:clrMapOvr>
+    <a:masterClrMapping/>
+  </p:clrMapOvr>
+  <mc:AlternateContent xmlns:mc="http://schemas.openxmlformats.org/markup-compatibility/2006" xmlns:p14="http://schemas.microsoft.com/office/powerpoint/2010/main">
+    <mc:Choice Requires="p14">
+      <p:transition spd="med" p14:dur="700">
+        <p:fade/>
+      </p:transition>
+    </mc:Choice>
+    <mc:Fallback xmlns="">
+      <p:transition spd="med">
+        <p:fade/>
+      </p:transition>
+    </mc:Fallback>
+  </mc:AlternateContent>
+</p:sld>
+</file>
+
+<file path=ppt/slides/slide26.xml><?xml version="1.0" encoding="utf-8"?>
+<p:sld xmlns:a="http://schemas.openxmlformats.org/drawingml/2006/main" xmlns:r="http://schemas.openxmlformats.org/officeDocument/2006/relationships" xmlns:p="http://schemas.openxmlformats.org/presentationml/2006/main">
+  <p:cSld>
+    <p:spTree>
+      <p:nvGrpSpPr>
+        <p:cNvPr id="1" name=""/>
+        <p:cNvGrpSpPr/>
+        <p:nvPr/>
+      </p:nvGrpSpPr>
+      <p:grpSpPr>
+        <a:xfrm>
+          <a:off x="0" y="0"/>
+          <a:ext cx="0" cy="0"/>
+          <a:chOff x="0" y="0"/>
+          <a:chExt cx="0" cy="0"/>
+        </a:xfrm>
+      </p:grpSpPr>
+      <p:sp>
+        <p:nvSpPr>
+          <p:cNvPr id="4" name="Titel 3">
+            <a:extLst>
+              <a:ext uri="{FF2B5EF4-FFF2-40B4-BE49-F238E27FC236}">
+                <a16:creationId xmlns:a16="http://schemas.microsoft.com/office/drawing/2014/main" id="{315E3981-F0D7-482C-A8E0-6A57700BECA7}"/>
+              </a:ext>
+            </a:extLst>
+          </p:cNvPr>
+          <p:cNvSpPr>
+            <a:spLocks noGrp="1"/>
+          </p:cNvSpPr>
+          <p:nvPr>
+            <p:ph type="title"/>
+          </p:nvPr>
+        </p:nvSpPr>
+        <p:spPr/>
+        <p:txBody>
+          <a:bodyPr rtlCol="0"/>
+          <a:lstStyle/>
+          <a:p>
+            <a:pPr rtl="0"/>
+            <a:r>
+              <a:rPr lang="de-DE"/>
+              <a:t>Titel des Inhalts</a:t>
+            </a:r>
+          </a:p>
+        </p:txBody>
+      </p:sp>
       <p:pic>
         <p:nvPicPr>
           <p:cNvPr id="8" name="Bildplatzhalter 7" descr="Dreieckiges Musterdesign mit Dimension">
@@ -30591,7 +31433,7 @@
             <a:fld id="{C263D6C4-4840-40CC-AC84-17E24B3B7BDE}" type="slidenum">
               <a:rPr lang="de-DE" smtClean="0"/>
               <a:pPr rtl="0"/>
-              <a:t>23</a:t>
+              <a:t>26</a:t>
             </a:fld>
             <a:endParaRPr lang="de-DE"/>
           </a:p>
@@ -30622,7 +31464,7 @@
 </p:sld>
 </file>
 
-<file path=ppt/slides/slide24.xml><?xml version="1.0" encoding="utf-8"?>
+<file path=ppt/slides/slide27.xml><?xml version="1.0" encoding="utf-8"?>
 <p:sld xmlns:a="http://schemas.openxmlformats.org/drawingml/2006/main" xmlns:r="http://schemas.openxmlformats.org/officeDocument/2006/relationships" xmlns:p="http://schemas.openxmlformats.org/presentationml/2006/main">
   <p:cSld>
     <p:spTree>
@@ -32490,7 +33332,7 @@
             <a:fld id="{C263D6C4-4840-40CC-AC84-17E24B3B7BDE}" type="slidenum">
               <a:rPr lang="de-DE" smtClean="0"/>
               <a:pPr rtl="0"/>
-              <a:t>24</a:t>
+              <a:t>27</a:t>
             </a:fld>
             <a:endParaRPr lang="de-DE"/>
           </a:p>
@@ -32521,7 +33363,7 @@
 </p:sld>
 </file>
 
-<file path=ppt/slides/slide25.xml><?xml version="1.0" encoding="utf-8"?>
+<file path=ppt/slides/slide28.xml><?xml version="1.0" encoding="utf-8"?>
 <p:sld xmlns:a="http://schemas.openxmlformats.org/drawingml/2006/main" xmlns:r="http://schemas.openxmlformats.org/officeDocument/2006/relationships" xmlns:p="http://schemas.openxmlformats.org/presentationml/2006/main">
   <p:cSld>
     <p:spTree>
@@ -32620,7 +33462,7 @@
             <a:fld id="{C263D6C4-4840-40CC-AC84-17E24B3B7BDE}" type="slidenum">
               <a:rPr lang="de-DE" smtClean="0"/>
               <a:pPr rtl="0"/>
-              <a:t>25</a:t>
+              <a:t>28</a:t>
             </a:fld>
             <a:endParaRPr lang="de-DE" dirty="0"/>
           </a:p>
@@ -32651,7 +33493,7 @@
 </p:sld>
 </file>
 
-<file path=ppt/slides/slide26.xml><?xml version="1.0" encoding="utf-8"?>
+<file path=ppt/slides/slide29.xml><?xml version="1.0" encoding="utf-8"?>
 <p:sld xmlns:a="http://schemas.openxmlformats.org/drawingml/2006/main" xmlns:r="http://schemas.openxmlformats.org/officeDocument/2006/relationships" xmlns:p="http://schemas.openxmlformats.org/presentationml/2006/main">
   <p:cSld>
     <p:spTree>
@@ -32738,7 +33580,7 @@
             <a:fld id="{C263D6C4-4840-40CC-AC84-17E24B3B7BDE}" type="slidenum">
               <a:rPr lang="de-DE" smtClean="0"/>
               <a:pPr rtl="0"/>
-              <a:t>26</a:t>
+              <a:t>29</a:t>
             </a:fld>
             <a:endParaRPr lang="de-DE"/>
           </a:p>
@@ -33334,7 +34176,7 @@
             <a:pPr rtl="0"/>
             <a:r>
               <a:rPr lang="de-DE" dirty="0"/>
-              <a:t>Spezifikation</a:t>
+              <a:t>Use-Case-Diagramm</a:t>
             </a:r>
           </a:p>
         </p:txBody>
@@ -33361,10 +34203,7 @@
           <a:lstStyle/>
           <a:p>
             <a:pPr rtl="0"/>
-            <a:r>
-              <a:rPr lang="de-DE" dirty="0"/>
-              <a:t>Bild Use-Case-Diagramm</a:t>
-            </a:r>
+            <a:endParaRPr lang="de-DE" dirty="0"/>
           </a:p>
         </p:txBody>
       </p:sp>
@@ -33399,6 +34238,36 @@
           </a:p>
         </p:txBody>
       </p:sp>
+      <p:pic>
+        <p:nvPicPr>
+          <p:cNvPr id="4" name="Grafik 3" descr="Ein Bild, das Diagramm, Reihe, Kreis enthält.&#10;&#10;KI-generierte Inhalte können fehlerhaft sein.">
+            <a:extLst>
+              <a:ext uri="{FF2B5EF4-FFF2-40B4-BE49-F238E27FC236}">
+                <a16:creationId xmlns:a16="http://schemas.microsoft.com/office/drawing/2014/main" id="{27227AFF-98B8-2B9F-9873-76EE677D6898}"/>
+              </a:ext>
+            </a:extLst>
+          </p:cNvPr>
+          <p:cNvPicPr>
+            <a:picLocks noChangeAspect="1"/>
+          </p:cNvPicPr>
+          <p:nvPr/>
+        </p:nvPicPr>
+        <p:blipFill>
+          <a:blip r:embed="rId3"/>
+          <a:stretch>
+            <a:fillRect/>
+          </a:stretch>
+        </p:blipFill>
+        <p:spPr>
+          <a:xfrm>
+            <a:off x="2684285" y="1493167"/>
+            <a:ext cx="6823430" cy="3871665"/>
+          </a:xfrm>
+          <a:prstGeom prst="rect">
+            <a:avLst/>
+          </a:prstGeom>
+        </p:spPr>
+      </p:pic>
     </p:spTree>
     <p:extLst>
       <p:ext uri="{BB962C8B-B14F-4D97-AF65-F5344CB8AC3E}">
@@ -33615,7 +34484,7 @@
             <a:pPr rtl="0"/>
             <a:r>
               <a:rPr lang="de-DE" dirty="0"/>
-              <a:t>Spezifikation</a:t>
+              <a:t>ER-Modell</a:t>
             </a:r>
           </a:p>
         </p:txBody>
@@ -33642,10 +34511,7 @@
           <a:lstStyle/>
           <a:p>
             <a:pPr rtl="0"/>
-            <a:r>
-              <a:rPr lang="de-DE" dirty="0"/>
-              <a:t>Bild ER-Diagramm</a:t>
-            </a:r>
+            <a:endParaRPr lang="de-DE" dirty="0"/>
           </a:p>
         </p:txBody>
       </p:sp>
@@ -33680,6 +34546,36 @@
           </a:p>
         </p:txBody>
       </p:sp>
+      <p:pic>
+        <p:nvPicPr>
+          <p:cNvPr id="4" name="Grafik 3" descr="Ein Bild, das Text, Diagramm, Screenshot, Schrift enthält.&#10;&#10;KI-generierte Inhalte können fehlerhaft sein.">
+            <a:extLst>
+              <a:ext uri="{FF2B5EF4-FFF2-40B4-BE49-F238E27FC236}">
+                <a16:creationId xmlns:a16="http://schemas.microsoft.com/office/drawing/2014/main" id="{A8D56A7C-CDD8-6E73-29C0-43149F7460B5}"/>
+              </a:ext>
+            </a:extLst>
+          </p:cNvPr>
+          <p:cNvPicPr>
+            <a:picLocks noChangeAspect="1"/>
+          </p:cNvPicPr>
+          <p:nvPr/>
+        </p:nvPicPr>
+        <p:blipFill>
+          <a:blip r:embed="rId3"/>
+          <a:stretch>
+            <a:fillRect/>
+          </a:stretch>
+        </p:blipFill>
+        <p:spPr>
+          <a:xfrm>
+            <a:off x="2893872" y="1214837"/>
+            <a:ext cx="6315355" cy="4914338"/>
+          </a:xfrm>
+          <a:prstGeom prst="rect">
+            <a:avLst/>
+          </a:prstGeom>
+        </p:spPr>
+      </p:pic>
     </p:spTree>
     <p:extLst>
       <p:ext uri="{BB962C8B-B14F-4D97-AF65-F5344CB8AC3E}">
@@ -33752,7 +34648,7 @@
             <a:pPr rtl="0"/>
             <a:r>
               <a:rPr lang="de-DE" dirty="0"/>
-              <a:t>Spezifikation</a:t>
+              <a:t>Spezifikation – Abgrenzung und Scopes</a:t>
             </a:r>
           </a:p>
         </p:txBody>
@@ -34798,15 +35694,6 @@
 </file>
 
 <file path=customXml/item2.xml><?xml version="1.0" encoding="utf-8"?>
-<?mso-contentType ?>
-<FormTemplates xmlns="http://schemas.microsoft.com/sharepoint/v3/contenttype/forms">
-  <Display>DocumentLibraryForm</Display>
-  <Edit>DocumentLibraryForm</Edit>
-  <New>DocumentLibraryForm</New>
-</FormTemplates>
-</file>
-
-<file path=customXml/item3.xml><?xml version="1.0" encoding="utf-8"?>
 <ct:contentTypeSchema xmlns:ct="http://schemas.microsoft.com/office/2006/metadata/contentType" xmlns:ma="http://schemas.microsoft.com/office/2006/metadata/properties/metaAttributes" ct:_="" ma:_="" ma:contentTypeName="Document" ma:contentTypeID="0x010100DEEA25CC0A0AC24199CDC46C25B8B0BC" ma:contentTypeVersion="10" ma:contentTypeDescription="Create a new document." ma:contentTypeScope="" ma:versionID="e3b47856d4cf355c0dacb39e1084d14f">
   <xsd:schema xmlns:xsd="http://www.w3.org/2001/XMLSchema" xmlns:xs="http://www.w3.org/2001/XMLSchema" xmlns:p="http://schemas.microsoft.com/office/2006/metadata/properties" xmlns:ns1="http://schemas.microsoft.com/sharepoint/v3" xmlns:ns2="6dc4bcd6-49db-4c07-9060-8acfc67cef9f" xmlns:ns3="fb0879af-3eba-417a-a55a-ffe6dcd6ca77" targetNamespace="http://schemas.microsoft.com/office/2006/metadata/properties" ma:root="true" ma:fieldsID="a845a615265fdb1f7b12cc65ac20ecbd" ns1:_="" ns2:_="" ns3:_="">
     <xsd:import namespace="http://schemas.microsoft.com/sharepoint/v3"/>
@@ -35014,6 +35901,15 @@
 </ct:contentTypeSchema>
 </file>
 
+<file path=customXml/item3.xml><?xml version="1.0" encoding="utf-8"?>
+<?mso-contentType ?>
+<FormTemplates xmlns="http://schemas.microsoft.com/sharepoint/v3/contenttype/forms">
+  <Display>DocumentLibraryForm</Display>
+  <Edit>DocumentLibraryForm</Edit>
+  <New>DocumentLibraryForm</New>
+</FormTemplates>
+</file>
+
 <file path=customXml/itemProps1.xml><?xml version="1.0" encoding="utf-8"?>
 <ds:datastoreItem xmlns:ds="http://schemas.openxmlformats.org/officeDocument/2006/customXml" ds:itemID="{F8992231-163D-4428-A2B8-DA1FE0274129}">
   <ds:schemaRefs>
@@ -35033,14 +35929,6 @@
 </file>
 
 <file path=customXml/itemProps2.xml><?xml version="1.0" encoding="utf-8"?>
-<ds:datastoreItem xmlns:ds="http://schemas.openxmlformats.org/officeDocument/2006/customXml" ds:itemID="{8A95DE24-D6C3-4A00-9085-D9594C193AE1}">
-  <ds:schemaRefs>
-    <ds:schemaRef ds:uri="http://schemas.microsoft.com/sharepoint/v3/contenttype/forms"/>
-  </ds:schemaRefs>
-</ds:datastoreItem>
-</file>
-
-<file path=customXml/itemProps3.xml><?xml version="1.0" encoding="utf-8"?>
 <ds:datastoreItem xmlns:ds="http://schemas.openxmlformats.org/officeDocument/2006/customXml" ds:itemID="{6B67ACAB-C3DC-429D-A23C-0723C084FEE5}">
   <ds:schemaRefs>
     <ds:schemaRef ds:uri="http://schemas.microsoft.com/office/2006/metadata/contentType"/>
@@ -35058,4 +35946,12 @@
     <ds:schemaRef ds:uri="http://schemas.microsoft.com/internal/obd"/>
   </ds:schemaRefs>
 </ds:datastoreItem>
+</file>
+
+<file path=customXml/itemProps3.xml><?xml version="1.0" encoding="utf-8"?>
+<ds:datastoreItem xmlns:ds="http://schemas.openxmlformats.org/officeDocument/2006/customXml" ds:itemID="{8A95DE24-D6C3-4A00-9085-D9594C193AE1}">
+  <ds:schemaRefs>
+    <ds:schemaRef ds:uri="http://schemas.microsoft.com/sharepoint/v3/contenttype/forms"/>
+  </ds:schemaRefs>
+</ds:datastoreItem>
 </file>
</xml_diff>

<commit_message>
PPT bearbeitet MRO --> Meine Notizen ergänzt
</commit_message>
<xml_diff>
--- a/Fallstudie_Kochbuch.pptx
+++ b/Fallstudie_Kochbuch.pptx
@@ -1667,8 +1667,60 @@
           <a:bodyPr rtlCol="0"/>
           <a:lstStyle/>
           <a:p>
-            <a:pPr rtl="0"/>
-            <a:endParaRPr lang="de-DE"/>
+            <a:pPr marL="285750" indent="-285750" rtl="0">
+              <a:buFont typeface="Arial" panose="020B0604020202020204" pitchFamily="34" charset="0"/>
+              <a:buChar char="•"/>
+            </a:pPr>
+            <a:r>
+              <a:rPr lang="de-DE" sz="1800" dirty="0">
+                <a:effectLst/>
+                <a:latin typeface="Aptos" panose="020B0004020202020204" pitchFamily="34" charset="0"/>
+                <a:ea typeface="Aptos" panose="020B0004020202020204" pitchFamily="34" charset="0"/>
+                <a:cs typeface="Times New Roman" panose="02020603050405020304" pitchFamily="18" charset="0"/>
+              </a:rPr>
+              <a:t>Herzlich willkommen …</a:t>
+            </a:r>
+          </a:p>
+          <a:p>
+            <a:pPr marL="285750" marR="0" lvl="0" indent="-285750" algn="l" defTabSz="914400" rtl="0" eaLnBrk="1" fontAlgn="auto" latinLnBrk="0" hangingPunct="1">
+              <a:lnSpc>
+                <a:spcPct val="100000"/>
+              </a:lnSpc>
+              <a:spcBef>
+                <a:spcPts val="0"/>
+              </a:spcBef>
+              <a:spcAft>
+                <a:spcPts val="0"/>
+              </a:spcAft>
+              <a:buClrTx/>
+              <a:buSzTx/>
+              <a:buFont typeface="Arial" panose="020B0604020202020204" pitchFamily="34" charset="0"/>
+              <a:buChar char="•"/>
+              <a:tabLst/>
+              <a:defRPr/>
+            </a:pPr>
+            <a:r>
+              <a:rPr lang="de-DE" sz="1800" dirty="0"/>
+              <a:t>Im Rahmen des Kurses Fallstudie Software-Engineering wurden wir beauftragt ein Projekt zu erstellen im Sinne des SE</a:t>
+            </a:r>
+          </a:p>
+          <a:p>
+            <a:pPr marL="742950" lvl="1" indent="-285750" rtl="0">
+              <a:buFont typeface="Arial" panose="020B0604020202020204" pitchFamily="34" charset="0"/>
+              <a:buChar char="•"/>
+            </a:pPr>
+            <a:r>
+              <a:rPr lang="de-DE" sz="1800" dirty="0">
+                <a:effectLst/>
+                <a:latin typeface="Aptos" panose="020B0004020202020204" pitchFamily="34" charset="0"/>
+                <a:cs typeface="Times New Roman" panose="02020603050405020304" pitchFamily="18" charset="0"/>
+              </a:rPr>
+              <a:t>Unser Projekt </a:t>
+            </a:r>
+            <a:r>
+              <a:rPr lang="de-DE" sz="1200" dirty="0"/>
+              <a:t>Kochbuch wird nun von uns 4 im Verlauf und dem bisherigen Stand vorgetragen</a:t>
+            </a:r>
           </a:p>
         </p:txBody>
       </p:sp>
@@ -1771,8 +1823,34 @@
           <a:bodyPr rtlCol="0"/>
           <a:lstStyle/>
           <a:p>
-            <a:pPr rtl="0"/>
-            <a:endParaRPr lang="de-DE"/>
+            <a:pPr marL="171450" indent="-171450" rtl="0">
+              <a:buFont typeface="Arial" panose="020B0604020202020204" pitchFamily="34" charset="0"/>
+              <a:buChar char="•"/>
+            </a:pPr>
+            <a:r>
+              <a:rPr lang="de-DE" dirty="0"/>
+              <a:t>Nachdem ihr jetzt einen Überblick über den Ursprung unseres Projekts, die Marktumgebung und unsere Spezifikation bekommen habt, möchte ich euch nun zeigen, wie wir intern als Team gearbeitet haben. </a:t>
+            </a:r>
+          </a:p>
+          <a:p>
+            <a:pPr marL="171450" indent="-171450" rtl="0">
+              <a:buFont typeface="Arial" panose="020B0604020202020204" pitchFamily="34" charset="0"/>
+              <a:buChar char="•"/>
+            </a:pPr>
+            <a:r>
+              <a:rPr lang="de-DE" dirty="0"/>
+              <a:t>In diesem Abschnitt geht es um unsere Zusammenarbeit, die Aufgabenverteilung, die genutzten Tools und Plattformen </a:t>
+            </a:r>
+          </a:p>
+          <a:p>
+            <a:pPr marL="628650" lvl="1" indent="-171450" rtl="0">
+              <a:buFont typeface="Arial" panose="020B0604020202020204" pitchFamily="34" charset="0"/>
+              <a:buChar char="•"/>
+            </a:pPr>
+            <a:r>
+              <a:rPr lang="de-DE" dirty="0"/>
+              <a:t>– aber auch um Herausforderungen, mit denen wir im Laufe der Entwicklung konfrontiert waren.</a:t>
+            </a:r>
           </a:p>
         </p:txBody>
       </p:sp>
@@ -1881,8 +1959,176 @@
           <a:bodyPr rtlCol="0"/>
           <a:lstStyle/>
           <a:p>
-            <a:pPr rtl="0"/>
-            <a:endParaRPr lang="de-DE"/>
+            <a:pPr marL="285750" indent="-285750" algn="just">
+              <a:lnSpc>
+                <a:spcPct val="150000"/>
+              </a:lnSpc>
+              <a:spcAft>
+                <a:spcPts val="600"/>
+              </a:spcAft>
+              <a:buFont typeface="Arial" panose="020B0604020202020204" pitchFamily="34" charset="0"/>
+              <a:buChar char="•"/>
+            </a:pPr>
+            <a:r>
+              <a:rPr lang="de-DE" sz="1800" kern="100" dirty="0">
+                <a:effectLst/>
+                <a:latin typeface="Aptos" panose="020B0004020202020204" pitchFamily="34" charset="0"/>
+                <a:ea typeface="Aptos" panose="020B0004020202020204" pitchFamily="34" charset="0"/>
+                <a:cs typeface="Times New Roman" panose="02020603050405020304" pitchFamily="18" charset="0"/>
+              </a:rPr>
+              <a:t>Zu Beginn unseres Projekts stand ein Kick-off-Meeting, in dem wir uns als Team organisiert und erste Rollen verteilt haben. </a:t>
+            </a:r>
+          </a:p>
+          <a:p>
+            <a:pPr marL="285750" indent="-285750" algn="just">
+              <a:lnSpc>
+                <a:spcPct val="150000"/>
+              </a:lnSpc>
+              <a:spcAft>
+                <a:spcPts val="600"/>
+              </a:spcAft>
+              <a:buFont typeface="Arial" panose="020B0604020202020204" pitchFamily="34" charset="0"/>
+              <a:buChar char="•"/>
+            </a:pPr>
+            <a:r>
+              <a:rPr lang="de-DE" sz="1800" kern="100" dirty="0">
+                <a:effectLst/>
+                <a:latin typeface="Aptos" panose="020B0004020202020204" pitchFamily="34" charset="0"/>
+                <a:ea typeface="Aptos" panose="020B0004020202020204" pitchFamily="34" charset="0"/>
+                <a:cs typeface="Times New Roman" panose="02020603050405020304" pitchFamily="18" charset="0"/>
+              </a:rPr>
+              <a:t>Wir haben dort versucht, die individuellen Stärken jedes Teammitglieds zu identifizieren, um die Aufgaben möglichst effizient zu verteilen.</a:t>
+            </a:r>
+          </a:p>
+          <a:p>
+            <a:pPr marL="285750" indent="-285750" algn="just">
+              <a:lnSpc>
+                <a:spcPct val="150000"/>
+              </a:lnSpc>
+              <a:spcAft>
+                <a:spcPts val="600"/>
+              </a:spcAft>
+              <a:buFont typeface="Arial" panose="020B0604020202020204" pitchFamily="34" charset="0"/>
+              <a:buChar char="•"/>
+            </a:pPr>
+            <a:r>
+              <a:rPr lang="de-DE" sz="1800" kern="100" dirty="0">
+                <a:effectLst/>
+                <a:latin typeface="Aptos" panose="020B0004020202020204" pitchFamily="34" charset="0"/>
+                <a:ea typeface="Aptos" panose="020B0004020202020204" pitchFamily="34" charset="0"/>
+                <a:cs typeface="Times New Roman" panose="02020603050405020304" pitchFamily="18" charset="0"/>
+              </a:rPr>
+              <a:t>Für die laufende Zusammenarbeit haben wir verschiedene Kommunikationskanäle genutzt. </a:t>
+            </a:r>
+          </a:p>
+          <a:p>
+            <a:pPr marL="285750" indent="-285750" algn="just">
+              <a:lnSpc>
+                <a:spcPct val="150000"/>
+              </a:lnSpc>
+              <a:spcAft>
+                <a:spcPts val="600"/>
+              </a:spcAft>
+              <a:buFont typeface="Arial" panose="020B0604020202020204" pitchFamily="34" charset="0"/>
+              <a:buChar char="•"/>
+            </a:pPr>
+            <a:r>
+              <a:rPr lang="de-DE" sz="1800" kern="100" dirty="0">
+                <a:effectLst/>
+                <a:latin typeface="Aptos" panose="020B0004020202020204" pitchFamily="34" charset="0"/>
+                <a:ea typeface="Aptos" panose="020B0004020202020204" pitchFamily="34" charset="0"/>
+                <a:cs typeface="Times New Roman" panose="02020603050405020304" pitchFamily="18" charset="0"/>
+              </a:rPr>
+              <a:t>Die schnelle, informelle Abstimmung erfolgte über WhatsApp </a:t>
+            </a:r>
+          </a:p>
+          <a:p>
+            <a:pPr marL="742950" lvl="1" indent="-285750" algn="just">
+              <a:lnSpc>
+                <a:spcPct val="150000"/>
+              </a:lnSpc>
+              <a:spcAft>
+                <a:spcPts val="600"/>
+              </a:spcAft>
+              <a:buFont typeface="Arial" panose="020B0604020202020204" pitchFamily="34" charset="0"/>
+              <a:buChar char="•"/>
+            </a:pPr>
+            <a:r>
+              <a:rPr lang="de-DE" sz="1800" kern="100" dirty="0">
+                <a:effectLst/>
+                <a:latin typeface="Aptos" panose="020B0004020202020204" pitchFamily="34" charset="0"/>
+                <a:ea typeface="Aptos" panose="020B0004020202020204" pitchFamily="34" charset="0"/>
+                <a:cs typeface="Times New Roman" panose="02020603050405020304" pitchFamily="18" charset="0"/>
+              </a:rPr>
+              <a:t>– das war besonders hilfreich, wenn spontan Fragen auftauchten oder kurzfristige Entscheidungen nötig waren. </a:t>
+            </a:r>
+          </a:p>
+          <a:p>
+            <a:pPr marL="285750" lvl="0" indent="-285750" algn="just">
+              <a:lnSpc>
+                <a:spcPct val="150000"/>
+              </a:lnSpc>
+              <a:spcAft>
+                <a:spcPts val="600"/>
+              </a:spcAft>
+              <a:buFont typeface="Arial" panose="020B0604020202020204" pitchFamily="34" charset="0"/>
+              <a:buChar char="•"/>
+            </a:pPr>
+            <a:r>
+              <a:rPr lang="de-DE" sz="1800" kern="100" dirty="0">
+                <a:effectLst/>
+                <a:latin typeface="Aptos" panose="020B0004020202020204" pitchFamily="34" charset="0"/>
+                <a:ea typeface="Aptos" panose="020B0004020202020204" pitchFamily="34" charset="0"/>
+                <a:cs typeface="Times New Roman" panose="02020603050405020304" pitchFamily="18" charset="0"/>
+              </a:rPr>
+              <a:t>Für strukturierte, regelmäßige Abstimmungen nutzten wir MS Teams für Online-Meetings oder trafen uns hier zu den Vorlesungszeiten vor Ort.</a:t>
+            </a:r>
+          </a:p>
+          <a:p>
+            <a:pPr marL="285750" indent="-285750">
+              <a:buFont typeface="Arial" panose="020B0604020202020204" pitchFamily="34" charset="0"/>
+              <a:buChar char="•"/>
+            </a:pPr>
+            <a:r>
+              <a:rPr lang="de-DE" sz="1800" dirty="0">
+                <a:effectLst/>
+                <a:latin typeface="Aptos" panose="020B0004020202020204" pitchFamily="34" charset="0"/>
+                <a:ea typeface="Aptos" panose="020B0004020202020204" pitchFamily="34" charset="0"/>
+                <a:cs typeface="Times New Roman" panose="02020603050405020304" pitchFamily="18" charset="0"/>
+              </a:rPr>
+              <a:t>Besonders wichtig war für uns dabei die Offenheit im Umgang: </a:t>
+            </a:r>
+          </a:p>
+          <a:p>
+            <a:pPr marL="742950" lvl="1" indent="-285750">
+              <a:buFont typeface="Arial" panose="020B0604020202020204" pitchFamily="34" charset="0"/>
+              <a:buChar char="•"/>
+            </a:pPr>
+            <a:r>
+              <a:rPr lang="de-DE" sz="1800" dirty="0">
+                <a:effectLst/>
+                <a:latin typeface="Aptos" panose="020B0004020202020204" pitchFamily="34" charset="0"/>
+                <a:ea typeface="Aptos" panose="020B0004020202020204" pitchFamily="34" charset="0"/>
+                <a:cs typeface="Times New Roman" panose="02020603050405020304" pitchFamily="18" charset="0"/>
+              </a:rPr>
+              <a:t>Jeder konnte eigene Ideen einbringen oder Vorschläge machen, und wir haben versucht, möglichst transparent zu arbeiten </a:t>
+            </a:r>
+          </a:p>
+          <a:p>
+            <a:pPr marL="742950" lvl="1" indent="-285750">
+              <a:buFont typeface="Arial" panose="020B0604020202020204" pitchFamily="34" charset="0"/>
+              <a:buChar char="•"/>
+            </a:pPr>
+            <a:r>
+              <a:rPr lang="de-DE" sz="1800" dirty="0">
+                <a:effectLst/>
+                <a:latin typeface="Aptos" panose="020B0004020202020204" pitchFamily="34" charset="0"/>
+                <a:ea typeface="Aptos" panose="020B0004020202020204" pitchFamily="34" charset="0"/>
+                <a:cs typeface="Times New Roman" panose="02020603050405020304" pitchFamily="18" charset="0"/>
+              </a:rPr>
+              <a:t>– auch wenn das in der Praxis nicht immer durchgehend geklappt hat, worauf ich später noch eingehen werde</a:t>
+            </a:r>
+            <a:endParaRPr lang="de-DE" dirty="0"/>
           </a:p>
         </p:txBody>
       </p:sp>
@@ -1991,8 +2237,152 @@
           <a:bodyPr rtlCol="0"/>
           <a:lstStyle/>
           <a:p>
-            <a:pPr rtl="0"/>
-            <a:endParaRPr lang="de-DE"/>
+            <a:pPr marL="285750" indent="-285750" algn="just">
+              <a:lnSpc>
+                <a:spcPct val="150000"/>
+              </a:lnSpc>
+              <a:spcAft>
+                <a:spcPts val="600"/>
+              </a:spcAft>
+              <a:buFont typeface="Arial" panose="020B0604020202020204" pitchFamily="34" charset="0"/>
+              <a:buChar char="•"/>
+            </a:pPr>
+            <a:r>
+              <a:rPr lang="de-DE" sz="1800" kern="100" dirty="0">
+                <a:effectLst/>
+                <a:latin typeface="Aptos" panose="020B0004020202020204" pitchFamily="34" charset="0"/>
+                <a:ea typeface="Aptos" panose="020B0004020202020204" pitchFamily="34" charset="0"/>
+                <a:cs typeface="Times New Roman" panose="02020603050405020304" pitchFamily="18" charset="0"/>
+              </a:rPr>
+              <a:t>Bei der Aufgabenverteilung haben wir auf die jeweiligen Vorerfahrungen und Interessenschwerpunkte Rücksicht genommen:</a:t>
+            </a:r>
+          </a:p>
+          <a:p>
+            <a:pPr marL="285750" indent="-285750" algn="just">
+              <a:lnSpc>
+                <a:spcPct val="150000"/>
+              </a:lnSpc>
+              <a:spcAft>
+                <a:spcPts val="600"/>
+              </a:spcAft>
+              <a:buFont typeface="Arial" panose="020B0604020202020204" pitchFamily="34" charset="0"/>
+              <a:buChar char="•"/>
+            </a:pPr>
+            <a:r>
+              <a:rPr lang="de-DE" sz="1800" kern="100" dirty="0">
+                <a:effectLst/>
+                <a:latin typeface="Aptos" panose="020B0004020202020204" pitchFamily="34" charset="0"/>
+                <a:ea typeface="Aptos" panose="020B0004020202020204" pitchFamily="34" charset="0"/>
+                <a:cs typeface="Times New Roman" panose="02020603050405020304" pitchFamily="18" charset="0"/>
+              </a:rPr>
+              <a:t>Ich selbst habe die Rolle der Projektkoordination übernommen und mich intensiv um die Dokumentation gekümmert. </a:t>
+            </a:r>
+          </a:p>
+          <a:p>
+            <a:pPr marL="285750" indent="-285750" algn="just">
+              <a:lnSpc>
+                <a:spcPct val="150000"/>
+              </a:lnSpc>
+              <a:spcAft>
+                <a:spcPts val="600"/>
+              </a:spcAft>
+              <a:buFont typeface="Arial" panose="020B0604020202020204" pitchFamily="34" charset="0"/>
+              <a:buChar char="•"/>
+            </a:pPr>
+            <a:r>
+              <a:rPr lang="de-DE" sz="1800" kern="100" dirty="0">
+                <a:effectLst/>
+                <a:latin typeface="Aptos" panose="020B0004020202020204" pitchFamily="34" charset="0"/>
+                <a:ea typeface="Aptos" panose="020B0004020202020204" pitchFamily="34" charset="0"/>
+                <a:cs typeface="Times New Roman" panose="02020603050405020304" pitchFamily="18" charset="0"/>
+              </a:rPr>
+              <a:t>Dazu gehörte auch, den Überblick über die Anforderungen, Planungen und Abstimmungen zu behalten.</a:t>
+            </a:r>
+          </a:p>
+          <a:p>
+            <a:pPr marL="285750" indent="-285750" algn="just">
+              <a:lnSpc>
+                <a:spcPct val="150000"/>
+              </a:lnSpc>
+              <a:spcAft>
+                <a:spcPts val="600"/>
+              </a:spcAft>
+              <a:buFont typeface="Arial" panose="020B0604020202020204" pitchFamily="34" charset="0"/>
+              <a:buChar char="•"/>
+            </a:pPr>
+            <a:r>
+              <a:rPr lang="de-DE" sz="1800" kern="100" dirty="0" err="1">
+                <a:effectLst/>
+                <a:latin typeface="Aptos" panose="020B0004020202020204" pitchFamily="34" charset="0"/>
+                <a:ea typeface="Aptos" panose="020B0004020202020204" pitchFamily="34" charset="0"/>
+                <a:cs typeface="Times New Roman" panose="02020603050405020304" pitchFamily="18" charset="0"/>
+              </a:rPr>
+              <a:t>Finnley</a:t>
+            </a:r>
+            <a:r>
+              <a:rPr lang="de-DE" sz="1800" kern="100" dirty="0">
+                <a:effectLst/>
+                <a:latin typeface="Aptos" panose="020B0004020202020204" pitchFamily="34" charset="0"/>
+                <a:ea typeface="Aptos" panose="020B0004020202020204" pitchFamily="34" charset="0"/>
+                <a:cs typeface="Times New Roman" panose="02020603050405020304" pitchFamily="18" charset="0"/>
+              </a:rPr>
+              <a:t> war für die Spezifikation und das Datenmodell zuständig, hat aber zusätzlich auch an der Dokumentation mitgewirkt, was die Erstellung der begleitenden Unterlagen deutlich erleichtert hat.</a:t>
+            </a:r>
+          </a:p>
+          <a:p>
+            <a:pPr marL="285750" indent="-285750" algn="just">
+              <a:lnSpc>
+                <a:spcPct val="150000"/>
+              </a:lnSpc>
+              <a:spcAft>
+                <a:spcPts val="600"/>
+              </a:spcAft>
+              <a:buFont typeface="Arial" panose="020B0604020202020204" pitchFamily="34" charset="0"/>
+              <a:buChar char="•"/>
+            </a:pPr>
+            <a:r>
+              <a:rPr lang="de-DE" sz="1800" kern="100" dirty="0">
+                <a:effectLst/>
+                <a:latin typeface="Aptos" panose="020B0004020202020204" pitchFamily="34" charset="0"/>
+                <a:ea typeface="Aptos" panose="020B0004020202020204" pitchFamily="34" charset="0"/>
+                <a:cs typeface="Times New Roman" panose="02020603050405020304" pitchFamily="18" charset="0"/>
+              </a:rPr>
+              <a:t>Leon kümmerte sich federführend um das Frontend, das UI-Design sowie die Anbindung der Datenbank, während Olli das Backend entwickelte und sich zusätzlich bei Bedarf im Frontend eingebracht hat.</a:t>
+            </a:r>
+          </a:p>
+          <a:p>
+            <a:pPr marL="285750" indent="-285750">
+              <a:buFont typeface="Arial" panose="020B0604020202020204" pitchFamily="34" charset="0"/>
+              <a:buChar char="•"/>
+            </a:pPr>
+            <a:r>
+              <a:rPr lang="de-DE" sz="1800" dirty="0">
+                <a:effectLst/>
+                <a:latin typeface="Aptos" panose="020B0004020202020204" pitchFamily="34" charset="0"/>
+                <a:ea typeface="Aptos" panose="020B0004020202020204" pitchFamily="34" charset="0"/>
+                <a:cs typeface="Times New Roman" panose="02020603050405020304" pitchFamily="18" charset="0"/>
+              </a:rPr>
+              <a:t>In der Praxis hat sich dabei eine gewisse Schwerpunktarbeit gebildet: </a:t>
+            </a:r>
+            <a:r>
+              <a:rPr lang="de-DE" sz="1800" dirty="0" err="1">
+                <a:effectLst/>
+                <a:latin typeface="Aptos" panose="020B0004020202020204" pitchFamily="34" charset="0"/>
+                <a:ea typeface="Aptos" panose="020B0004020202020204" pitchFamily="34" charset="0"/>
+                <a:cs typeface="Times New Roman" panose="02020603050405020304" pitchFamily="18" charset="0"/>
+              </a:rPr>
+              <a:t>Finnley</a:t>
+            </a:r>
+            <a:r>
+              <a:rPr lang="de-DE" sz="1800" dirty="0">
+                <a:effectLst/>
+                <a:latin typeface="Aptos" panose="020B0004020202020204" pitchFamily="34" charset="0"/>
+                <a:ea typeface="Aptos" panose="020B0004020202020204" pitchFamily="34" charset="0"/>
+                <a:cs typeface="Times New Roman" panose="02020603050405020304" pitchFamily="18" charset="0"/>
+              </a:rPr>
+              <a:t> und ich arbeiteten meist gemeinsam an konzeptionellen und dokumentarischen Teilen, während Olli und Leon parallel eher praktisch an der Software arbeiteten</a:t>
+            </a:r>
+            <a:endParaRPr lang="de-DE" dirty="0"/>
           </a:p>
         </p:txBody>
       </p:sp>
@@ -2101,8 +2491,236 @@
           <a:bodyPr rtlCol="0"/>
           <a:lstStyle/>
           <a:p>
-            <a:pPr rtl="0"/>
-            <a:endParaRPr lang="de-DE"/>
+            <a:pPr marL="285750" indent="-285750" algn="just">
+              <a:lnSpc>
+                <a:spcPct val="150000"/>
+              </a:lnSpc>
+              <a:spcAft>
+                <a:spcPts val="600"/>
+              </a:spcAft>
+              <a:buFont typeface="Arial" panose="020B0604020202020204" pitchFamily="34" charset="0"/>
+              <a:buChar char="•"/>
+            </a:pPr>
+            <a:r>
+              <a:rPr lang="de-DE" sz="1800" kern="100" dirty="0">
+                <a:effectLst/>
+                <a:latin typeface="Aptos" panose="020B0004020202020204" pitchFamily="34" charset="0"/>
+                <a:ea typeface="Aptos" panose="020B0004020202020204" pitchFamily="34" charset="0"/>
+                <a:cs typeface="Times New Roman" panose="02020603050405020304" pitchFamily="18" charset="0"/>
+              </a:rPr>
+              <a:t>Für die technische Organisation und Verwaltung haben wir auf ein Set etablierter Tools gesetzt.</a:t>
+            </a:r>
+          </a:p>
+          <a:p>
+            <a:pPr marL="285750" indent="-285750" algn="just">
+              <a:lnSpc>
+                <a:spcPct val="150000"/>
+              </a:lnSpc>
+              <a:spcAft>
+                <a:spcPts val="600"/>
+              </a:spcAft>
+              <a:buFont typeface="Arial" panose="020B0604020202020204" pitchFamily="34" charset="0"/>
+              <a:buChar char="•"/>
+            </a:pPr>
+            <a:r>
+              <a:rPr lang="de-DE" sz="1800" kern="100" dirty="0">
+                <a:effectLst/>
+                <a:latin typeface="Aptos" panose="020B0004020202020204" pitchFamily="34" charset="0"/>
+                <a:ea typeface="Aptos" panose="020B0004020202020204" pitchFamily="34" charset="0"/>
+                <a:cs typeface="Times New Roman" panose="02020603050405020304" pitchFamily="18" charset="0"/>
+              </a:rPr>
+              <a:t>GitHub war unsere zentrale Plattform </a:t>
+            </a:r>
+          </a:p>
+          <a:p>
+            <a:pPr marL="742950" lvl="1" indent="-285750" algn="just">
+              <a:lnSpc>
+                <a:spcPct val="150000"/>
+              </a:lnSpc>
+              <a:spcAft>
+                <a:spcPts val="600"/>
+              </a:spcAft>
+              <a:buFont typeface="Arial" panose="020B0604020202020204" pitchFamily="34" charset="0"/>
+              <a:buChar char="•"/>
+            </a:pPr>
+            <a:r>
+              <a:rPr lang="de-DE" sz="1800" kern="100" dirty="0">
+                <a:effectLst/>
+                <a:latin typeface="Aptos" panose="020B0004020202020204" pitchFamily="34" charset="0"/>
+                <a:ea typeface="Aptos" panose="020B0004020202020204" pitchFamily="34" charset="0"/>
+                <a:cs typeface="Times New Roman" panose="02020603050405020304" pitchFamily="18" charset="0"/>
+              </a:rPr>
+              <a:t>– nicht nur für den Code, sondern auch für die Ablage gemeinsamer Dokumente. </a:t>
+            </a:r>
+          </a:p>
+          <a:p>
+            <a:pPr marL="742950" lvl="1" indent="-285750" algn="just">
+              <a:lnSpc>
+                <a:spcPct val="150000"/>
+              </a:lnSpc>
+              <a:spcAft>
+                <a:spcPts val="600"/>
+              </a:spcAft>
+              <a:buFont typeface="Arial" panose="020B0604020202020204" pitchFamily="34" charset="0"/>
+              <a:buChar char="•"/>
+            </a:pPr>
+            <a:r>
+              <a:rPr lang="de-DE" sz="1800" kern="100" dirty="0">
+                <a:effectLst/>
+                <a:latin typeface="Aptos" panose="020B0004020202020204" pitchFamily="34" charset="0"/>
+                <a:ea typeface="Aptos" panose="020B0004020202020204" pitchFamily="34" charset="0"/>
+                <a:cs typeface="Times New Roman" panose="02020603050405020304" pitchFamily="18" charset="0"/>
+              </a:rPr>
+              <a:t>Dabei war das Thema Versionskontrolle zunächst für einige von uns neu. </a:t>
+            </a:r>
+          </a:p>
+          <a:p>
+            <a:pPr marL="285750" lvl="0" indent="-285750" algn="just">
+              <a:lnSpc>
+                <a:spcPct val="150000"/>
+              </a:lnSpc>
+              <a:spcAft>
+                <a:spcPts val="600"/>
+              </a:spcAft>
+              <a:buFont typeface="Arial" panose="020B0604020202020204" pitchFamily="34" charset="0"/>
+              <a:buChar char="•"/>
+            </a:pPr>
+            <a:r>
+              <a:rPr lang="de-DE" sz="1800" kern="100" dirty="0">
+                <a:effectLst/>
+                <a:latin typeface="Aptos" panose="020B0004020202020204" pitchFamily="34" charset="0"/>
+                <a:ea typeface="Aptos" panose="020B0004020202020204" pitchFamily="34" charset="0"/>
+                <a:cs typeface="Times New Roman" panose="02020603050405020304" pitchFamily="18" charset="0"/>
+              </a:rPr>
+              <a:t>Wir haben daher einen eigenen Zusatztermin eingeplant, bei dem uns die konkrete Nutzung von GitHub im Projektkontext erklärt wurde </a:t>
+            </a:r>
+          </a:p>
+          <a:p>
+            <a:pPr marL="742950" lvl="1" indent="-285750" algn="just">
+              <a:lnSpc>
+                <a:spcPct val="150000"/>
+              </a:lnSpc>
+              <a:spcAft>
+                <a:spcPts val="600"/>
+              </a:spcAft>
+              <a:buFont typeface="Arial" panose="020B0604020202020204" pitchFamily="34" charset="0"/>
+              <a:buChar char="•"/>
+            </a:pPr>
+            <a:r>
+              <a:rPr lang="de-DE" sz="1800" kern="100" dirty="0">
+                <a:effectLst/>
+                <a:latin typeface="Aptos" panose="020B0004020202020204" pitchFamily="34" charset="0"/>
+                <a:ea typeface="Aptos" panose="020B0004020202020204" pitchFamily="34" charset="0"/>
+                <a:cs typeface="Times New Roman" panose="02020603050405020304" pitchFamily="18" charset="0"/>
+              </a:rPr>
+              <a:t>– was im Nachhinein definitiv geholfen hat, sauberer zu arbeiten.</a:t>
+            </a:r>
+          </a:p>
+          <a:p>
+            <a:pPr marL="285750" indent="-285750" algn="just">
+              <a:lnSpc>
+                <a:spcPct val="150000"/>
+              </a:lnSpc>
+              <a:spcAft>
+                <a:spcPts val="600"/>
+              </a:spcAft>
+              <a:buFont typeface="Arial" panose="020B0604020202020204" pitchFamily="34" charset="0"/>
+              <a:buChar char="•"/>
+            </a:pPr>
+            <a:r>
+              <a:rPr lang="de-DE" sz="1800" kern="100" dirty="0">
+                <a:effectLst/>
+                <a:latin typeface="Aptos" panose="020B0004020202020204" pitchFamily="34" charset="0"/>
+                <a:ea typeface="Aptos" panose="020B0004020202020204" pitchFamily="34" charset="0"/>
+                <a:cs typeface="Times New Roman" panose="02020603050405020304" pitchFamily="18" charset="0"/>
+              </a:rPr>
+              <a:t>Zur Dokumentation nutzten wir hauptsächlich Word-Dateien, in denen Spezifikation, Anforderungen und anderweitig notwendige Dateien dokumentiert wurden. </a:t>
+            </a:r>
+          </a:p>
+          <a:p>
+            <a:pPr marL="285750" indent="-285750" algn="just">
+              <a:lnSpc>
+                <a:spcPct val="150000"/>
+              </a:lnSpc>
+              <a:spcAft>
+                <a:spcPts val="600"/>
+              </a:spcAft>
+              <a:buFont typeface="Arial" panose="020B0604020202020204" pitchFamily="34" charset="0"/>
+              <a:buChar char="•"/>
+            </a:pPr>
+            <a:r>
+              <a:rPr lang="de-DE" sz="1800" kern="100" dirty="0">
+                <a:effectLst/>
+                <a:latin typeface="Aptos" panose="020B0004020202020204" pitchFamily="34" charset="0"/>
+                <a:ea typeface="Aptos" panose="020B0004020202020204" pitchFamily="34" charset="0"/>
+                <a:cs typeface="Times New Roman" panose="02020603050405020304" pitchFamily="18" charset="0"/>
+              </a:rPr>
+              <a:t>Diese wurden regelmäßig aktualisiert und synchronisiert (Jeder hat nach seinen Änderungen im GitHub einen Commit „</a:t>
+            </a:r>
+            <a:r>
+              <a:rPr lang="de-DE" sz="1800" kern="100" dirty="0" err="1">
+                <a:effectLst/>
+                <a:latin typeface="Aptos" panose="020B0004020202020204" pitchFamily="34" charset="0"/>
+                <a:ea typeface="Aptos" panose="020B0004020202020204" pitchFamily="34" charset="0"/>
+                <a:cs typeface="Times New Roman" panose="02020603050405020304" pitchFamily="18" charset="0"/>
+              </a:rPr>
+              <a:t>gepushed</a:t>
+            </a:r>
+            <a:r>
+              <a:rPr lang="de-DE" sz="1800" kern="100" dirty="0">
+                <a:effectLst/>
+                <a:latin typeface="Aptos" panose="020B0004020202020204" pitchFamily="34" charset="0"/>
+                <a:ea typeface="Aptos" panose="020B0004020202020204" pitchFamily="34" charset="0"/>
+                <a:cs typeface="Times New Roman" panose="02020603050405020304" pitchFamily="18" charset="0"/>
+              </a:rPr>
+              <a:t>“, den sich die anderen dann wieder „pullen“ konnten)</a:t>
+            </a:r>
+          </a:p>
+          <a:p>
+            <a:pPr marL="285750" indent="-285750">
+              <a:buFont typeface="Arial" panose="020B0604020202020204" pitchFamily="34" charset="0"/>
+              <a:buChar char="•"/>
+            </a:pPr>
+            <a:r>
+              <a:rPr lang="de-DE" sz="1800" dirty="0">
+                <a:effectLst/>
+                <a:latin typeface="Aptos" panose="020B0004020202020204" pitchFamily="34" charset="0"/>
+                <a:ea typeface="Aptos" panose="020B0004020202020204" pitchFamily="34" charset="0"/>
+                <a:cs typeface="Times New Roman" panose="02020603050405020304" pitchFamily="18" charset="0"/>
+              </a:rPr>
+              <a:t>Für die Kommunikation zwischen den Treffen griffen wir, wie gesagt, auf WhatsApp und MS Teams zurück </a:t>
+            </a:r>
+          </a:p>
+          <a:p>
+            <a:pPr marL="742950" lvl="1" indent="-285750">
+              <a:buFont typeface="Arial" panose="020B0604020202020204" pitchFamily="34" charset="0"/>
+              <a:buChar char="•"/>
+            </a:pPr>
+            <a:r>
+              <a:rPr lang="de-DE" sz="1800" dirty="0">
+                <a:effectLst/>
+                <a:latin typeface="Aptos" panose="020B0004020202020204" pitchFamily="34" charset="0"/>
+                <a:ea typeface="Aptos" panose="020B0004020202020204" pitchFamily="34" charset="0"/>
+                <a:cs typeface="Times New Roman" panose="02020603050405020304" pitchFamily="18" charset="0"/>
+              </a:rPr>
+              <a:t>– wobei wir gemerkt haben, dass asynchrone Kommunikation nicht immer optimal ist. </a:t>
+            </a:r>
+          </a:p>
+          <a:p>
+            <a:pPr marL="285750" lvl="0" indent="-285750">
+              <a:buFont typeface="Arial" panose="020B0604020202020204" pitchFamily="34" charset="0"/>
+              <a:buChar char="•"/>
+            </a:pPr>
+            <a:r>
+              <a:rPr lang="de-DE" sz="1800" dirty="0">
+                <a:effectLst/>
+                <a:latin typeface="Aptos" panose="020B0004020202020204" pitchFamily="34" charset="0"/>
+                <a:ea typeface="Aptos" panose="020B0004020202020204" pitchFamily="34" charset="0"/>
+                <a:cs typeface="Times New Roman" panose="02020603050405020304" pitchFamily="18" charset="0"/>
+              </a:rPr>
+              <a:t>Gerade zwischen Theorie- und Entwicklungsteilen fehlte manchmal die direkte Abstimmung.</a:t>
+            </a:r>
+            <a:endParaRPr lang="de-DE" dirty="0"/>
           </a:p>
         </p:txBody>
       </p:sp>
@@ -2211,8 +2829,359 @@
           <a:bodyPr rtlCol="0"/>
           <a:lstStyle/>
           <a:p>
-            <a:pPr rtl="0"/>
-            <a:endParaRPr lang="de-DE"/>
+            <a:pPr marL="171450" indent="-171450" rtl="0">
+              <a:buFont typeface="Arial" panose="020B0604020202020204" pitchFamily="34" charset="0"/>
+              <a:buChar char="•"/>
+            </a:pPr>
+            <a:r>
+              <a:rPr lang="de-DE" dirty="0"/>
+              <a:t>Was uns zum nächsten Punkt der </a:t>
+            </a:r>
+            <a:r>
+              <a:rPr lang="de-DE" dirty="0" err="1"/>
+              <a:t>Projektorga</a:t>
+            </a:r>
+            <a:r>
+              <a:rPr lang="de-DE" dirty="0"/>
+              <a:t> führt: den aufgetauchten Problemen währenddessen:</a:t>
+            </a:r>
+          </a:p>
+          <a:p>
+            <a:pPr marL="285750" indent="-285750" algn="just">
+              <a:lnSpc>
+                <a:spcPct val="150000"/>
+              </a:lnSpc>
+              <a:spcAft>
+                <a:spcPts val="600"/>
+              </a:spcAft>
+              <a:buFont typeface="Arial" panose="020B0604020202020204" pitchFamily="34" charset="0"/>
+              <a:buChar char="•"/>
+            </a:pPr>
+            <a:endParaRPr lang="de-DE" sz="1800" kern="100" dirty="0">
+              <a:effectLst/>
+              <a:latin typeface="Aptos" panose="020B0004020202020204" pitchFamily="34" charset="0"/>
+              <a:ea typeface="Aptos" panose="020B0004020202020204" pitchFamily="34" charset="0"/>
+              <a:cs typeface="Times New Roman" panose="02020603050405020304" pitchFamily="18" charset="0"/>
+            </a:endParaRPr>
+          </a:p>
+          <a:p>
+            <a:pPr marL="285750" indent="-285750" algn="just">
+              <a:lnSpc>
+                <a:spcPct val="150000"/>
+              </a:lnSpc>
+              <a:spcAft>
+                <a:spcPts val="600"/>
+              </a:spcAft>
+              <a:buFont typeface="Arial" panose="020B0604020202020204" pitchFamily="34" charset="0"/>
+              <a:buChar char="•"/>
+            </a:pPr>
+            <a:r>
+              <a:rPr lang="de-DE" sz="1800" kern="100" dirty="0">
+                <a:effectLst/>
+                <a:latin typeface="Aptos" panose="020B0004020202020204" pitchFamily="34" charset="0"/>
+                <a:ea typeface="Aptos" panose="020B0004020202020204" pitchFamily="34" charset="0"/>
+                <a:cs typeface="Times New Roman" panose="02020603050405020304" pitchFamily="18" charset="0"/>
+              </a:rPr>
+              <a:t>Natürlich lief nicht alles reibungslos </a:t>
+            </a:r>
+          </a:p>
+          <a:p>
+            <a:pPr marL="742950" lvl="1" indent="-285750" algn="just">
+              <a:lnSpc>
+                <a:spcPct val="150000"/>
+              </a:lnSpc>
+              <a:spcAft>
+                <a:spcPts val="600"/>
+              </a:spcAft>
+              <a:buFont typeface="Arial" panose="020B0604020202020204" pitchFamily="34" charset="0"/>
+              <a:buChar char="•"/>
+            </a:pPr>
+            <a:r>
+              <a:rPr lang="de-DE" sz="1800" kern="100" dirty="0">
+                <a:effectLst/>
+                <a:latin typeface="Aptos" panose="020B0004020202020204" pitchFamily="34" charset="0"/>
+                <a:ea typeface="Aptos" panose="020B0004020202020204" pitchFamily="34" charset="0"/>
+                <a:cs typeface="Times New Roman" panose="02020603050405020304" pitchFamily="18" charset="0"/>
+              </a:rPr>
+              <a:t>– es gab einige Herausforderungen, aus denen wir im Rückblick viel lernen konnten.</a:t>
+            </a:r>
+          </a:p>
+          <a:p>
+            <a:pPr marL="285750" indent="-285750" algn="just">
+              <a:lnSpc>
+                <a:spcPct val="150000"/>
+              </a:lnSpc>
+              <a:spcAft>
+                <a:spcPts val="600"/>
+              </a:spcAft>
+              <a:buFont typeface="Arial" panose="020B0604020202020204" pitchFamily="34" charset="0"/>
+              <a:buChar char="•"/>
+            </a:pPr>
+            <a:r>
+              <a:rPr lang="de-DE" sz="1800" kern="100" dirty="0">
+                <a:effectLst/>
+                <a:latin typeface="Aptos" panose="020B0004020202020204" pitchFamily="34" charset="0"/>
+                <a:ea typeface="Aptos" panose="020B0004020202020204" pitchFamily="34" charset="0"/>
+                <a:cs typeface="Times New Roman" panose="02020603050405020304" pitchFamily="18" charset="0"/>
+              </a:rPr>
+              <a:t>Zu Beginn hatten wir etwa eine zweiwöchige Verzögerung in der Planung, weil wir durch verschiedene Umstände nicht sofort als vollständiges Team aktiv waren. </a:t>
+            </a:r>
+          </a:p>
+          <a:p>
+            <a:pPr marL="285750" lvl="0" indent="-285750" algn="just">
+              <a:lnSpc>
+                <a:spcPct val="150000"/>
+              </a:lnSpc>
+              <a:spcAft>
+                <a:spcPts val="600"/>
+              </a:spcAft>
+              <a:buFont typeface="Arial" panose="020B0604020202020204" pitchFamily="34" charset="0"/>
+              <a:buChar char="•"/>
+            </a:pPr>
+            <a:r>
+              <a:rPr lang="de-DE" sz="1800" kern="100" dirty="0">
+                <a:effectLst/>
+                <a:latin typeface="Aptos" panose="020B0004020202020204" pitchFamily="34" charset="0"/>
+                <a:ea typeface="Aptos" panose="020B0004020202020204" pitchFamily="34" charset="0"/>
+                <a:cs typeface="Times New Roman" panose="02020603050405020304" pitchFamily="18" charset="0"/>
+              </a:rPr>
+              <a:t>Manche waren noch in anderen Projekten eingebunden oder durch Studium und Arbeit zeitlich eingeschränkt </a:t>
+            </a:r>
+          </a:p>
+          <a:p>
+            <a:pPr marL="742950" lvl="1" indent="-285750" algn="just">
+              <a:lnSpc>
+                <a:spcPct val="150000"/>
+              </a:lnSpc>
+              <a:spcAft>
+                <a:spcPts val="600"/>
+              </a:spcAft>
+              <a:buFont typeface="Arial" panose="020B0604020202020204" pitchFamily="34" charset="0"/>
+              <a:buChar char="•"/>
+            </a:pPr>
+            <a:r>
+              <a:rPr lang="de-DE" sz="1800" kern="100" dirty="0">
+                <a:effectLst/>
+                <a:latin typeface="Aptos" panose="020B0004020202020204" pitchFamily="34" charset="0"/>
+                <a:ea typeface="Aptos" panose="020B0004020202020204" pitchFamily="34" charset="0"/>
+                <a:cs typeface="Times New Roman" panose="02020603050405020304" pitchFamily="18" charset="0"/>
+              </a:rPr>
+              <a:t>– was sich auch im weiteren Verlauf immer wieder bemerkbar machte.</a:t>
+            </a:r>
+          </a:p>
+          <a:p>
+            <a:pPr marL="285750" indent="-285750" algn="just">
+              <a:lnSpc>
+                <a:spcPct val="150000"/>
+              </a:lnSpc>
+              <a:spcAft>
+                <a:spcPts val="600"/>
+              </a:spcAft>
+              <a:buFont typeface="Arial" panose="020B0604020202020204" pitchFamily="34" charset="0"/>
+              <a:buChar char="•"/>
+            </a:pPr>
+            <a:r>
+              <a:rPr lang="de-DE" sz="1800" kern="100" dirty="0">
+                <a:effectLst/>
+                <a:latin typeface="Aptos" panose="020B0004020202020204" pitchFamily="34" charset="0"/>
+                <a:ea typeface="Aptos" panose="020B0004020202020204" pitchFamily="34" charset="0"/>
+                <a:cs typeface="Times New Roman" panose="02020603050405020304" pitchFamily="18" charset="0"/>
+              </a:rPr>
+              <a:t>Ein Thema war auch die bereits erwähnte asynchrone Kommunikation: </a:t>
+            </a:r>
+          </a:p>
+          <a:p>
+            <a:pPr marL="742950" lvl="1" indent="-285750" algn="just">
+              <a:lnSpc>
+                <a:spcPct val="150000"/>
+              </a:lnSpc>
+              <a:spcAft>
+                <a:spcPts val="600"/>
+              </a:spcAft>
+              <a:buFont typeface="Arial" panose="020B0604020202020204" pitchFamily="34" charset="0"/>
+              <a:buChar char="•"/>
+            </a:pPr>
+            <a:r>
+              <a:rPr lang="de-DE" sz="1800" kern="100" dirty="0">
+                <a:effectLst/>
+                <a:latin typeface="Aptos" panose="020B0004020202020204" pitchFamily="34" charset="0"/>
+                <a:ea typeface="Aptos" panose="020B0004020202020204" pitchFamily="34" charset="0"/>
+                <a:cs typeface="Times New Roman" panose="02020603050405020304" pitchFamily="18" charset="0"/>
+              </a:rPr>
+              <a:t>Während </a:t>
+            </a:r>
+            <a:r>
+              <a:rPr lang="de-DE" sz="1800" kern="100" dirty="0" err="1">
+                <a:effectLst/>
+                <a:latin typeface="Aptos" panose="020B0004020202020204" pitchFamily="34" charset="0"/>
+                <a:ea typeface="Aptos" panose="020B0004020202020204" pitchFamily="34" charset="0"/>
+                <a:cs typeface="Times New Roman" panose="02020603050405020304" pitchFamily="18" charset="0"/>
+              </a:rPr>
+              <a:t>Finnley</a:t>
+            </a:r>
+            <a:r>
+              <a:rPr lang="de-DE" sz="1800" kern="100" dirty="0">
+                <a:effectLst/>
+                <a:latin typeface="Aptos" panose="020B0004020202020204" pitchFamily="34" charset="0"/>
+                <a:ea typeface="Aptos" panose="020B0004020202020204" pitchFamily="34" charset="0"/>
+                <a:cs typeface="Times New Roman" panose="02020603050405020304" pitchFamily="18" charset="0"/>
+              </a:rPr>
+              <a:t> und ich an Spezifikation und Dokumentation arbeiteten, waren Leon und Olli parallel tief in der Entwicklung. </a:t>
+            </a:r>
+          </a:p>
+          <a:p>
+            <a:pPr marL="742950" lvl="1" indent="-285750" algn="just">
+              <a:lnSpc>
+                <a:spcPct val="150000"/>
+              </a:lnSpc>
+              <a:spcAft>
+                <a:spcPts val="600"/>
+              </a:spcAft>
+              <a:buFont typeface="Arial" panose="020B0604020202020204" pitchFamily="34" charset="0"/>
+              <a:buChar char="•"/>
+            </a:pPr>
+            <a:r>
+              <a:rPr lang="de-DE" sz="1800" kern="100" dirty="0">
+                <a:effectLst/>
+                <a:latin typeface="Aptos" panose="020B0004020202020204" pitchFamily="34" charset="0"/>
+                <a:ea typeface="Aptos" panose="020B0004020202020204" pitchFamily="34" charset="0"/>
+                <a:cs typeface="Times New Roman" panose="02020603050405020304" pitchFamily="18" charset="0"/>
+              </a:rPr>
+              <a:t>Informationen liefen dabei nicht immer über alle Mitglieder, was teilweise zu Fehlern in der Dokumentation, des Fortschritts und der Transparenz im Sinne aller führte.</a:t>
+            </a:r>
+          </a:p>
+          <a:p>
+            <a:pPr marL="285750" indent="-285750" algn="just">
+              <a:lnSpc>
+                <a:spcPct val="150000"/>
+              </a:lnSpc>
+              <a:spcAft>
+                <a:spcPts val="600"/>
+              </a:spcAft>
+              <a:buFont typeface="Arial" panose="020B0604020202020204" pitchFamily="34" charset="0"/>
+              <a:buChar char="•"/>
+            </a:pPr>
+            <a:r>
+              <a:rPr lang="de-DE" sz="1800" kern="100" dirty="0">
+                <a:effectLst/>
+                <a:latin typeface="Aptos" panose="020B0004020202020204" pitchFamily="34" charset="0"/>
+                <a:ea typeface="Aptos" panose="020B0004020202020204" pitchFamily="34" charset="0"/>
+                <a:cs typeface="Times New Roman" panose="02020603050405020304" pitchFamily="18" charset="0"/>
+              </a:rPr>
+              <a:t>Was uns außerdem gefehlt hat, waren klar definierte Meilensteine. </a:t>
+            </a:r>
+          </a:p>
+          <a:p>
+            <a:pPr marL="742950" lvl="1" indent="-285750" algn="just">
+              <a:lnSpc>
+                <a:spcPct val="150000"/>
+              </a:lnSpc>
+              <a:spcAft>
+                <a:spcPts val="600"/>
+              </a:spcAft>
+              <a:buFont typeface="Arial" panose="020B0604020202020204" pitchFamily="34" charset="0"/>
+              <a:buChar char="•"/>
+            </a:pPr>
+            <a:r>
+              <a:rPr lang="de-DE" sz="1800" kern="100" dirty="0">
+                <a:effectLst/>
+                <a:latin typeface="Aptos" panose="020B0004020202020204" pitchFamily="34" charset="0"/>
+                <a:ea typeface="Aptos" panose="020B0004020202020204" pitchFamily="34" charset="0"/>
+                <a:cs typeface="Times New Roman" panose="02020603050405020304" pitchFamily="18" charset="0"/>
+              </a:rPr>
+              <a:t>Zwar hatten wir grobe Ziele, aber keine festen Deadlines oder Zwischenziele. </a:t>
+            </a:r>
+          </a:p>
+          <a:p>
+            <a:pPr marL="742950" lvl="1" indent="-285750" algn="just">
+              <a:lnSpc>
+                <a:spcPct val="150000"/>
+              </a:lnSpc>
+              <a:spcAft>
+                <a:spcPts val="600"/>
+              </a:spcAft>
+              <a:buFont typeface="Arial" panose="020B0604020202020204" pitchFamily="34" charset="0"/>
+              <a:buChar char="•"/>
+            </a:pPr>
+            <a:r>
+              <a:rPr lang="de-DE" sz="1800" kern="100" dirty="0">
+                <a:effectLst/>
+                <a:latin typeface="Aptos" panose="020B0004020202020204" pitchFamily="34" charset="0"/>
+                <a:ea typeface="Aptos" panose="020B0004020202020204" pitchFamily="34" charset="0"/>
+                <a:cs typeface="Times New Roman" panose="02020603050405020304" pitchFamily="18" charset="0"/>
+              </a:rPr>
+              <a:t>Stattdessen entwickelten wir das Projektbild eher nach und nach, indem wir gemeinsam visualisierten, wie das Endprodukt aussehen sollte.</a:t>
+            </a:r>
+          </a:p>
+          <a:p>
+            <a:pPr marL="285750" indent="-285750" algn="just">
+              <a:lnSpc>
+                <a:spcPct val="150000"/>
+              </a:lnSpc>
+              <a:spcAft>
+                <a:spcPts val="600"/>
+              </a:spcAft>
+              <a:buFont typeface="Arial" panose="020B0604020202020204" pitchFamily="34" charset="0"/>
+              <a:buChar char="•"/>
+            </a:pPr>
+            <a:r>
+              <a:rPr lang="de-DE" sz="1800" kern="100" dirty="0">
+                <a:effectLst/>
+                <a:latin typeface="Aptos" panose="020B0004020202020204" pitchFamily="34" charset="0"/>
+                <a:ea typeface="Aptos" panose="020B0004020202020204" pitchFamily="34" charset="0"/>
+                <a:cs typeface="Times New Roman" panose="02020603050405020304" pitchFamily="18" charset="0"/>
+              </a:rPr>
+              <a:t>Ein weiterer Punkt war die fehlende Transparenz beim Fortschritt: </a:t>
+            </a:r>
+          </a:p>
+          <a:p>
+            <a:pPr marL="742950" lvl="1" indent="-285750" algn="just">
+              <a:lnSpc>
+                <a:spcPct val="150000"/>
+              </a:lnSpc>
+              <a:spcAft>
+                <a:spcPts val="600"/>
+              </a:spcAft>
+              <a:buFont typeface="Arial" panose="020B0604020202020204" pitchFamily="34" charset="0"/>
+              <a:buChar char="•"/>
+            </a:pPr>
+            <a:r>
+              <a:rPr lang="de-DE" sz="1800" kern="100" dirty="0">
+                <a:effectLst/>
+                <a:latin typeface="Aptos" panose="020B0004020202020204" pitchFamily="34" charset="0"/>
+                <a:ea typeface="Aptos" panose="020B0004020202020204" pitchFamily="34" charset="0"/>
+                <a:cs typeface="Times New Roman" panose="02020603050405020304" pitchFamily="18" charset="0"/>
+              </a:rPr>
+              <a:t>Es gab keine detaillierten Zeitpläne oder Aufgabenübersichten. </a:t>
+            </a:r>
+          </a:p>
+          <a:p>
+            <a:pPr marL="742950" lvl="1" indent="-285750" algn="just">
+              <a:lnSpc>
+                <a:spcPct val="150000"/>
+              </a:lnSpc>
+              <a:spcAft>
+                <a:spcPts val="600"/>
+              </a:spcAft>
+              <a:buFont typeface="Arial" panose="020B0604020202020204" pitchFamily="34" charset="0"/>
+              <a:buChar char="•"/>
+            </a:pPr>
+            <a:r>
+              <a:rPr lang="de-DE" sz="1800" kern="100" dirty="0">
+                <a:effectLst/>
+                <a:latin typeface="Aptos" panose="020B0004020202020204" pitchFamily="34" charset="0"/>
+                <a:ea typeface="Aptos" panose="020B0004020202020204" pitchFamily="34" charset="0"/>
+                <a:cs typeface="Times New Roman" panose="02020603050405020304" pitchFamily="18" charset="0"/>
+              </a:rPr>
+              <a:t>Rückblickend wäre hier ein sichtbares Planungstool wie ein Kanban-Board sinnvoll gewesen, um Verantwortlichkeiten und Status klarer darzustellen.</a:t>
+            </a:r>
+          </a:p>
+          <a:p>
+            <a:pPr marL="171450" indent="-171450" rtl="0">
+              <a:buFont typeface="Arial" panose="020B0604020202020204" pitchFamily="34" charset="0"/>
+              <a:buChar char="•"/>
+            </a:pPr>
+            <a:endParaRPr lang="de-DE" dirty="0"/>
           </a:p>
         </p:txBody>
       </p:sp>
@@ -2762,7 +3731,16 @@
           <a:lstStyle/>
           <a:p>
             <a:pPr rtl="0"/>
-            <a:endParaRPr lang="de-DE"/>
+            <a:r>
+              <a:rPr lang="de-DE" sz="1800" dirty="0">
+                <a:effectLst/>
+                <a:latin typeface="Aptos" panose="020B0004020202020204" pitchFamily="34" charset="0"/>
+                <a:ea typeface="Aptos" panose="020B0004020202020204" pitchFamily="34" charset="0"/>
+                <a:cs typeface="Times New Roman" panose="02020603050405020304" pitchFamily="18" charset="0"/>
+              </a:rPr>
+              <a:t>Was nehmen wir aus dem Projekt mit? Ganz klar: </a:t>
+            </a:r>
+            <a:endParaRPr lang="de-DE" dirty="0"/>
           </a:p>
         </p:txBody>
       </p:sp>
@@ -2871,6 +3849,422 @@
           <a:bodyPr rtlCol="0"/>
           <a:lstStyle/>
           <a:p>
+            <a:pPr marL="285750" indent="-285750" algn="just">
+              <a:lnSpc>
+                <a:spcPct val="150000"/>
+              </a:lnSpc>
+              <a:spcAft>
+                <a:spcPts val="600"/>
+              </a:spcAft>
+              <a:buFont typeface="Arial" panose="020B0604020202020204" pitchFamily="34" charset="0"/>
+              <a:buChar char="•"/>
+            </a:pPr>
+            <a:r>
+              <a:rPr lang="de-DE" sz="1800" kern="100" dirty="0">
+                <a:effectLst/>
+                <a:latin typeface="Aptos" panose="020B0004020202020204" pitchFamily="34" charset="0"/>
+                <a:ea typeface="Aptos" panose="020B0004020202020204" pitchFamily="34" charset="0"/>
+                <a:cs typeface="Times New Roman" panose="02020603050405020304" pitchFamily="18" charset="0"/>
+              </a:rPr>
+              <a:t>„Bevor wir inhaltlich einsteigen, ein kurzer Überblick über den Aufbau unserer Präsentation und wer welchen Teil übernommen hat:</a:t>
+            </a:r>
+          </a:p>
+          <a:p>
+            <a:pPr marL="285750" indent="-285750" algn="just">
+              <a:lnSpc>
+                <a:spcPct val="150000"/>
+              </a:lnSpc>
+              <a:spcAft>
+                <a:spcPts val="600"/>
+              </a:spcAft>
+              <a:buFont typeface="Arial" panose="020B0604020202020204" pitchFamily="34" charset="0"/>
+              <a:buChar char="•"/>
+            </a:pPr>
+            <a:endParaRPr lang="de-DE" sz="1800" kern="100" dirty="0">
+              <a:effectLst/>
+              <a:latin typeface="Aptos" panose="020B0004020202020204" pitchFamily="34" charset="0"/>
+              <a:ea typeface="Aptos" panose="020B0004020202020204" pitchFamily="34" charset="0"/>
+              <a:cs typeface="Times New Roman" panose="02020603050405020304" pitchFamily="18" charset="0"/>
+            </a:endParaRPr>
+          </a:p>
+          <a:p>
+            <a:pPr marL="285750" indent="-285750" algn="just">
+              <a:lnSpc>
+                <a:spcPct val="150000"/>
+              </a:lnSpc>
+              <a:spcAft>
+                <a:spcPts val="600"/>
+              </a:spcAft>
+              <a:buFont typeface="Arial" panose="020B0604020202020204" pitchFamily="34" charset="0"/>
+              <a:buChar char="•"/>
+            </a:pPr>
+            <a:r>
+              <a:rPr lang="de-DE" sz="1800" kern="100" dirty="0">
+                <a:effectLst/>
+                <a:latin typeface="Aptos" panose="020B0004020202020204" pitchFamily="34" charset="0"/>
+                <a:ea typeface="Aptos" panose="020B0004020202020204" pitchFamily="34" charset="0"/>
+                <a:cs typeface="Times New Roman" panose="02020603050405020304" pitchFamily="18" charset="0"/>
+              </a:rPr>
+              <a:t>Ich beginne mit dem Ursprung unseres Projekts und einem Blick auf existierende Konkurrenzsysteme. </a:t>
+            </a:r>
+          </a:p>
+          <a:p>
+            <a:pPr marL="285750" indent="-285750" algn="just">
+              <a:lnSpc>
+                <a:spcPct val="150000"/>
+              </a:lnSpc>
+              <a:spcAft>
+                <a:spcPts val="600"/>
+              </a:spcAft>
+              <a:buFont typeface="Arial" panose="020B0604020202020204" pitchFamily="34" charset="0"/>
+              <a:buChar char="•"/>
+            </a:pPr>
+            <a:r>
+              <a:rPr lang="de-DE" sz="1800" kern="100" dirty="0">
+                <a:effectLst/>
+                <a:latin typeface="Aptos" panose="020B0004020202020204" pitchFamily="34" charset="0"/>
+                <a:ea typeface="Aptos" panose="020B0004020202020204" pitchFamily="34" charset="0"/>
+                <a:cs typeface="Times New Roman" panose="02020603050405020304" pitchFamily="18" charset="0"/>
+              </a:rPr>
+              <a:t>Danach folgt </a:t>
+            </a:r>
+            <a:r>
+              <a:rPr lang="de-DE" sz="1800" kern="100" dirty="0" err="1">
+                <a:effectLst/>
+                <a:latin typeface="Aptos" panose="020B0004020202020204" pitchFamily="34" charset="0"/>
+                <a:ea typeface="Aptos" panose="020B0004020202020204" pitchFamily="34" charset="0"/>
+                <a:cs typeface="Times New Roman" panose="02020603050405020304" pitchFamily="18" charset="0"/>
+              </a:rPr>
+              <a:t>Finnley</a:t>
+            </a:r>
+            <a:r>
+              <a:rPr lang="de-DE" sz="1800" kern="100" dirty="0">
+                <a:effectLst/>
+                <a:latin typeface="Aptos" panose="020B0004020202020204" pitchFamily="34" charset="0"/>
+                <a:ea typeface="Aptos" panose="020B0004020202020204" pitchFamily="34" charset="0"/>
+                <a:cs typeface="Times New Roman" panose="02020603050405020304" pitchFamily="18" charset="0"/>
+              </a:rPr>
+              <a:t>, der euch unsere Spezifikation vorstellt </a:t>
+            </a:r>
+          </a:p>
+          <a:p>
+            <a:pPr marL="742950" lvl="1" indent="-285750" algn="just">
+              <a:lnSpc>
+                <a:spcPct val="150000"/>
+              </a:lnSpc>
+              <a:spcAft>
+                <a:spcPts val="600"/>
+              </a:spcAft>
+              <a:buFont typeface="Arial" panose="020B0604020202020204" pitchFamily="34" charset="0"/>
+              <a:buChar char="•"/>
+            </a:pPr>
+            <a:r>
+              <a:rPr lang="de-DE" sz="1800" kern="100" dirty="0">
+                <a:effectLst/>
+                <a:latin typeface="Aptos" panose="020B0004020202020204" pitchFamily="34" charset="0"/>
+                <a:ea typeface="Aptos" panose="020B0004020202020204" pitchFamily="34" charset="0"/>
+                <a:cs typeface="Times New Roman" panose="02020603050405020304" pitchFamily="18" charset="0"/>
+              </a:rPr>
+              <a:t>– also welche Anforderungen wir definiert und wie wir den </a:t>
+            </a:r>
+            <a:r>
+              <a:rPr lang="de-DE" sz="1800" kern="100" dirty="0" err="1">
+                <a:effectLst/>
+                <a:latin typeface="Aptos" panose="020B0004020202020204" pitchFamily="34" charset="0"/>
+                <a:ea typeface="Aptos" panose="020B0004020202020204" pitchFamily="34" charset="0"/>
+                <a:cs typeface="Times New Roman" panose="02020603050405020304" pitchFamily="18" charset="0"/>
+              </a:rPr>
+              <a:t>Scope</a:t>
+            </a:r>
+            <a:r>
+              <a:rPr lang="de-DE" sz="1800" kern="100" dirty="0">
+                <a:effectLst/>
+                <a:latin typeface="Aptos" panose="020B0004020202020204" pitchFamily="34" charset="0"/>
+                <a:ea typeface="Aptos" panose="020B0004020202020204" pitchFamily="34" charset="0"/>
+                <a:cs typeface="Times New Roman" panose="02020603050405020304" pitchFamily="18" charset="0"/>
+              </a:rPr>
+              <a:t> abgegrenzt haben.</a:t>
+            </a:r>
+          </a:p>
+          <a:p>
+            <a:pPr marL="285750" indent="-285750" algn="just">
+              <a:lnSpc>
+                <a:spcPct val="150000"/>
+              </a:lnSpc>
+              <a:spcAft>
+                <a:spcPts val="600"/>
+              </a:spcAft>
+              <a:buFont typeface="Arial" panose="020B0604020202020204" pitchFamily="34" charset="0"/>
+              <a:buChar char="•"/>
+            </a:pPr>
+            <a:r>
+              <a:rPr lang="de-DE" sz="1800" kern="100" dirty="0">
+                <a:effectLst/>
+                <a:latin typeface="Aptos" panose="020B0004020202020204" pitchFamily="34" charset="0"/>
+                <a:ea typeface="Aptos" panose="020B0004020202020204" pitchFamily="34" charset="0"/>
+                <a:cs typeface="Times New Roman" panose="02020603050405020304" pitchFamily="18" charset="0"/>
+              </a:rPr>
+              <a:t>Anschließend übernehme ich wieder und gebe euch einen Einblick in unsere Projektorganisation </a:t>
+            </a:r>
+          </a:p>
+          <a:p>
+            <a:pPr marL="742950" lvl="1" indent="-285750" algn="just">
+              <a:lnSpc>
+                <a:spcPct val="150000"/>
+              </a:lnSpc>
+              <a:spcAft>
+                <a:spcPts val="600"/>
+              </a:spcAft>
+              <a:buFont typeface="Arial" panose="020B0604020202020204" pitchFamily="34" charset="0"/>
+              <a:buChar char="•"/>
+            </a:pPr>
+            <a:r>
+              <a:rPr lang="de-DE" sz="1800" kern="100" dirty="0">
+                <a:effectLst/>
+                <a:latin typeface="Aptos" panose="020B0004020202020204" pitchFamily="34" charset="0"/>
+                <a:ea typeface="Aptos" panose="020B0004020202020204" pitchFamily="34" charset="0"/>
+                <a:cs typeface="Times New Roman" panose="02020603050405020304" pitchFamily="18" charset="0"/>
+              </a:rPr>
+              <a:t>– also wie wir als Team gearbeitet haben, welche Tools wir verwendet haben und welche Herausforderungen es dabei gab.</a:t>
+            </a:r>
+          </a:p>
+          <a:p>
+            <a:pPr marL="285750" indent="-285750" algn="just">
+              <a:lnSpc>
+                <a:spcPct val="150000"/>
+              </a:lnSpc>
+              <a:spcAft>
+                <a:spcPts val="600"/>
+              </a:spcAft>
+              <a:buFont typeface="Arial" panose="020B0604020202020204" pitchFamily="34" charset="0"/>
+              <a:buChar char="•"/>
+            </a:pPr>
+            <a:r>
+              <a:rPr lang="de-DE" sz="1800" kern="100" dirty="0">
+                <a:effectLst/>
+                <a:latin typeface="Aptos" panose="020B0004020202020204" pitchFamily="34" charset="0"/>
+                <a:ea typeface="Aptos" panose="020B0004020202020204" pitchFamily="34" charset="0"/>
+                <a:cs typeface="Times New Roman" panose="02020603050405020304" pitchFamily="18" charset="0"/>
+              </a:rPr>
+              <a:t>Danach übernimmt Leon und zeigt euch das Design sowie die Userführung unseres Kochbuchs, </a:t>
+            </a:r>
+          </a:p>
+          <a:p>
+            <a:pPr marL="285750" indent="-285750" algn="just">
+              <a:lnSpc>
+                <a:spcPct val="150000"/>
+              </a:lnSpc>
+              <a:spcAft>
+                <a:spcPts val="600"/>
+              </a:spcAft>
+              <a:buFont typeface="Arial" panose="020B0604020202020204" pitchFamily="34" charset="0"/>
+              <a:buChar char="•"/>
+            </a:pPr>
+            <a:r>
+              <a:rPr lang="de-DE" sz="1800" kern="100" dirty="0">
+                <a:effectLst/>
+                <a:latin typeface="Aptos" panose="020B0004020202020204" pitchFamily="34" charset="0"/>
+                <a:ea typeface="Aptos" panose="020B0004020202020204" pitchFamily="34" charset="0"/>
+                <a:cs typeface="Times New Roman" panose="02020603050405020304" pitchFamily="18" charset="0"/>
+              </a:rPr>
+              <a:t>bevor Olli die technischen Details kurz erklärt.</a:t>
+            </a:r>
+          </a:p>
+          <a:p>
+            <a:pPr marL="285750" indent="-285750" algn="just">
+              <a:lnSpc>
+                <a:spcPct val="150000"/>
+              </a:lnSpc>
+              <a:spcAft>
+                <a:spcPts val="600"/>
+              </a:spcAft>
+              <a:buFont typeface="Arial" panose="020B0604020202020204" pitchFamily="34" charset="0"/>
+              <a:buChar char="•"/>
+            </a:pPr>
+            <a:r>
+              <a:rPr lang="de-DE" sz="1800" kern="100" dirty="0">
+                <a:effectLst/>
+                <a:latin typeface="Aptos" panose="020B0004020202020204" pitchFamily="34" charset="0"/>
+                <a:ea typeface="Aptos" panose="020B0004020202020204" pitchFamily="34" charset="0"/>
+                <a:cs typeface="Times New Roman" panose="02020603050405020304" pitchFamily="18" charset="0"/>
+              </a:rPr>
+              <a:t>Im Anschluss stellen Leon und Olli gemeinsam den Code vor </a:t>
+            </a:r>
+          </a:p>
+          <a:p>
+            <a:pPr marL="742950" lvl="1" indent="-285750" algn="just">
+              <a:lnSpc>
+                <a:spcPct val="150000"/>
+              </a:lnSpc>
+              <a:spcAft>
+                <a:spcPts val="600"/>
+              </a:spcAft>
+              <a:buFont typeface="Arial" panose="020B0604020202020204" pitchFamily="34" charset="0"/>
+              <a:buChar char="•"/>
+            </a:pPr>
+            <a:r>
+              <a:rPr lang="de-DE" sz="1800" kern="100" dirty="0">
+                <a:effectLst/>
+                <a:latin typeface="Aptos" panose="020B0004020202020204" pitchFamily="34" charset="0"/>
+                <a:ea typeface="Aptos" panose="020B0004020202020204" pitchFamily="34" charset="0"/>
+                <a:cs typeface="Times New Roman" panose="02020603050405020304" pitchFamily="18" charset="0"/>
+              </a:rPr>
+              <a:t>– inklusive einer kurzen Demo des aktuellen Ist-Zustands </a:t>
+            </a:r>
+          </a:p>
+          <a:p>
+            <a:pPr marL="742950" lvl="1" indent="-285750" algn="just">
+              <a:lnSpc>
+                <a:spcPct val="150000"/>
+              </a:lnSpc>
+              <a:spcAft>
+                <a:spcPts val="600"/>
+              </a:spcAft>
+              <a:buFont typeface="Arial" panose="020B0604020202020204" pitchFamily="34" charset="0"/>
+              <a:buChar char="•"/>
+            </a:pPr>
+            <a:r>
+              <a:rPr lang="de-DE" sz="1800" kern="100" dirty="0">
+                <a:effectLst/>
+                <a:latin typeface="Aptos" panose="020B0004020202020204" pitchFamily="34" charset="0"/>
+                <a:ea typeface="Aptos" panose="020B0004020202020204" pitchFamily="34" charset="0"/>
+                <a:cs typeface="Times New Roman" panose="02020603050405020304" pitchFamily="18" charset="0"/>
+              </a:rPr>
+              <a:t>und einem Ausblick zu Themen wie Security und Datenschutz.</a:t>
+            </a:r>
+          </a:p>
+          <a:p>
+            <a:pPr marL="285750" indent="-285750" algn="just">
+              <a:lnSpc>
+                <a:spcPct val="150000"/>
+              </a:lnSpc>
+              <a:spcAft>
+                <a:spcPts val="600"/>
+              </a:spcAft>
+              <a:buFont typeface="Arial" panose="020B0604020202020204" pitchFamily="34" charset="0"/>
+              <a:buChar char="•"/>
+            </a:pPr>
+            <a:r>
+              <a:rPr lang="de-DE" sz="1800" kern="100" dirty="0">
+                <a:effectLst/>
+                <a:latin typeface="Aptos" panose="020B0004020202020204" pitchFamily="34" charset="0"/>
+                <a:ea typeface="Aptos" panose="020B0004020202020204" pitchFamily="34" charset="0"/>
+                <a:cs typeface="Times New Roman" panose="02020603050405020304" pitchFamily="18" charset="0"/>
+              </a:rPr>
+              <a:t>Zum Abschluss fasse ich dann unter dem Punkt </a:t>
+            </a:r>
+            <a:r>
+              <a:rPr lang="de-DE" sz="1800" kern="100" dirty="0" err="1">
+                <a:effectLst/>
+                <a:latin typeface="Aptos" panose="020B0004020202020204" pitchFamily="34" charset="0"/>
+                <a:ea typeface="Aptos" panose="020B0004020202020204" pitchFamily="34" charset="0"/>
+                <a:cs typeface="Times New Roman" panose="02020603050405020304" pitchFamily="18" charset="0"/>
+              </a:rPr>
+              <a:t>Lessons</a:t>
+            </a:r>
+            <a:r>
+              <a:rPr lang="de-DE" sz="1800" kern="100" dirty="0">
+                <a:effectLst/>
+                <a:latin typeface="Aptos" panose="020B0004020202020204" pitchFamily="34" charset="0"/>
+                <a:ea typeface="Aptos" panose="020B0004020202020204" pitchFamily="34" charset="0"/>
+                <a:cs typeface="Times New Roman" panose="02020603050405020304" pitchFamily="18" charset="0"/>
+              </a:rPr>
+              <a:t> </a:t>
+            </a:r>
+            <a:r>
+              <a:rPr lang="de-DE" sz="1800" kern="100" dirty="0" err="1">
+                <a:effectLst/>
+                <a:latin typeface="Aptos" panose="020B0004020202020204" pitchFamily="34" charset="0"/>
+                <a:ea typeface="Aptos" panose="020B0004020202020204" pitchFamily="34" charset="0"/>
+                <a:cs typeface="Times New Roman" panose="02020603050405020304" pitchFamily="18" charset="0"/>
+              </a:rPr>
+              <a:t>Learned</a:t>
+            </a:r>
+            <a:r>
+              <a:rPr lang="de-DE" sz="1800" kern="100" dirty="0">
+                <a:effectLst/>
+                <a:latin typeface="Aptos" panose="020B0004020202020204" pitchFamily="34" charset="0"/>
+                <a:ea typeface="Aptos" panose="020B0004020202020204" pitchFamily="34" charset="0"/>
+                <a:cs typeface="Times New Roman" panose="02020603050405020304" pitchFamily="18" charset="0"/>
+              </a:rPr>
+              <a:t> unsere wichtigsten Erfahrungen aus dem Projektverlauf zusammen. </a:t>
+            </a:r>
+          </a:p>
+          <a:p>
+            <a:pPr marL="285750" indent="-285750" algn="just">
+              <a:lnSpc>
+                <a:spcPct val="150000"/>
+              </a:lnSpc>
+              <a:spcAft>
+                <a:spcPts val="600"/>
+              </a:spcAft>
+              <a:buFont typeface="Arial" panose="020B0604020202020204" pitchFamily="34" charset="0"/>
+              <a:buChar char="•"/>
+            </a:pPr>
+            <a:endParaRPr lang="de-DE" sz="1800" kern="100" dirty="0">
+              <a:effectLst/>
+              <a:latin typeface="Aptos" panose="020B0004020202020204" pitchFamily="34" charset="0"/>
+              <a:ea typeface="Aptos" panose="020B0004020202020204" pitchFamily="34" charset="0"/>
+              <a:cs typeface="Times New Roman" panose="02020603050405020304" pitchFamily="18" charset="0"/>
+            </a:endParaRPr>
+          </a:p>
+          <a:p>
+            <a:pPr marL="285750" indent="-285750" algn="just">
+              <a:lnSpc>
+                <a:spcPct val="150000"/>
+              </a:lnSpc>
+              <a:spcAft>
+                <a:spcPts val="600"/>
+              </a:spcAft>
+              <a:buFont typeface="Arial" panose="020B0604020202020204" pitchFamily="34" charset="0"/>
+              <a:buChar char="•"/>
+            </a:pPr>
+            <a:r>
+              <a:rPr lang="de-DE" sz="1800" kern="100" dirty="0">
+                <a:effectLst/>
+                <a:latin typeface="Aptos" panose="020B0004020202020204" pitchFamily="34" charset="0"/>
+                <a:ea typeface="Aptos" panose="020B0004020202020204" pitchFamily="34" charset="0"/>
+                <a:cs typeface="Times New Roman" panose="02020603050405020304" pitchFamily="18" charset="0"/>
+              </a:rPr>
+              <a:t>Das Fazit am Ende kommt dann von </a:t>
+            </a:r>
+            <a:r>
+              <a:rPr lang="de-DE" sz="1800" kern="100" dirty="0" err="1">
+                <a:effectLst/>
+                <a:latin typeface="Aptos" panose="020B0004020202020204" pitchFamily="34" charset="0"/>
+                <a:ea typeface="Aptos" panose="020B0004020202020204" pitchFamily="34" charset="0"/>
+                <a:cs typeface="Times New Roman" panose="02020603050405020304" pitchFamily="18" charset="0"/>
+              </a:rPr>
+              <a:t>Finnley</a:t>
+            </a:r>
+            <a:r>
+              <a:rPr lang="de-DE" sz="1800" kern="100" dirty="0">
+                <a:effectLst/>
+                <a:latin typeface="Aptos" panose="020B0004020202020204" pitchFamily="34" charset="0"/>
+                <a:ea typeface="Aptos" panose="020B0004020202020204" pitchFamily="34" charset="0"/>
+                <a:cs typeface="Times New Roman" panose="02020603050405020304" pitchFamily="18" charset="0"/>
+              </a:rPr>
+              <a:t>.“</a:t>
+            </a:r>
+          </a:p>
+          <a:p>
+            <a:pPr marL="342900" indent="-342900" rtl="0">
+              <a:buFont typeface="Arial" panose="020B0604020202020204" pitchFamily="34" charset="0"/>
+              <a:buChar char="•"/>
+            </a:pPr>
+            <a:endParaRPr lang="de-DE" dirty="0"/>
+          </a:p>
+          <a:p>
+            <a:pPr marL="0" indent="0" rtl="0">
+              <a:buFont typeface="Arial" panose="020B0604020202020204" pitchFamily="34" charset="0"/>
+              <a:buNone/>
+            </a:pPr>
+            <a:r>
+              <a:rPr lang="de-DE" dirty="0"/>
+              <a:t>Übersicht wer was macht:</a:t>
+            </a:r>
+          </a:p>
+          <a:p>
             <a:pPr marL="342900" indent="-342900" rtl="0">
               <a:buFont typeface="+mj-lt"/>
               <a:buAutoNum type="arabicPeriod"/>
@@ -3109,8 +4503,373 @@
           <a:bodyPr rtlCol="0"/>
           <a:lstStyle/>
           <a:p>
-            <a:pPr rtl="0"/>
-            <a:endParaRPr lang="de-DE"/>
+            <a:pPr marL="285750" indent="-285750" algn="just">
+              <a:lnSpc>
+                <a:spcPct val="150000"/>
+              </a:lnSpc>
+              <a:spcAft>
+                <a:spcPts val="600"/>
+              </a:spcAft>
+              <a:buFont typeface="Arial" panose="020B0604020202020204" pitchFamily="34" charset="0"/>
+              <a:buChar char="•"/>
+            </a:pPr>
+            <a:r>
+              <a:rPr lang="de-DE" sz="1800" kern="100" dirty="0">
+                <a:effectLst/>
+                <a:latin typeface="Aptos" panose="020B0004020202020204" pitchFamily="34" charset="0"/>
+                <a:ea typeface="Aptos" panose="020B0004020202020204" pitchFamily="34" charset="0"/>
+                <a:cs typeface="Times New Roman" panose="02020603050405020304" pitchFamily="18" charset="0"/>
+              </a:rPr>
+              <a:t>Zeitmanagement ist ein Schlüsselfaktor </a:t>
+            </a:r>
+          </a:p>
+          <a:p>
+            <a:pPr marL="742950" lvl="1" indent="-285750" algn="just">
+              <a:lnSpc>
+                <a:spcPct val="150000"/>
+              </a:lnSpc>
+              <a:spcAft>
+                <a:spcPts val="600"/>
+              </a:spcAft>
+              <a:buFont typeface="Arial" panose="020B0604020202020204" pitchFamily="34" charset="0"/>
+              <a:buChar char="•"/>
+            </a:pPr>
+            <a:r>
+              <a:rPr lang="de-DE" sz="1800" kern="100" dirty="0">
+                <a:effectLst/>
+                <a:latin typeface="Aptos" panose="020B0004020202020204" pitchFamily="34" charset="0"/>
+                <a:ea typeface="Aptos" panose="020B0004020202020204" pitchFamily="34" charset="0"/>
+                <a:cs typeface="Times New Roman" panose="02020603050405020304" pitchFamily="18" charset="0"/>
+              </a:rPr>
+              <a:t>– besonders, wenn mehrere Verpflichtungen gleichzeitig laufen. </a:t>
+            </a:r>
+          </a:p>
+          <a:p>
+            <a:pPr marL="285750" lvl="0" indent="-285750" algn="just">
+              <a:lnSpc>
+                <a:spcPct val="150000"/>
+              </a:lnSpc>
+              <a:spcAft>
+                <a:spcPts val="600"/>
+              </a:spcAft>
+              <a:buFont typeface="Arial" panose="020B0604020202020204" pitchFamily="34" charset="0"/>
+              <a:buChar char="•"/>
+            </a:pPr>
+            <a:r>
+              <a:rPr lang="de-DE" sz="1800" kern="100" dirty="0">
+                <a:effectLst/>
+                <a:latin typeface="Aptos" panose="020B0004020202020204" pitchFamily="34" charset="0"/>
+                <a:ea typeface="Aptos" panose="020B0004020202020204" pitchFamily="34" charset="0"/>
+                <a:cs typeface="Times New Roman" panose="02020603050405020304" pitchFamily="18" charset="0"/>
+              </a:rPr>
+              <a:t>Gerade in Kombination mit unregelmäßiger Kommunikation kann das Projekte verzögern oder unnötig verkomplizieren.</a:t>
+            </a:r>
+          </a:p>
+          <a:p>
+            <a:pPr marL="285750" indent="-285750" algn="just">
+              <a:lnSpc>
+                <a:spcPct val="150000"/>
+              </a:lnSpc>
+              <a:spcAft>
+                <a:spcPts val="600"/>
+              </a:spcAft>
+              <a:buFont typeface="Arial" panose="020B0604020202020204" pitchFamily="34" charset="0"/>
+              <a:buChar char="•"/>
+            </a:pPr>
+            <a:r>
+              <a:rPr lang="de-DE" sz="1800" kern="100" dirty="0">
+                <a:effectLst/>
+                <a:latin typeface="Aptos" panose="020B0004020202020204" pitchFamily="34" charset="0"/>
+                <a:ea typeface="Aptos" panose="020B0004020202020204" pitchFamily="34" charset="0"/>
+                <a:cs typeface="Times New Roman" panose="02020603050405020304" pitchFamily="18" charset="0"/>
+              </a:rPr>
+              <a:t>Ein wichtiges Learning war für uns auch der Einsatz von GitHub als zentrales Tool zur Code- und Dokumentenverwaltung. </a:t>
+            </a:r>
+          </a:p>
+          <a:p>
+            <a:pPr marL="742950" lvl="1" indent="-285750" algn="just">
+              <a:lnSpc>
+                <a:spcPct val="150000"/>
+              </a:lnSpc>
+              <a:spcAft>
+                <a:spcPts val="600"/>
+              </a:spcAft>
+              <a:buFont typeface="Arial" panose="020B0604020202020204" pitchFamily="34" charset="0"/>
+              <a:buChar char="•"/>
+            </a:pPr>
+            <a:r>
+              <a:rPr lang="de-DE" sz="1800" kern="100" dirty="0">
+                <a:effectLst/>
+                <a:latin typeface="Aptos" panose="020B0004020202020204" pitchFamily="34" charset="0"/>
+                <a:ea typeface="Aptos" panose="020B0004020202020204" pitchFamily="34" charset="0"/>
+                <a:cs typeface="Times New Roman" panose="02020603050405020304" pitchFamily="18" charset="0"/>
+              </a:rPr>
+              <a:t>Auch wenn der Einstieg etwas holprig war, hat es sich langfristig bewährt. E</a:t>
+            </a:r>
+          </a:p>
+          <a:p>
+            <a:pPr marL="285750" lvl="0" indent="-285750" algn="just">
+              <a:lnSpc>
+                <a:spcPct val="150000"/>
+              </a:lnSpc>
+              <a:spcAft>
+                <a:spcPts val="600"/>
+              </a:spcAft>
+              <a:buFont typeface="Arial" panose="020B0604020202020204" pitchFamily="34" charset="0"/>
+              <a:buChar char="•"/>
+            </a:pPr>
+            <a:r>
+              <a:rPr lang="de-DE" sz="1800" kern="100" dirty="0" err="1">
+                <a:effectLst/>
+                <a:latin typeface="Aptos" panose="020B0004020202020204" pitchFamily="34" charset="0"/>
+                <a:ea typeface="Aptos" panose="020B0004020202020204" pitchFamily="34" charset="0"/>
+                <a:cs typeface="Times New Roman" panose="02020603050405020304" pitchFamily="18" charset="0"/>
+              </a:rPr>
+              <a:t>benso</a:t>
+            </a:r>
+            <a:r>
+              <a:rPr lang="de-DE" sz="1800" kern="100" dirty="0">
+                <a:effectLst/>
+                <a:latin typeface="Aptos" panose="020B0004020202020204" pitchFamily="34" charset="0"/>
+                <a:ea typeface="Aptos" panose="020B0004020202020204" pitchFamily="34" charset="0"/>
+                <a:cs typeface="Times New Roman" panose="02020603050405020304" pitchFamily="18" charset="0"/>
+              </a:rPr>
+              <a:t> war die Arbeit mit Java DTOs ein interessanter technischer Aspekt, der uns half, die Backend-Struktur sauber und nachvollziehbar zu gestalten.</a:t>
+            </a:r>
+          </a:p>
+          <a:p>
+            <a:pPr marL="285750" indent="-285750" algn="just">
+              <a:lnSpc>
+                <a:spcPct val="150000"/>
+              </a:lnSpc>
+              <a:spcAft>
+                <a:spcPts val="600"/>
+              </a:spcAft>
+              <a:buFont typeface="Arial" panose="020B0604020202020204" pitchFamily="34" charset="0"/>
+              <a:buChar char="•"/>
+            </a:pPr>
+            <a:r>
+              <a:rPr lang="de-DE" sz="1800" kern="100" dirty="0">
+                <a:effectLst/>
+                <a:latin typeface="Aptos" panose="020B0004020202020204" pitchFamily="34" charset="0"/>
+                <a:ea typeface="Aptos" panose="020B0004020202020204" pitchFamily="34" charset="0"/>
+                <a:cs typeface="Times New Roman" panose="02020603050405020304" pitchFamily="18" charset="0"/>
+              </a:rPr>
+              <a:t>Die Spezifikation wurde mit der Zeit immer detailreicher </a:t>
+            </a:r>
+          </a:p>
+          <a:p>
+            <a:pPr marL="742950" lvl="1" indent="-285750" algn="just">
+              <a:lnSpc>
+                <a:spcPct val="150000"/>
+              </a:lnSpc>
+              <a:spcAft>
+                <a:spcPts val="600"/>
+              </a:spcAft>
+              <a:buFont typeface="Arial" panose="020B0604020202020204" pitchFamily="34" charset="0"/>
+              <a:buChar char="•"/>
+            </a:pPr>
+            <a:r>
+              <a:rPr lang="de-DE" sz="1800" kern="100" dirty="0">
+                <a:effectLst/>
+                <a:latin typeface="Aptos" panose="020B0004020202020204" pitchFamily="34" charset="0"/>
+                <a:ea typeface="Aptos" panose="020B0004020202020204" pitchFamily="34" charset="0"/>
+                <a:cs typeface="Times New Roman" panose="02020603050405020304" pitchFamily="18" charset="0"/>
+              </a:rPr>
+              <a:t>– was definitiv zu mehr Klarheit beigetragen hat, manchmal jedoch auch unübersichtliche Stellen offen lies die wiederum erst ausgearbeitet werden mussten. </a:t>
+            </a:r>
+          </a:p>
+          <a:p>
+            <a:pPr marL="285750" lvl="0" indent="-285750" algn="just">
+              <a:lnSpc>
+                <a:spcPct val="150000"/>
+              </a:lnSpc>
+              <a:spcAft>
+                <a:spcPts val="600"/>
+              </a:spcAft>
+              <a:buFont typeface="Arial" panose="020B0604020202020204" pitchFamily="34" charset="0"/>
+              <a:buChar char="•"/>
+            </a:pPr>
+            <a:r>
+              <a:rPr lang="de-DE" sz="1800" kern="100" dirty="0">
+                <a:effectLst/>
+                <a:latin typeface="Aptos" panose="020B0004020202020204" pitchFamily="34" charset="0"/>
+                <a:ea typeface="Aptos" panose="020B0004020202020204" pitchFamily="34" charset="0"/>
+                <a:cs typeface="Times New Roman" panose="02020603050405020304" pitchFamily="18" charset="0"/>
+              </a:rPr>
+              <a:t>Allerdings haben wir auch gelernt, dass es wichtig ist, Vorstellungen frühzeitig abzugleichen. </a:t>
+            </a:r>
+          </a:p>
+          <a:p>
+            <a:pPr marL="285750" lvl="0" indent="-285750" algn="just">
+              <a:lnSpc>
+                <a:spcPct val="150000"/>
+              </a:lnSpc>
+              <a:spcAft>
+                <a:spcPts val="600"/>
+              </a:spcAft>
+              <a:buFont typeface="Arial" panose="020B0604020202020204" pitchFamily="34" charset="0"/>
+              <a:buChar char="•"/>
+            </a:pPr>
+            <a:r>
+              <a:rPr lang="de-DE" sz="1800" kern="100" dirty="0">
+                <a:effectLst/>
+                <a:latin typeface="Aptos" panose="020B0004020202020204" pitchFamily="34" charset="0"/>
+                <a:ea typeface="Aptos" panose="020B0004020202020204" pitchFamily="34" charset="0"/>
+                <a:cs typeface="Times New Roman" panose="02020603050405020304" pitchFamily="18" charset="0"/>
+              </a:rPr>
+              <a:t>Nicht jeder versteht z. B. ein </a:t>
+            </a:r>
+            <a:r>
+              <a:rPr lang="de-DE" sz="1800" kern="100" dirty="0">
+                <a:effectLst/>
+                <a:latin typeface="Aptos" panose="020B0004020202020204" pitchFamily="34" charset="0"/>
+                <a:ea typeface="Aptos" panose="020B0004020202020204" pitchFamily="34" charset="0"/>
+                <a:cs typeface="Aptos" panose="020B0004020202020204" pitchFamily="34" charset="0"/>
+              </a:rPr>
+              <a:t>‚</a:t>
+            </a:r>
+            <a:r>
+              <a:rPr lang="de-DE" sz="1800" kern="100" dirty="0">
+                <a:effectLst/>
+                <a:latin typeface="Aptos" panose="020B0004020202020204" pitchFamily="34" charset="0"/>
+                <a:ea typeface="Aptos" panose="020B0004020202020204" pitchFamily="34" charset="0"/>
+                <a:cs typeface="Times New Roman" panose="02020603050405020304" pitchFamily="18" charset="0"/>
+              </a:rPr>
+              <a:t>digitales Kochbuch</a:t>
+            </a:r>
+            <a:r>
+              <a:rPr lang="de-DE" sz="1800" kern="100" dirty="0">
+                <a:effectLst/>
+                <a:latin typeface="Aptos" panose="020B0004020202020204" pitchFamily="34" charset="0"/>
+                <a:ea typeface="Aptos" panose="020B0004020202020204" pitchFamily="34" charset="0"/>
+                <a:cs typeface="Aptos" panose="020B0004020202020204" pitchFamily="34" charset="0"/>
+              </a:rPr>
+              <a:t>‘</a:t>
+            </a:r>
+            <a:r>
+              <a:rPr lang="de-DE" sz="1800" kern="100" dirty="0">
+                <a:effectLst/>
+                <a:latin typeface="Aptos" panose="020B0004020202020204" pitchFamily="34" charset="0"/>
+                <a:ea typeface="Aptos" panose="020B0004020202020204" pitchFamily="34" charset="0"/>
+                <a:cs typeface="Times New Roman" panose="02020603050405020304" pitchFamily="18" charset="0"/>
+              </a:rPr>
+              <a:t> auf dieselbe Weise </a:t>
+            </a:r>
+          </a:p>
+          <a:p>
+            <a:pPr marL="742950" lvl="1" indent="-285750" algn="just">
+              <a:lnSpc>
+                <a:spcPct val="150000"/>
+              </a:lnSpc>
+              <a:spcAft>
+                <a:spcPts val="600"/>
+              </a:spcAft>
+              <a:buFont typeface="Arial" panose="020B0604020202020204" pitchFamily="34" charset="0"/>
+              <a:buChar char="•"/>
+            </a:pPr>
+            <a:r>
+              <a:rPr lang="de-DE" sz="1800" kern="100" dirty="0">
+                <a:effectLst/>
+                <a:latin typeface="Aptos" panose="020B0004020202020204" pitchFamily="34" charset="0"/>
+                <a:ea typeface="Aptos" panose="020B0004020202020204" pitchFamily="34" charset="0"/>
+                <a:cs typeface="Aptos" panose="020B0004020202020204" pitchFamily="34" charset="0"/>
+              </a:rPr>
+              <a:t>–</a:t>
+            </a:r>
+            <a:r>
+              <a:rPr lang="de-DE" sz="1800" kern="100" dirty="0">
+                <a:effectLst/>
+                <a:latin typeface="Aptos" panose="020B0004020202020204" pitchFamily="34" charset="0"/>
+                <a:ea typeface="Aptos" panose="020B0004020202020204" pitchFamily="34" charset="0"/>
+                <a:cs typeface="Times New Roman" panose="02020603050405020304" pitchFamily="18" charset="0"/>
+              </a:rPr>
+              <a:t> daher ist Kommunikation auf inhaltlicher Ebene genauso entscheidend wie auf technischer.</a:t>
+            </a:r>
+          </a:p>
+          <a:p>
+            <a:pPr marL="285750" indent="-285750" algn="just">
+              <a:lnSpc>
+                <a:spcPct val="150000"/>
+              </a:lnSpc>
+              <a:spcAft>
+                <a:spcPts val="600"/>
+              </a:spcAft>
+              <a:buFont typeface="Arial" panose="020B0604020202020204" pitchFamily="34" charset="0"/>
+              <a:buChar char="•"/>
+            </a:pPr>
+            <a:r>
+              <a:rPr lang="de-DE" sz="1800" kern="100" dirty="0">
+                <a:effectLst/>
+                <a:latin typeface="Aptos" panose="020B0004020202020204" pitchFamily="34" charset="0"/>
+                <a:ea typeface="Aptos" panose="020B0004020202020204" pitchFamily="34" charset="0"/>
+                <a:cs typeface="Times New Roman" panose="02020603050405020304" pitchFamily="18" charset="0"/>
+              </a:rPr>
+              <a:t>Und abschließend: Planung ist gut, aber Anpassungsfähigkeit ist genauso wichtig. </a:t>
+            </a:r>
+          </a:p>
+          <a:p>
+            <a:pPr marL="285750" indent="-285750" algn="just">
+              <a:lnSpc>
+                <a:spcPct val="150000"/>
+              </a:lnSpc>
+              <a:spcAft>
+                <a:spcPts val="600"/>
+              </a:spcAft>
+              <a:buFont typeface="Arial" panose="020B0604020202020204" pitchFamily="34" charset="0"/>
+              <a:buChar char="•"/>
+            </a:pPr>
+            <a:r>
+              <a:rPr lang="de-DE" sz="1800" kern="100" dirty="0">
+                <a:effectLst/>
+                <a:latin typeface="Aptos" panose="020B0004020202020204" pitchFamily="34" charset="0"/>
+                <a:ea typeface="Aptos" panose="020B0004020202020204" pitchFamily="34" charset="0"/>
+                <a:cs typeface="Times New Roman" panose="02020603050405020304" pitchFamily="18" charset="0"/>
+              </a:rPr>
+              <a:t>Unser Projekt hat sich über die Zeit entwickelt </a:t>
+            </a:r>
+          </a:p>
+          <a:p>
+            <a:pPr marL="742950" lvl="1" indent="-285750" algn="just">
+              <a:lnSpc>
+                <a:spcPct val="150000"/>
+              </a:lnSpc>
+              <a:spcAft>
+                <a:spcPts val="600"/>
+              </a:spcAft>
+              <a:buFont typeface="Arial" panose="020B0604020202020204" pitchFamily="34" charset="0"/>
+              <a:buChar char="•"/>
+            </a:pPr>
+            <a:r>
+              <a:rPr lang="de-DE" sz="1800" kern="100" dirty="0">
+                <a:effectLst/>
+                <a:latin typeface="Aptos" panose="020B0004020202020204" pitchFamily="34" charset="0"/>
+                <a:ea typeface="Aptos" panose="020B0004020202020204" pitchFamily="34" charset="0"/>
+                <a:cs typeface="Times New Roman" panose="02020603050405020304" pitchFamily="18" charset="0"/>
+              </a:rPr>
+              <a:t>– und wir mussten flexibel auf Veränderungen reagieren. </a:t>
+            </a:r>
+          </a:p>
+          <a:p>
+            <a:pPr marL="285750" lvl="0" indent="-285750" algn="just">
+              <a:lnSpc>
+                <a:spcPct val="150000"/>
+              </a:lnSpc>
+              <a:spcAft>
+                <a:spcPts val="600"/>
+              </a:spcAft>
+              <a:buFont typeface="Arial" panose="020B0604020202020204" pitchFamily="34" charset="0"/>
+              <a:buChar char="•"/>
+            </a:pPr>
+            <a:r>
+              <a:rPr lang="de-DE" sz="1800" kern="100" dirty="0">
+                <a:effectLst/>
+                <a:latin typeface="Aptos" panose="020B0004020202020204" pitchFamily="34" charset="0"/>
+                <a:ea typeface="Aptos" panose="020B0004020202020204" pitchFamily="34" charset="0"/>
+                <a:cs typeface="Times New Roman" panose="02020603050405020304" pitchFamily="18" charset="0"/>
+              </a:rPr>
+              <a:t>Dieses Maß an Reaktion und Improvisation hat sich am Ende als wertvoll herausgestellt.</a:t>
+            </a:r>
           </a:p>
         </p:txBody>
       </p:sp>
@@ -3220,7 +4979,55 @@
           <a:lstStyle/>
           <a:p>
             <a:pPr rtl="0"/>
-            <a:endParaRPr lang="de-DE"/>
+            <a:r>
+              <a:rPr lang="de-DE" dirty="0"/>
+              <a:t>Abschließend kann man sowas sagen wie:</a:t>
+            </a:r>
+          </a:p>
+          <a:p>
+            <a:pPr rtl="0"/>
+            <a:endParaRPr lang="de-DE" dirty="0"/>
+          </a:p>
+          <a:p>
+            <a:pPr rtl="0"/>
+            <a:r>
+              <a:rPr lang="de-DE" dirty="0"/>
+              <a:t>In diesem Projekt sollte es um eine Fallstudie im Software-Engineering Prozess gehen, jedoch spielten hier viele uns bereits durch das Studium bekannte Felder Hand in Hand zusammen.</a:t>
+            </a:r>
+          </a:p>
+          <a:p>
+            <a:pPr rtl="0"/>
+            <a:r>
+              <a:rPr lang="de-DE" dirty="0"/>
+              <a:t>So hatten wir nicht alleine mit dem SE </a:t>
+            </a:r>
+            <a:r>
+              <a:rPr lang="de-DE" dirty="0" err="1"/>
+              <a:t>part</a:t>
+            </a:r>
+            <a:r>
+              <a:rPr lang="de-DE" dirty="0"/>
+              <a:t> zu kämpfen, sondern brauchten vorher ein gewisses bisschen </a:t>
+            </a:r>
+            <a:r>
+              <a:rPr lang="de-DE" dirty="0" err="1"/>
+              <a:t>Requirements</a:t>
+            </a:r>
+            <a:r>
+              <a:rPr lang="de-DE" dirty="0"/>
+              <a:t> Engineering und im nachhinein hätte uns ein wenig QS bestimmt auch einiges an Arbeit abgenommen.</a:t>
+            </a:r>
+          </a:p>
+          <a:p>
+            <a:pPr rtl="0"/>
+            <a:r>
+              <a:rPr lang="de-DE" dirty="0"/>
+              <a:t>Wir hatten alle ein vernünftiges Learning mit dem Projekt und hoffen, euch vernünftigen Einblick in unseren Schaffensprozess gegeben haben </a:t>
+            </a:r>
+            <a:r>
+              <a:rPr lang="de-DE"/>
+              <a:t>zu können.</a:t>
+            </a:r>
           </a:p>
         </p:txBody>
       </p:sp>
@@ -4023,7 +5830,154 @@
           <a:bodyPr rtlCol="0"/>
           <a:lstStyle/>
           <a:p>
-            <a:pPr rtl="0"/>
+            <a:pPr marL="285750" indent="-285750" rtl="0">
+              <a:buFont typeface="Arial" panose="020B0604020202020204" pitchFamily="34" charset="0"/>
+              <a:buChar char="•"/>
+            </a:pPr>
+            <a:r>
+              <a:rPr lang="de-DE" sz="1800" dirty="0">
+                <a:effectLst/>
+                <a:latin typeface="Aptos" panose="020B0004020202020204" pitchFamily="34" charset="0"/>
+                <a:ea typeface="Aptos" panose="020B0004020202020204" pitchFamily="34" charset="0"/>
+                <a:cs typeface="Times New Roman" panose="02020603050405020304" pitchFamily="18" charset="0"/>
+              </a:rPr>
+              <a:t>Wie kam es zur Idee eines digitalen Kochbuchs? </a:t>
+            </a:r>
+          </a:p>
+          <a:p>
+            <a:pPr marL="285750" indent="-285750" rtl="0">
+              <a:buFont typeface="Arial" panose="020B0604020202020204" pitchFamily="34" charset="0"/>
+              <a:buChar char="•"/>
+            </a:pPr>
+            <a:r>
+              <a:rPr lang="de-DE" sz="1800" dirty="0">
+                <a:effectLst/>
+                <a:latin typeface="Aptos" panose="020B0004020202020204" pitchFamily="34" charset="0"/>
+                <a:ea typeface="Aptos" panose="020B0004020202020204" pitchFamily="34" charset="0"/>
+                <a:cs typeface="Times New Roman" panose="02020603050405020304" pitchFamily="18" charset="0"/>
+              </a:rPr>
+              <a:t>Tatsächlich sind Rezeptdatenbanken im Netz allgegenwärtig. </a:t>
+            </a:r>
+          </a:p>
+          <a:p>
+            <a:pPr marL="285750" indent="-285750" rtl="0">
+              <a:buFont typeface="Arial" panose="020B0604020202020204" pitchFamily="34" charset="0"/>
+              <a:buChar char="•"/>
+            </a:pPr>
+            <a:r>
+              <a:rPr lang="de-DE" sz="1800" dirty="0">
+                <a:effectLst/>
+                <a:latin typeface="Aptos" panose="020B0004020202020204" pitchFamily="34" charset="0"/>
+                <a:ea typeface="Aptos" panose="020B0004020202020204" pitchFamily="34" charset="0"/>
+                <a:cs typeface="Times New Roman" panose="02020603050405020304" pitchFamily="18" charset="0"/>
+              </a:rPr>
+              <a:t>Viele davon haben sich im Laufe der Zeit stark weiterentwickelt </a:t>
+            </a:r>
+          </a:p>
+          <a:p>
+            <a:pPr marL="742950" lvl="1" indent="-285750" rtl="0">
+              <a:buFont typeface="Arial" panose="020B0604020202020204" pitchFamily="34" charset="0"/>
+              <a:buChar char="•"/>
+            </a:pPr>
+            <a:r>
+              <a:rPr lang="de-DE" sz="1800" dirty="0">
+                <a:effectLst/>
+                <a:latin typeface="Aptos" panose="020B0004020202020204" pitchFamily="34" charset="0"/>
+                <a:ea typeface="Aptos" panose="020B0004020202020204" pitchFamily="34" charset="0"/>
+                <a:cs typeface="Times New Roman" panose="02020603050405020304" pitchFamily="18" charset="0"/>
+              </a:rPr>
+              <a:t>– von reinen Rezeptsammlungen hin zu </a:t>
+            </a:r>
+          </a:p>
+          <a:p>
+            <a:pPr marL="742950" lvl="1" indent="-285750" rtl="0">
+              <a:buFont typeface="Arial" panose="020B0604020202020204" pitchFamily="34" charset="0"/>
+              <a:buChar char="•"/>
+            </a:pPr>
+            <a:r>
+              <a:rPr lang="de-DE" sz="1800" dirty="0">
+                <a:effectLst/>
+                <a:latin typeface="Aptos" panose="020B0004020202020204" pitchFamily="34" charset="0"/>
+                <a:ea typeface="Aptos" panose="020B0004020202020204" pitchFamily="34" charset="0"/>
+                <a:cs typeface="Times New Roman" panose="02020603050405020304" pitchFamily="18" charset="0"/>
+              </a:rPr>
+              <a:t>ganzen Plattformen mit Community-Funktionen, </a:t>
+            </a:r>
+          </a:p>
+          <a:p>
+            <a:pPr marL="742950" lvl="1" indent="-285750" rtl="0">
+              <a:buFont typeface="Arial" panose="020B0604020202020204" pitchFamily="34" charset="0"/>
+              <a:buChar char="•"/>
+            </a:pPr>
+            <a:r>
+              <a:rPr lang="de-DE" sz="1800" dirty="0">
+                <a:effectLst/>
+                <a:latin typeface="Aptos" panose="020B0004020202020204" pitchFamily="34" charset="0"/>
+                <a:ea typeface="Aptos" panose="020B0004020202020204" pitchFamily="34" charset="0"/>
+                <a:cs typeface="Times New Roman" panose="02020603050405020304" pitchFamily="18" charset="0"/>
+              </a:rPr>
+              <a:t>redaktionellen Inhalten, </a:t>
+            </a:r>
+          </a:p>
+          <a:p>
+            <a:pPr marL="742950" lvl="1" indent="-285750" rtl="0">
+              <a:buFont typeface="Arial" panose="020B0604020202020204" pitchFamily="34" charset="0"/>
+              <a:buChar char="•"/>
+            </a:pPr>
+            <a:r>
+              <a:rPr lang="de-DE" sz="1800" dirty="0">
+                <a:effectLst/>
+                <a:latin typeface="Aptos" panose="020B0004020202020204" pitchFamily="34" charset="0"/>
+                <a:ea typeface="Aptos" panose="020B0004020202020204" pitchFamily="34" charset="0"/>
+                <a:cs typeface="Times New Roman" panose="02020603050405020304" pitchFamily="18" charset="0"/>
+              </a:rPr>
+              <a:t>Videos, </a:t>
+            </a:r>
+          </a:p>
+          <a:p>
+            <a:pPr marL="742950" lvl="1" indent="-285750" rtl="0">
+              <a:buFont typeface="Arial" panose="020B0604020202020204" pitchFamily="34" charset="0"/>
+              <a:buChar char="•"/>
+            </a:pPr>
+            <a:r>
+              <a:rPr lang="de-DE" sz="1800" dirty="0">
+                <a:effectLst/>
+                <a:latin typeface="Aptos" panose="020B0004020202020204" pitchFamily="34" charset="0"/>
+                <a:ea typeface="Aptos" panose="020B0004020202020204" pitchFamily="34" charset="0"/>
+                <a:cs typeface="Times New Roman" panose="02020603050405020304" pitchFamily="18" charset="0"/>
+              </a:rPr>
+              <a:t>Werbung</a:t>
+            </a:r>
+          </a:p>
+          <a:p>
+            <a:pPr marL="742950" lvl="1" indent="-285750" rtl="0">
+              <a:buFont typeface="Arial" panose="020B0604020202020204" pitchFamily="34" charset="0"/>
+              <a:buChar char="•"/>
+            </a:pPr>
+            <a:r>
+              <a:rPr lang="de-DE" sz="1800" dirty="0">
+                <a:effectLst/>
+                <a:latin typeface="Aptos" panose="020B0004020202020204" pitchFamily="34" charset="0"/>
+                <a:ea typeface="Aptos" panose="020B0004020202020204" pitchFamily="34" charset="0"/>
+                <a:cs typeface="Times New Roman" panose="02020603050405020304" pitchFamily="18" charset="0"/>
+              </a:rPr>
+              <a:t>und oft auch einem gewissen kommerziellen Hintergrund.</a:t>
+            </a:r>
+          </a:p>
+          <a:p>
+            <a:pPr marL="285750" lvl="0" indent="-285750" rtl="0">
+              <a:buFont typeface="Arial" panose="020B0604020202020204" pitchFamily="34" charset="0"/>
+              <a:buChar char="•"/>
+            </a:pPr>
+            <a:r>
+              <a:rPr lang="de-DE" sz="1800" dirty="0">
+                <a:effectLst/>
+                <a:latin typeface="Aptos" panose="020B0004020202020204" pitchFamily="34" charset="0"/>
+                <a:ea typeface="Aptos" panose="020B0004020202020204" pitchFamily="34" charset="0"/>
+                <a:cs typeface="Times New Roman" panose="02020603050405020304" pitchFamily="18" charset="0"/>
+              </a:rPr>
+              <a:t>Als direkte Beispiele haben wir uns vor allem chefkoch.de und lecker.de genauer angesehen. </a:t>
+            </a:r>
             <a:endParaRPr lang="de-DE" dirty="0"/>
           </a:p>
         </p:txBody>
@@ -4299,8 +6253,314 @@
           <a:bodyPr rtlCol="0"/>
           <a:lstStyle/>
           <a:p>
-            <a:pPr rtl="0"/>
-            <a:endParaRPr lang="de-DE"/>
+            <a:pPr marL="285750" indent="-285750" algn="just">
+              <a:lnSpc>
+                <a:spcPct val="150000"/>
+              </a:lnSpc>
+              <a:spcAft>
+                <a:spcPts val="600"/>
+              </a:spcAft>
+              <a:buFont typeface="Arial" panose="020B0604020202020204" pitchFamily="34" charset="0"/>
+              <a:buChar char="•"/>
+            </a:pPr>
+            <a:r>
+              <a:rPr lang="de-DE" sz="1800" kern="100" dirty="0">
+                <a:effectLst/>
+                <a:latin typeface="Aptos" panose="020B0004020202020204" pitchFamily="34" charset="0"/>
+                <a:ea typeface="Aptos" panose="020B0004020202020204" pitchFamily="34" charset="0"/>
+                <a:cs typeface="Times New Roman" panose="02020603050405020304" pitchFamily="18" charset="0"/>
+              </a:rPr>
+              <a:t>Diese Seiten bieten nicht nur umfassende Rezeptdatenbanken, sondern auch redaktionelle Beiträge, Kochvideos, saisonale Empfehlungen und Community-Bereiche. </a:t>
+            </a:r>
+          </a:p>
+          <a:p>
+            <a:pPr marL="285750" indent="-285750" algn="just">
+              <a:lnSpc>
+                <a:spcPct val="150000"/>
+              </a:lnSpc>
+              <a:spcAft>
+                <a:spcPts val="600"/>
+              </a:spcAft>
+              <a:buFont typeface="Arial" panose="020B0604020202020204" pitchFamily="34" charset="0"/>
+              <a:buChar char="•"/>
+            </a:pPr>
+            <a:r>
+              <a:rPr lang="de-DE" sz="1800" kern="100" dirty="0">
+                <a:effectLst/>
+                <a:latin typeface="Aptos" panose="020B0004020202020204" pitchFamily="34" charset="0"/>
+                <a:ea typeface="Aptos" panose="020B0004020202020204" pitchFamily="34" charset="0"/>
+                <a:cs typeface="Times New Roman" panose="02020603050405020304" pitchFamily="18" charset="0"/>
+              </a:rPr>
+              <a:t>Auch die Integration mit Supermärkten oder Kochboxen ist dort inzwischen gängig.</a:t>
+            </a:r>
+          </a:p>
+          <a:p>
+            <a:pPr marL="285750" indent="-285750" algn="just">
+              <a:lnSpc>
+                <a:spcPct val="150000"/>
+              </a:lnSpc>
+              <a:spcAft>
+                <a:spcPts val="600"/>
+              </a:spcAft>
+              <a:buFont typeface="Arial" panose="020B0604020202020204" pitchFamily="34" charset="0"/>
+              <a:buChar char="•"/>
+            </a:pPr>
+            <a:r>
+              <a:rPr lang="de-DE" sz="1800" kern="100" dirty="0">
+                <a:effectLst/>
+                <a:latin typeface="Aptos" panose="020B0004020202020204" pitchFamily="34" charset="0"/>
+                <a:ea typeface="Aptos" panose="020B0004020202020204" pitchFamily="34" charset="0"/>
+                <a:cs typeface="Times New Roman" panose="02020603050405020304" pitchFamily="18" charset="0"/>
+              </a:rPr>
+              <a:t>Unser Ansatz war bewusst ein anderer: </a:t>
+            </a:r>
+          </a:p>
+          <a:p>
+            <a:pPr marL="742950" lvl="1" indent="-285750" algn="just">
+              <a:lnSpc>
+                <a:spcPct val="150000"/>
+              </a:lnSpc>
+              <a:spcAft>
+                <a:spcPts val="600"/>
+              </a:spcAft>
+              <a:buFont typeface="Arial" panose="020B0604020202020204" pitchFamily="34" charset="0"/>
+              <a:buChar char="•"/>
+            </a:pPr>
+            <a:r>
+              <a:rPr lang="de-DE" sz="1800" kern="100" dirty="0">
+                <a:effectLst/>
+                <a:latin typeface="Aptos" panose="020B0004020202020204" pitchFamily="34" charset="0"/>
+                <a:ea typeface="Aptos" panose="020B0004020202020204" pitchFamily="34" charset="0"/>
+                <a:cs typeface="Times New Roman" panose="02020603050405020304" pitchFamily="18" charset="0"/>
+              </a:rPr>
+              <a:t>Wir wollten ein digitales Kochbuch schaffen, das sich ganz auf das Wesentliche konzentriert </a:t>
+            </a:r>
+          </a:p>
+          <a:p>
+            <a:pPr marL="742950" lvl="1" indent="-285750" algn="just">
+              <a:lnSpc>
+                <a:spcPct val="150000"/>
+              </a:lnSpc>
+              <a:spcAft>
+                <a:spcPts val="600"/>
+              </a:spcAft>
+              <a:buFont typeface="Arial" panose="020B0604020202020204" pitchFamily="34" charset="0"/>
+              <a:buChar char="•"/>
+            </a:pPr>
+            <a:r>
+              <a:rPr lang="de-DE" sz="1800" kern="100" dirty="0">
+                <a:effectLst/>
+                <a:latin typeface="Aptos" panose="020B0004020202020204" pitchFamily="34" charset="0"/>
+                <a:ea typeface="Aptos" panose="020B0004020202020204" pitchFamily="34" charset="0"/>
+                <a:cs typeface="Times New Roman" panose="02020603050405020304" pitchFamily="18" charset="0"/>
+              </a:rPr>
+              <a:t>– nämlich das Anlegen, Bearbeiten und Verwalten von Rezepten </a:t>
+            </a:r>
+          </a:p>
+          <a:p>
+            <a:pPr marL="742950" lvl="1" indent="-285750" algn="just">
+              <a:lnSpc>
+                <a:spcPct val="150000"/>
+              </a:lnSpc>
+              <a:spcAft>
+                <a:spcPts val="600"/>
+              </a:spcAft>
+              <a:buFont typeface="Arial" panose="020B0604020202020204" pitchFamily="34" charset="0"/>
+              <a:buChar char="•"/>
+            </a:pPr>
+            <a:r>
+              <a:rPr lang="de-DE" sz="1800" kern="100" dirty="0">
+                <a:effectLst/>
+                <a:latin typeface="Aptos" panose="020B0004020202020204" pitchFamily="34" charset="0"/>
+                <a:ea typeface="Aptos" panose="020B0004020202020204" pitchFamily="34" charset="0"/>
+                <a:cs typeface="Times New Roman" panose="02020603050405020304" pitchFamily="18" charset="0"/>
+              </a:rPr>
+              <a:t>– ohne Werbung, ohne Community, ohne Overhead. </a:t>
+            </a:r>
+          </a:p>
+          <a:p>
+            <a:pPr marL="742950" lvl="1" indent="-285750" algn="just">
+              <a:lnSpc>
+                <a:spcPct val="150000"/>
+              </a:lnSpc>
+              <a:spcAft>
+                <a:spcPts val="600"/>
+              </a:spcAft>
+              <a:buFont typeface="Arial" panose="020B0604020202020204" pitchFamily="34" charset="0"/>
+              <a:buChar char="•"/>
+            </a:pPr>
+            <a:r>
+              <a:rPr lang="de-DE" sz="1800" kern="100" dirty="0">
+                <a:effectLst/>
+                <a:latin typeface="Aptos" panose="020B0004020202020204" pitchFamily="34" charset="0"/>
+                <a:ea typeface="Aptos" panose="020B0004020202020204" pitchFamily="34" charset="0"/>
+                <a:cs typeface="Times New Roman" panose="02020603050405020304" pitchFamily="18" charset="0"/>
+              </a:rPr>
+              <a:t>Minimalistisch in der Optik, intuitiv in der Bedienung, funktional im Aufbau. </a:t>
+            </a:r>
+          </a:p>
+          <a:p>
+            <a:pPr marL="285750" lvl="0" indent="-285750" algn="just">
+              <a:lnSpc>
+                <a:spcPct val="150000"/>
+              </a:lnSpc>
+              <a:spcAft>
+                <a:spcPts val="600"/>
+              </a:spcAft>
+              <a:buFont typeface="Arial" panose="020B0604020202020204" pitchFamily="34" charset="0"/>
+              <a:buChar char="•"/>
+            </a:pPr>
+            <a:r>
+              <a:rPr lang="de-DE" sz="1800" kern="100" dirty="0">
+                <a:effectLst/>
+                <a:latin typeface="Aptos" panose="020B0004020202020204" pitchFamily="34" charset="0"/>
+                <a:ea typeface="Aptos" panose="020B0004020202020204" pitchFamily="34" charset="0"/>
+                <a:cs typeface="Times New Roman" panose="02020603050405020304" pitchFamily="18" charset="0"/>
+              </a:rPr>
+              <a:t>Unser Zielpublikum sollen Menschen sein, die einfach nur ihre Lieblingsrezepte an einem Ort sammeln und verwalten möchten </a:t>
+            </a:r>
+          </a:p>
+          <a:p>
+            <a:pPr marL="742950" lvl="1" indent="-285750" algn="just">
+              <a:lnSpc>
+                <a:spcPct val="150000"/>
+              </a:lnSpc>
+              <a:spcAft>
+                <a:spcPts val="600"/>
+              </a:spcAft>
+              <a:buFont typeface="Arial" panose="020B0604020202020204" pitchFamily="34" charset="0"/>
+              <a:buChar char="•"/>
+            </a:pPr>
+            <a:r>
+              <a:rPr lang="de-DE" sz="1800" kern="100" dirty="0">
+                <a:effectLst/>
+                <a:latin typeface="Aptos" panose="020B0004020202020204" pitchFamily="34" charset="0"/>
+                <a:ea typeface="Aptos" panose="020B0004020202020204" pitchFamily="34" charset="0"/>
+                <a:cs typeface="Times New Roman" panose="02020603050405020304" pitchFamily="18" charset="0"/>
+              </a:rPr>
+              <a:t>– ohne sich durch überladene Oberflächen oder Pop-ups klicken zu müssen.</a:t>
+            </a:r>
+          </a:p>
+          <a:p>
+            <a:pPr marL="742950" lvl="1" indent="-285750" algn="just">
+              <a:lnSpc>
+                <a:spcPct val="150000"/>
+              </a:lnSpc>
+              <a:spcAft>
+                <a:spcPts val="600"/>
+              </a:spcAft>
+              <a:buFont typeface="Arial" panose="020B0604020202020204" pitchFamily="34" charset="0"/>
+              <a:buChar char="•"/>
+            </a:pPr>
+            <a:endParaRPr lang="de-DE" sz="1800" kern="100" dirty="0">
+              <a:effectLst/>
+              <a:latin typeface="Aptos" panose="020B0004020202020204" pitchFamily="34" charset="0"/>
+              <a:ea typeface="Aptos" panose="020B0004020202020204" pitchFamily="34" charset="0"/>
+              <a:cs typeface="Times New Roman" panose="02020603050405020304" pitchFamily="18" charset="0"/>
+            </a:endParaRPr>
+          </a:p>
+          <a:p>
+            <a:pPr marL="285750" indent="-285750">
+              <a:buFont typeface="Arial" panose="020B0604020202020204" pitchFamily="34" charset="0"/>
+              <a:buChar char="•"/>
+            </a:pPr>
+            <a:r>
+              <a:rPr lang="de-DE" sz="1800" dirty="0">
+                <a:effectLst/>
+                <a:latin typeface="Aptos" panose="020B0004020202020204" pitchFamily="34" charset="0"/>
+                <a:ea typeface="Aptos" panose="020B0004020202020204" pitchFamily="34" charset="0"/>
+                <a:cs typeface="Times New Roman" panose="02020603050405020304" pitchFamily="18" charset="0"/>
+              </a:rPr>
+              <a:t>Dabei war uns besonders wichtig: Keine Ablenkung. </a:t>
+            </a:r>
+          </a:p>
+          <a:p>
+            <a:pPr marL="742950" lvl="1" indent="-285750">
+              <a:buFont typeface="Arial" panose="020B0604020202020204" pitchFamily="34" charset="0"/>
+              <a:buChar char="•"/>
+            </a:pPr>
+            <a:r>
+              <a:rPr lang="de-DE" sz="1800" dirty="0">
+                <a:effectLst/>
+                <a:latin typeface="Aptos" panose="020B0004020202020204" pitchFamily="34" charset="0"/>
+                <a:ea typeface="Aptos" panose="020B0004020202020204" pitchFamily="34" charset="0"/>
+                <a:cs typeface="Times New Roman" panose="02020603050405020304" pitchFamily="18" charset="0"/>
+              </a:rPr>
+              <a:t>Keine redaktionellen Inhalte. </a:t>
+            </a:r>
+          </a:p>
+          <a:p>
+            <a:pPr marL="742950" lvl="1" indent="-285750">
+              <a:buFont typeface="Arial" panose="020B0604020202020204" pitchFamily="34" charset="0"/>
+              <a:buChar char="•"/>
+            </a:pPr>
+            <a:r>
+              <a:rPr lang="de-DE" sz="1800" dirty="0">
+                <a:effectLst/>
+                <a:latin typeface="Aptos" panose="020B0004020202020204" pitchFamily="34" charset="0"/>
+                <a:ea typeface="Aptos" panose="020B0004020202020204" pitchFamily="34" charset="0"/>
+                <a:cs typeface="Times New Roman" panose="02020603050405020304" pitchFamily="18" charset="0"/>
+              </a:rPr>
+              <a:t>Kein kommerzieller Fokus. </a:t>
+            </a:r>
+          </a:p>
+          <a:p>
+            <a:pPr marL="742950" lvl="1" indent="-285750">
+              <a:buFont typeface="Arial" panose="020B0604020202020204" pitchFamily="34" charset="0"/>
+              <a:buChar char="•"/>
+            </a:pPr>
+            <a:r>
+              <a:rPr lang="de-DE" sz="1800" dirty="0">
+                <a:effectLst/>
+                <a:latin typeface="Aptos" panose="020B0004020202020204" pitchFamily="34" charset="0"/>
+                <a:ea typeface="Aptos" panose="020B0004020202020204" pitchFamily="34" charset="0"/>
+                <a:cs typeface="Times New Roman" panose="02020603050405020304" pitchFamily="18" charset="0"/>
+              </a:rPr>
+              <a:t>Nur die Kernfunktionen </a:t>
+            </a:r>
+          </a:p>
+          <a:p>
+            <a:pPr marL="742950" lvl="1" indent="-285750">
+              <a:buFont typeface="Arial" panose="020B0604020202020204" pitchFamily="34" charset="0"/>
+              <a:buChar char="•"/>
+            </a:pPr>
+            <a:r>
+              <a:rPr lang="de-DE" sz="1800" dirty="0">
+                <a:effectLst/>
+                <a:latin typeface="Aptos" panose="020B0004020202020204" pitchFamily="34" charset="0"/>
+                <a:ea typeface="Aptos" panose="020B0004020202020204" pitchFamily="34" charset="0"/>
+                <a:cs typeface="Times New Roman" panose="02020603050405020304" pitchFamily="18" charset="0"/>
+              </a:rPr>
+              <a:t>– aber dafür durchdacht, schlank und klar strukturiert. </a:t>
+            </a:r>
+          </a:p>
+          <a:p>
+            <a:pPr marL="742950" lvl="1" indent="-285750">
+              <a:buFont typeface="Arial" panose="020B0604020202020204" pitchFamily="34" charset="0"/>
+              <a:buChar char="•"/>
+            </a:pPr>
+            <a:endParaRPr lang="de-DE" sz="1800" dirty="0">
+              <a:effectLst/>
+              <a:latin typeface="Aptos" panose="020B0004020202020204" pitchFamily="34" charset="0"/>
+              <a:ea typeface="Aptos" panose="020B0004020202020204" pitchFamily="34" charset="0"/>
+              <a:cs typeface="Times New Roman" panose="02020603050405020304" pitchFamily="18" charset="0"/>
+            </a:endParaRPr>
+          </a:p>
+          <a:p>
+            <a:pPr marL="285750" lvl="0" indent="-285750">
+              <a:buFont typeface="Arial" panose="020B0604020202020204" pitchFamily="34" charset="0"/>
+              <a:buChar char="•"/>
+            </a:pPr>
+            <a:r>
+              <a:rPr lang="de-DE" sz="1800" dirty="0">
+                <a:effectLst/>
+                <a:latin typeface="Aptos" panose="020B0004020202020204" pitchFamily="34" charset="0"/>
+                <a:ea typeface="Aptos" panose="020B0004020202020204" pitchFamily="34" charset="0"/>
+                <a:cs typeface="Times New Roman" panose="02020603050405020304" pitchFamily="18" charset="0"/>
+              </a:rPr>
+              <a:t>Man könnte sagen: ein Kochbuch von Studies – für Leute, die Kochen einfach und pragmatisch lieben.</a:t>
+            </a:r>
+            <a:endParaRPr lang="de-DE" dirty="0"/>
           </a:p>
         </p:txBody>
       </p:sp>
@@ -4849,8 +7109,379 @@
           <a:bodyPr rtlCol="0"/>
           <a:lstStyle/>
           <a:p>
-            <a:pPr rtl="0"/>
-            <a:endParaRPr lang="de-DE"/>
+            <a:pPr marL="171450" indent="-171450">
+              <a:buFont typeface="Arial" panose="020B0604020202020204" pitchFamily="34" charset="0"/>
+              <a:buChar char="•"/>
+            </a:pPr>
+            <a:r>
+              <a:rPr lang="de-DE" dirty="0"/>
+              <a:t>Bei der Spezifikation war es uns wichtig, eine klare </a:t>
+            </a:r>
+            <a:r>
+              <a:rPr lang="de-DE" b="1" dirty="0"/>
+              <a:t>Abgrenzung</a:t>
+            </a:r>
+            <a:r>
+              <a:rPr lang="de-DE" dirty="0"/>
+              <a:t> zu treffen </a:t>
+            </a:r>
+          </a:p>
+          <a:p>
+            <a:pPr marL="628650" lvl="1" indent="-171450">
+              <a:buFont typeface="Arial" panose="020B0604020202020204" pitchFamily="34" charset="0"/>
+              <a:buChar char="•"/>
+            </a:pPr>
+            <a:r>
+              <a:rPr lang="de-DE" dirty="0"/>
+              <a:t>– sowohl was den </a:t>
+            </a:r>
+            <a:r>
+              <a:rPr lang="de-DE" b="1" dirty="0"/>
+              <a:t>aktuellen Funktionsumfang</a:t>
+            </a:r>
+            <a:r>
+              <a:rPr lang="de-DE" dirty="0"/>
+              <a:t>, </a:t>
+            </a:r>
+          </a:p>
+          <a:p>
+            <a:pPr marL="628650" lvl="1" indent="-171450">
+              <a:buFont typeface="Arial" panose="020B0604020202020204" pitchFamily="34" charset="0"/>
+              <a:buChar char="•"/>
+            </a:pPr>
+            <a:r>
+              <a:rPr lang="de-DE" dirty="0"/>
+              <a:t>als auch mögliche </a:t>
+            </a:r>
+            <a:r>
+              <a:rPr lang="de-DE" b="1" dirty="0"/>
+              <a:t>zukünftige Erweiterungen</a:t>
+            </a:r>
+            <a:r>
+              <a:rPr lang="de-DE" dirty="0"/>
+              <a:t> betrifft.</a:t>
+            </a:r>
+          </a:p>
+          <a:p>
+            <a:pPr marL="171450" indent="-171450">
+              <a:buFont typeface="Arial" panose="020B0604020202020204" pitchFamily="34" charset="0"/>
+              <a:buChar char="•"/>
+            </a:pPr>
+            <a:r>
+              <a:rPr lang="de-DE" dirty="0"/>
+              <a:t>Einige Funktionen wie </a:t>
+            </a:r>
+          </a:p>
+          <a:p>
+            <a:pPr marL="628650" lvl="1" indent="-171450">
+              <a:buFont typeface="Arial" panose="020B0604020202020204" pitchFamily="34" charset="0"/>
+              <a:buChar char="•"/>
+            </a:pPr>
+            <a:r>
+              <a:rPr lang="de-DE" b="1" dirty="0"/>
+              <a:t>Blogs</a:t>
+            </a:r>
+            <a:r>
+              <a:rPr lang="de-DE" dirty="0"/>
+              <a:t>, </a:t>
+            </a:r>
+          </a:p>
+          <a:p>
+            <a:pPr marL="628650" lvl="1" indent="-171450">
+              <a:buFont typeface="Arial" panose="020B0604020202020204" pitchFamily="34" charset="0"/>
+              <a:buChar char="•"/>
+            </a:pPr>
+            <a:r>
+              <a:rPr lang="de-DE" b="1" dirty="0"/>
+              <a:t>Newsletter</a:t>
+            </a:r>
+            <a:r>
+              <a:rPr lang="de-DE" dirty="0"/>
+              <a:t> </a:t>
+            </a:r>
+          </a:p>
+          <a:p>
+            <a:pPr marL="628650" lvl="1" indent="-171450">
+              <a:buFont typeface="Arial" panose="020B0604020202020204" pitchFamily="34" charset="0"/>
+              <a:buChar char="•"/>
+            </a:pPr>
+            <a:r>
+              <a:rPr lang="de-DE" dirty="0"/>
+              <a:t>oder </a:t>
+            </a:r>
+            <a:r>
+              <a:rPr lang="de-DE" b="1" dirty="0"/>
+              <a:t>Marketing-Anbindungen</a:t>
+            </a:r>
+            <a:r>
+              <a:rPr lang="de-DE" dirty="0"/>
+              <a:t> haben wir </a:t>
+            </a:r>
+            <a:r>
+              <a:rPr lang="de-DE" b="1" dirty="0"/>
+              <a:t>bewusst komplett ausgeschlossen</a:t>
+            </a:r>
+            <a:r>
+              <a:rPr lang="de-DE" dirty="0"/>
+              <a:t>, </a:t>
+            </a:r>
+          </a:p>
+          <a:p>
+            <a:pPr marL="1085850" lvl="2" indent="-171450">
+              <a:buFont typeface="Arial" panose="020B0604020202020204" pitchFamily="34" charset="0"/>
+              <a:buChar char="•"/>
+            </a:pPr>
+            <a:r>
+              <a:rPr lang="de-DE" dirty="0"/>
+              <a:t>weil sie weder zu unserem Nutzungskontext passen noch den Fokus unseres Projekts unterstützen.</a:t>
+            </a:r>
+          </a:p>
+          <a:p>
+            <a:pPr marL="171450" indent="-171450">
+              <a:buFont typeface="Arial" panose="020B0604020202020204" pitchFamily="34" charset="0"/>
+              <a:buChar char="•"/>
+            </a:pPr>
+            <a:r>
+              <a:rPr lang="de-DE" dirty="0"/>
+              <a:t>Anderes haben wir dagegen eher </a:t>
+            </a:r>
+            <a:r>
+              <a:rPr lang="de-DE" b="1" dirty="0"/>
+              <a:t>temporär abgegrenzt</a:t>
+            </a:r>
+            <a:r>
+              <a:rPr lang="de-DE" dirty="0"/>
+              <a:t>: </a:t>
+            </a:r>
+          </a:p>
+          <a:p>
+            <a:pPr marL="628650" lvl="1" indent="-171450">
+              <a:buFont typeface="Arial" panose="020B0604020202020204" pitchFamily="34" charset="0"/>
+              <a:buChar char="•"/>
+            </a:pPr>
+            <a:r>
+              <a:rPr lang="de-DE" dirty="0"/>
+              <a:t>Zum Beispiel die </a:t>
+            </a:r>
+            <a:r>
+              <a:rPr lang="de-DE" b="1" dirty="0"/>
+              <a:t>Userregistrierung und -anmeldung</a:t>
+            </a:r>
+            <a:r>
+              <a:rPr lang="de-DE" dirty="0"/>
+              <a:t>. </a:t>
+            </a:r>
+          </a:p>
+          <a:p>
+            <a:pPr marL="628650" lvl="1" indent="-171450">
+              <a:buFont typeface="Arial" panose="020B0604020202020204" pitchFamily="34" charset="0"/>
+              <a:buChar char="•"/>
+            </a:pPr>
+            <a:r>
+              <a:rPr lang="de-DE" dirty="0"/>
+              <a:t>Das ist eine Funktion, die kommen wird, aber für die ersten funktionalen unserer Anwendung nicht notwendig war. </a:t>
+            </a:r>
+          </a:p>
+          <a:p>
+            <a:pPr marL="171450" lvl="0" indent="-171450">
+              <a:buFont typeface="Arial" panose="020B0604020202020204" pitchFamily="34" charset="0"/>
+              <a:buChar char="•"/>
+            </a:pPr>
+            <a:r>
+              <a:rPr lang="de-DE" dirty="0"/>
+              <a:t>Unser Ziel war zunächst, das </a:t>
+            </a:r>
+            <a:r>
+              <a:rPr lang="de-DE" b="1" dirty="0"/>
+              <a:t>Grundgerüst der Plattform</a:t>
+            </a:r>
+            <a:r>
+              <a:rPr lang="de-DE" dirty="0"/>
+              <a:t> – also eine funktionale Rezeptverwaltung – stabil umzusetzen.</a:t>
+            </a:r>
+          </a:p>
+          <a:p>
+            <a:pPr marL="628650" lvl="1" indent="-171450">
+              <a:buFont typeface="Arial" panose="020B0604020202020204" pitchFamily="34" charset="0"/>
+              <a:buChar char="•"/>
+            </a:pPr>
+            <a:r>
+              <a:rPr lang="de-DE" dirty="0"/>
+              <a:t>Die Userregistrierung und –</a:t>
+            </a:r>
+            <a:r>
+              <a:rPr lang="de-DE" dirty="0" err="1"/>
+              <a:t>anmeldung</a:t>
+            </a:r>
+            <a:r>
+              <a:rPr lang="de-DE" dirty="0"/>
+              <a:t> ist also auf unserer </a:t>
+            </a:r>
+            <a:r>
+              <a:rPr lang="de-DE" dirty="0" err="1"/>
+              <a:t>To</a:t>
+            </a:r>
+            <a:r>
+              <a:rPr lang="de-DE" dirty="0"/>
+              <a:t>-Do, jedoch konnten wir das Thema fürs erste noch nicht ohne Grundfunktionale Seite umsetzen.</a:t>
+            </a:r>
+          </a:p>
+          <a:p>
+            <a:pPr marL="628650" lvl="1" indent="-171450">
+              <a:buFont typeface="Arial" panose="020B0604020202020204" pitchFamily="34" charset="0"/>
+              <a:buChar char="•"/>
+            </a:pPr>
+            <a:endParaRPr lang="de-DE" dirty="0"/>
+          </a:p>
+          <a:p>
+            <a:pPr marL="171450" indent="-171450">
+              <a:buFont typeface="Arial" panose="020B0604020202020204" pitchFamily="34" charset="0"/>
+              <a:buChar char="•"/>
+            </a:pPr>
+            <a:r>
+              <a:rPr lang="de-DE" dirty="0"/>
+              <a:t>Auch die Idee einer </a:t>
+            </a:r>
+            <a:r>
+              <a:rPr lang="de-DE" b="1" dirty="0"/>
+              <a:t>KI-Anbindung für Rezeptvorschläge</a:t>
+            </a:r>
+            <a:r>
+              <a:rPr lang="de-DE" dirty="0"/>
+              <a:t> stand zu Beginn im Raum, wurde aber im Rahmen dieser ersten Ausbaustufe bewusst </a:t>
+            </a:r>
+            <a:r>
+              <a:rPr lang="de-DE" b="1" dirty="0"/>
+              <a:t>nicht umgesetzt</a:t>
+            </a:r>
+            <a:r>
+              <a:rPr lang="de-DE" dirty="0"/>
+              <a:t>. </a:t>
+            </a:r>
+          </a:p>
+          <a:p>
+            <a:pPr marL="628650" lvl="1" indent="-171450">
+              <a:buFont typeface="Arial" panose="020B0604020202020204" pitchFamily="34" charset="0"/>
+              <a:buChar char="•"/>
+            </a:pPr>
+            <a:r>
+              <a:rPr lang="de-DE" dirty="0"/>
+              <a:t>Es bleibt ein interessantes Konzept für eine spätere Erweiterung.</a:t>
+            </a:r>
+          </a:p>
+          <a:p>
+            <a:pPr marL="171450" indent="-171450">
+              <a:buFont typeface="Arial" panose="020B0604020202020204" pitchFamily="34" charset="0"/>
+              <a:buChar char="•"/>
+            </a:pPr>
+            <a:r>
+              <a:rPr lang="de-DE" dirty="0"/>
+              <a:t>Unser definierter </a:t>
+            </a:r>
+            <a:r>
+              <a:rPr lang="de-DE" b="1" dirty="0" err="1"/>
+              <a:t>Scope</a:t>
+            </a:r>
+            <a:r>
+              <a:rPr lang="de-DE" dirty="0"/>
+              <a:t> war also ganz klar auf das, was wir als </a:t>
+            </a:r>
+            <a:r>
+              <a:rPr lang="de-DE" b="1" dirty="0"/>
+              <a:t>‚Tier 1‘ unserer Entwicklung</a:t>
+            </a:r>
+            <a:r>
+              <a:rPr lang="de-DE" dirty="0"/>
+              <a:t> bezeichnen würden:</a:t>
+            </a:r>
+          </a:p>
+          <a:p>
+            <a:pPr marL="628650" lvl="1" indent="-171450">
+              <a:buFont typeface="Arial" panose="020B0604020202020204" pitchFamily="34" charset="0"/>
+              <a:buChar char="•"/>
+            </a:pPr>
+            <a:r>
+              <a:rPr lang="de-DE" dirty="0"/>
+              <a:t>Ein funktionierendes </a:t>
+            </a:r>
+            <a:r>
+              <a:rPr lang="de-DE" b="1" dirty="0"/>
+              <a:t>Frontend mit einfacher Nutzerführung</a:t>
+            </a:r>
+            <a:r>
+              <a:rPr lang="de-DE" dirty="0"/>
+              <a:t>,</a:t>
+            </a:r>
+          </a:p>
+          <a:p>
+            <a:pPr marL="628650" lvl="1" indent="-171450">
+              <a:buFont typeface="Arial" panose="020B0604020202020204" pitchFamily="34" charset="0"/>
+              <a:buChar char="•"/>
+            </a:pPr>
+            <a:r>
+              <a:rPr lang="de-DE" dirty="0"/>
+              <a:t>Eine robuste </a:t>
+            </a:r>
+            <a:r>
+              <a:rPr lang="de-DE" b="1" dirty="0"/>
+              <a:t>Datenbankanbindung</a:t>
+            </a:r>
+            <a:r>
+              <a:rPr lang="de-DE" dirty="0"/>
+              <a:t>,</a:t>
+            </a:r>
+          </a:p>
+          <a:p>
+            <a:pPr marL="628650" lvl="1" indent="-171450">
+              <a:buFont typeface="Arial" panose="020B0604020202020204" pitchFamily="34" charset="0"/>
+              <a:buChar char="•"/>
+            </a:pPr>
+            <a:r>
+              <a:rPr lang="de-DE" dirty="0"/>
+              <a:t>Und die vollständige Umsetzung der grundlegenden </a:t>
+            </a:r>
+            <a:r>
+              <a:rPr lang="de-DE" b="1" dirty="0"/>
+              <a:t>CRUD-Funktionen</a:t>
+            </a:r>
+            <a:r>
+              <a:rPr lang="de-DE" dirty="0"/>
+              <a:t> </a:t>
+            </a:r>
+          </a:p>
+          <a:p>
+            <a:pPr marL="1085850" lvl="2" indent="-171450">
+              <a:buFont typeface="Arial" panose="020B0604020202020204" pitchFamily="34" charset="0"/>
+              <a:buChar char="•"/>
+            </a:pPr>
+            <a:r>
+              <a:rPr lang="de-DE" dirty="0"/>
+              <a:t>– also Rezepte anlegen, bearbeiten, löschen und anzeigen.</a:t>
+            </a:r>
+          </a:p>
+          <a:p>
+            <a:pPr marL="1085850" lvl="2" indent="-171450">
+              <a:buFont typeface="Arial" panose="020B0604020202020204" pitchFamily="34" charset="0"/>
+              <a:buChar char="•"/>
+            </a:pPr>
+            <a:endParaRPr lang="de-DE" dirty="0"/>
+          </a:p>
+          <a:p>
+            <a:pPr marL="171450" indent="-171450">
+              <a:buFont typeface="Arial" panose="020B0604020202020204" pitchFamily="34" charset="0"/>
+              <a:buChar char="•"/>
+            </a:pPr>
+            <a:r>
+              <a:rPr lang="de-DE" dirty="0"/>
+              <a:t>Dieses funktionale Fundament war für uns der logische erste Schritt, auf dem in Zukunft aufgebaut werden kann.</a:t>
+            </a:r>
+          </a:p>
+          <a:p>
+            <a:pPr marL="171450" indent="-171450" rtl="0">
+              <a:buFont typeface="Arial" panose="020B0604020202020204" pitchFamily="34" charset="0"/>
+              <a:buChar char="•"/>
+            </a:pPr>
+            <a:endParaRPr lang="de-DE" dirty="0"/>
           </a:p>
         </p:txBody>
       </p:sp>
@@ -36915,6 +39546,24 @@
 </file>
 
 <file path=customXml/item1.xml><?xml version="1.0" encoding="utf-8"?>
+<?mso-contentType ?>
+<FormTemplates xmlns="http://schemas.microsoft.com/sharepoint/v3/contenttype/forms">
+  <Display>DocumentLibraryForm</Display>
+  <Edit>DocumentLibraryForm</Edit>
+  <New>DocumentLibraryForm</New>
+</FormTemplates>
+</file>
+
+<file path=customXml/item2.xml><?xml version="1.0" encoding="utf-8"?>
+<p:properties xmlns:p="http://schemas.microsoft.com/office/2006/metadata/properties" xmlns:xsi="http://www.w3.org/2001/XMLSchema-instance" xmlns:pc="http://schemas.microsoft.com/office/infopath/2007/PartnerControls">
+  <documentManagement>
+    <_ip_UnifiedCompliancePolicyUIAction xmlns="http://schemas.microsoft.com/sharepoint/v3" xsi:nil="true"/>
+    <_ip_UnifiedCompliancePolicyProperties xmlns="http://schemas.microsoft.com/sharepoint/v3" xsi:nil="true"/>
+  </documentManagement>
+</p:properties>
+</file>
+
+<file path=customXml/item3.xml><?xml version="1.0" encoding="utf-8"?>
 <ct:contentTypeSchema xmlns:ct="http://schemas.microsoft.com/office/2006/metadata/contentType" xmlns:ma="http://schemas.microsoft.com/office/2006/metadata/properties/metaAttributes" ct:_="" ma:_="" ma:contentTypeName="Document" ma:contentTypeID="0x010100DEEA25CC0A0AC24199CDC46C25B8B0BC" ma:contentTypeVersion="10" ma:contentTypeDescription="Create a new document." ma:contentTypeScope="" ma:versionID="e3b47856d4cf355c0dacb39e1084d14f">
   <xsd:schema xmlns:xsd="http://www.w3.org/2001/XMLSchema" xmlns:xs="http://www.w3.org/2001/XMLSchema" xmlns:p="http://schemas.microsoft.com/office/2006/metadata/properties" xmlns:ns1="http://schemas.microsoft.com/sharepoint/v3" xmlns:ns2="6dc4bcd6-49db-4c07-9060-8acfc67cef9f" xmlns:ns3="fb0879af-3eba-417a-a55a-ffe6dcd6ca77" targetNamespace="http://schemas.microsoft.com/office/2006/metadata/properties" ma:root="true" ma:fieldsID="a845a615265fdb1f7b12cc65ac20ecbd" ns1:_="" ns2:_="" ns3:_="">
     <xsd:import namespace="http://schemas.microsoft.com/sharepoint/v3"/>
@@ -37122,40 +39771,10 @@
 </ct:contentTypeSchema>
 </file>
 
-<file path=customXml/item2.xml><?xml version="1.0" encoding="utf-8"?>
-<p:properties xmlns:p="http://schemas.microsoft.com/office/2006/metadata/properties" xmlns:xsi="http://www.w3.org/2001/XMLSchema-instance" xmlns:pc="http://schemas.microsoft.com/office/infopath/2007/PartnerControls">
-  <documentManagement>
-    <_ip_UnifiedCompliancePolicyUIAction xmlns="http://schemas.microsoft.com/sharepoint/v3" xsi:nil="true"/>
-    <_ip_UnifiedCompliancePolicyProperties xmlns="http://schemas.microsoft.com/sharepoint/v3" xsi:nil="true"/>
-  </documentManagement>
-</p:properties>
-</file>
-
-<file path=customXml/item3.xml><?xml version="1.0" encoding="utf-8"?>
-<?mso-contentType ?>
-<FormTemplates xmlns="http://schemas.microsoft.com/sharepoint/v3/contenttype/forms">
-  <Display>DocumentLibraryForm</Display>
-  <Edit>DocumentLibraryForm</Edit>
-  <New>DocumentLibraryForm</New>
-</FormTemplates>
-</file>
-
 <file path=customXml/itemProps1.xml><?xml version="1.0" encoding="utf-8"?>
-<ds:datastoreItem xmlns:ds="http://schemas.openxmlformats.org/officeDocument/2006/customXml" ds:itemID="{6B67ACAB-C3DC-429D-A23C-0723C084FEE5}">
+<ds:datastoreItem xmlns:ds="http://schemas.openxmlformats.org/officeDocument/2006/customXml" ds:itemID="{8A95DE24-D6C3-4A00-9085-D9594C193AE1}">
   <ds:schemaRefs>
-    <ds:schemaRef ds:uri="http://schemas.microsoft.com/office/2006/metadata/contentType"/>
-    <ds:schemaRef ds:uri="http://schemas.microsoft.com/office/2006/metadata/properties/metaAttributes"/>
-    <ds:schemaRef ds:uri="http://www.w3.org/2001/XMLSchema"/>
-    <ds:schemaRef ds:uri="http://schemas.microsoft.com/office/2006/metadata/properties"/>
-    <ds:schemaRef ds:uri="http://schemas.microsoft.com/sharepoint/v3"/>
-    <ds:schemaRef ds:uri="6dc4bcd6-49db-4c07-9060-8acfc67cef9f"/>
-    <ds:schemaRef ds:uri="fb0879af-3eba-417a-a55a-ffe6dcd6ca77"/>
-    <ds:schemaRef ds:uri="http://schemas.microsoft.com/office/2006/documentManagement/types"/>
-    <ds:schemaRef ds:uri="http://schemas.microsoft.com/office/infopath/2007/PartnerControls"/>
-    <ds:schemaRef ds:uri="http://schemas.openxmlformats.org/package/2006/metadata/core-properties"/>
-    <ds:schemaRef ds:uri="http://purl.org/dc/elements/1.1/"/>
-    <ds:schemaRef ds:uri="http://purl.org/dc/terms/"/>
-    <ds:schemaRef ds:uri="http://schemas.microsoft.com/internal/obd"/>
+    <ds:schemaRef ds:uri="http://schemas.microsoft.com/sharepoint/v3/contenttype/forms"/>
   </ds:schemaRefs>
 </ds:datastoreItem>
 </file>
@@ -37179,9 +39798,21 @@
 </file>
 
 <file path=customXml/itemProps3.xml><?xml version="1.0" encoding="utf-8"?>
-<ds:datastoreItem xmlns:ds="http://schemas.openxmlformats.org/officeDocument/2006/customXml" ds:itemID="{8A95DE24-D6C3-4A00-9085-D9594C193AE1}">
+<ds:datastoreItem xmlns:ds="http://schemas.openxmlformats.org/officeDocument/2006/customXml" ds:itemID="{6B67ACAB-C3DC-429D-A23C-0723C084FEE5}">
   <ds:schemaRefs>
-    <ds:schemaRef ds:uri="http://schemas.microsoft.com/sharepoint/v3/contenttype/forms"/>
+    <ds:schemaRef ds:uri="http://schemas.microsoft.com/office/2006/metadata/contentType"/>
+    <ds:schemaRef ds:uri="http://schemas.microsoft.com/office/2006/metadata/properties/metaAttributes"/>
+    <ds:schemaRef ds:uri="http://www.w3.org/2001/XMLSchema"/>
+    <ds:schemaRef ds:uri="http://schemas.microsoft.com/office/2006/metadata/properties"/>
+    <ds:schemaRef ds:uri="http://schemas.microsoft.com/sharepoint/v3"/>
+    <ds:schemaRef ds:uri="6dc4bcd6-49db-4c07-9060-8acfc67cef9f"/>
+    <ds:schemaRef ds:uri="fb0879af-3eba-417a-a55a-ffe6dcd6ca77"/>
+    <ds:schemaRef ds:uri="http://schemas.microsoft.com/office/2006/documentManagement/types"/>
+    <ds:schemaRef ds:uri="http://schemas.microsoft.com/office/infopath/2007/PartnerControls"/>
+    <ds:schemaRef ds:uri="http://schemas.openxmlformats.org/package/2006/metadata/core-properties"/>
+    <ds:schemaRef ds:uri="http://purl.org/dc/elements/1.1/"/>
+    <ds:schemaRef ds:uri="http://purl.org/dc/terms/"/>
+    <ds:schemaRef ds:uri="http://schemas.microsoft.com/internal/obd"/>
   </ds:schemaRefs>
 </ds:datastoreItem>
 </file>
</xml_diff>